<commit_message>
working on evaluating models
</commit_message>
<xml_diff>
--- a/Master thesis/Meetings/06-03 Comparing model and simulation.pptx
+++ b/Master thesis/Meetings/06-03 Comparing model and simulation.pptx
@@ -109,7 +109,56 @@
       </a:defRPr>
     </a:lvl9pPr>
   </p:defaultTextStyle>
+  <p:extLst>
+    <p:ext uri="{EFAFB233-063F-42B5-8137-9DF3F51BA10A}">
+      <p15:sldGuideLst xmlns:p15="http://schemas.microsoft.com/office/powerpoint/2012/main"/>
+    </p:ext>
+  </p:extLst>
 </p:presentation>
+</file>
+
+<file path=ppt/changesInfos/changesInfo1.xml><?xml version="1.0" encoding="utf-8"?>
+<pc:chgInfo xmlns:a="http://schemas.openxmlformats.org/drawingml/2006/main" xmlns:r="http://schemas.openxmlformats.org/officeDocument/2006/relationships" xmlns:ac="http://schemas.microsoft.com/office/drawing/2013/main/command" xmlns:pc="http://schemas.microsoft.com/office/powerpoint/2013/main/command">
+  <pc:docChgLst>
+    <pc:chgData name="Birk Nøhr Dissing" userId="9f16f90f-bd2a-4063-a72f-deae502fc0f4" providerId="ADAL" clId="{C11D7ED5-FBE8-4797-A956-863497D4E4C9}"/>
+    <pc:docChg chg="undo custSel modSld">
+      <pc:chgData name="Birk Nøhr Dissing" userId="9f16f90f-bd2a-4063-a72f-deae502fc0f4" providerId="ADAL" clId="{C11D7ED5-FBE8-4797-A956-863497D4E4C9}" dt="2024-03-01T12:03:26.619" v="90" actId="20577"/>
+      <pc:docMkLst>
+        <pc:docMk/>
+      </pc:docMkLst>
+      <pc:sldChg chg="modSp mod">
+        <pc:chgData name="Birk Nøhr Dissing" userId="9f16f90f-bd2a-4063-a72f-deae502fc0f4" providerId="ADAL" clId="{C11D7ED5-FBE8-4797-A956-863497D4E4C9}" dt="2024-03-01T12:03:05.790" v="89" actId="20577"/>
+        <pc:sldMkLst>
+          <pc:docMk/>
+          <pc:sldMk cId="683960906" sldId="262"/>
+        </pc:sldMkLst>
+        <pc:spChg chg="mod">
+          <ac:chgData name="Birk Nøhr Dissing" userId="9f16f90f-bd2a-4063-a72f-deae502fc0f4" providerId="ADAL" clId="{C11D7ED5-FBE8-4797-A956-863497D4E4C9}" dt="2024-03-01T12:03:05.790" v="89" actId="20577"/>
+          <ac:spMkLst>
+            <pc:docMk/>
+            <pc:sldMk cId="683960906" sldId="262"/>
+            <ac:spMk id="7" creationId="{1092B001-612C-064D-8731-B535569F220A}"/>
+          </ac:spMkLst>
+        </pc:spChg>
+      </pc:sldChg>
+      <pc:sldChg chg="modSp mod">
+        <pc:chgData name="Birk Nøhr Dissing" userId="9f16f90f-bd2a-4063-a72f-deae502fc0f4" providerId="ADAL" clId="{C11D7ED5-FBE8-4797-A956-863497D4E4C9}" dt="2024-03-01T12:03:26.619" v="90" actId="20577"/>
+        <pc:sldMkLst>
+          <pc:docMk/>
+          <pc:sldMk cId="2493231075" sldId="263"/>
+        </pc:sldMkLst>
+        <pc:spChg chg="mod">
+          <ac:chgData name="Birk Nøhr Dissing" userId="9f16f90f-bd2a-4063-a72f-deae502fc0f4" providerId="ADAL" clId="{C11D7ED5-FBE8-4797-A956-863497D4E4C9}" dt="2024-03-01T12:03:26.619" v="90" actId="20577"/>
+          <ac:spMkLst>
+            <pc:docMk/>
+            <pc:sldMk cId="2493231075" sldId="263"/>
+            <ac:spMk id="2" creationId="{E0328880-41C7-6813-2A09-C1BBFE9E70E7}"/>
+          </ac:spMkLst>
+        </pc:spChg>
+      </pc:sldChg>
+    </pc:docChg>
+  </pc:docChgLst>
+</pc:chgInfo>
 </file>
 
 <file path=ppt/slideLayouts/slideLayout1.xml><?xml version="1.0" encoding="utf-8"?>
@@ -261,7 +310,7 @@
           <a:p>
             <a:fld id="{09E97F70-84DE-42B7-9F34-EEF1D7EF4F70}" type="datetimeFigureOut">
               <a:rPr lang="en-GB" smtClean="0"/>
-              <a:t>29/02/2024</a:t>
+              <a:t>01/03/2024</a:t>
             </a:fld>
             <a:endParaRPr lang="en-GB"/>
           </a:p>
@@ -315,7 +364,7 @@
           <a:p>
             <a:fld id="{D3A8DC05-A492-4925-AD9C-10E003E84CDB}" type="slidenum">
               <a:rPr lang="en-GB" smtClean="0"/>
-              <a:t>‹#›</a:t>
+              <a:t>‹nr.›</a:t>
             </a:fld>
             <a:endParaRPr lang="en-GB"/>
           </a:p>
@@ -461,7 +510,7 @@
           <a:p>
             <a:fld id="{09E97F70-84DE-42B7-9F34-EEF1D7EF4F70}" type="datetimeFigureOut">
               <a:rPr lang="en-GB" smtClean="0"/>
-              <a:t>29/02/2024</a:t>
+              <a:t>01/03/2024</a:t>
             </a:fld>
             <a:endParaRPr lang="en-GB"/>
           </a:p>
@@ -515,7 +564,7 @@
           <a:p>
             <a:fld id="{D3A8DC05-A492-4925-AD9C-10E003E84CDB}" type="slidenum">
               <a:rPr lang="en-GB" smtClean="0"/>
-              <a:t>‹#›</a:t>
+              <a:t>‹nr.›</a:t>
             </a:fld>
             <a:endParaRPr lang="en-GB"/>
           </a:p>
@@ -671,7 +720,7 @@
           <a:p>
             <a:fld id="{09E97F70-84DE-42B7-9F34-EEF1D7EF4F70}" type="datetimeFigureOut">
               <a:rPr lang="en-GB" smtClean="0"/>
-              <a:t>29/02/2024</a:t>
+              <a:t>01/03/2024</a:t>
             </a:fld>
             <a:endParaRPr lang="en-GB"/>
           </a:p>
@@ -725,7 +774,7 @@
           <a:p>
             <a:fld id="{D3A8DC05-A492-4925-AD9C-10E003E84CDB}" type="slidenum">
               <a:rPr lang="en-GB" smtClean="0"/>
-              <a:t>‹#›</a:t>
+              <a:t>‹nr.›</a:t>
             </a:fld>
             <a:endParaRPr lang="en-GB"/>
           </a:p>
@@ -871,7 +920,7 @@
           <a:p>
             <a:fld id="{09E97F70-84DE-42B7-9F34-EEF1D7EF4F70}" type="datetimeFigureOut">
               <a:rPr lang="en-GB" smtClean="0"/>
-              <a:t>29/02/2024</a:t>
+              <a:t>01/03/2024</a:t>
             </a:fld>
             <a:endParaRPr lang="en-GB"/>
           </a:p>
@@ -925,7 +974,7 @@
           <a:p>
             <a:fld id="{D3A8DC05-A492-4925-AD9C-10E003E84CDB}" type="slidenum">
               <a:rPr lang="en-GB" smtClean="0"/>
-              <a:t>‹#›</a:t>
+              <a:t>‹nr.›</a:t>
             </a:fld>
             <a:endParaRPr lang="en-GB"/>
           </a:p>
@@ -1147,7 +1196,7 @@
           <a:p>
             <a:fld id="{09E97F70-84DE-42B7-9F34-EEF1D7EF4F70}" type="datetimeFigureOut">
               <a:rPr lang="en-GB" smtClean="0"/>
-              <a:t>29/02/2024</a:t>
+              <a:t>01/03/2024</a:t>
             </a:fld>
             <a:endParaRPr lang="en-GB"/>
           </a:p>
@@ -1201,7 +1250,7 @@
           <a:p>
             <a:fld id="{D3A8DC05-A492-4925-AD9C-10E003E84CDB}" type="slidenum">
               <a:rPr lang="en-GB" smtClean="0"/>
-              <a:t>‹#›</a:t>
+              <a:t>‹nr.›</a:t>
             </a:fld>
             <a:endParaRPr lang="en-GB"/>
           </a:p>
@@ -1415,7 +1464,7 @@
           <a:p>
             <a:fld id="{09E97F70-84DE-42B7-9F34-EEF1D7EF4F70}" type="datetimeFigureOut">
               <a:rPr lang="en-GB" smtClean="0"/>
-              <a:t>29/02/2024</a:t>
+              <a:t>01/03/2024</a:t>
             </a:fld>
             <a:endParaRPr lang="en-GB"/>
           </a:p>
@@ -1469,7 +1518,7 @@
           <a:p>
             <a:fld id="{D3A8DC05-A492-4925-AD9C-10E003E84CDB}" type="slidenum">
               <a:rPr lang="en-GB" smtClean="0"/>
-              <a:t>‹#›</a:t>
+              <a:t>‹nr.›</a:t>
             </a:fld>
             <a:endParaRPr lang="en-GB"/>
           </a:p>
@@ -1830,7 +1879,7 @@
           <a:p>
             <a:fld id="{09E97F70-84DE-42B7-9F34-EEF1D7EF4F70}" type="datetimeFigureOut">
               <a:rPr lang="en-GB" smtClean="0"/>
-              <a:t>29/02/2024</a:t>
+              <a:t>01/03/2024</a:t>
             </a:fld>
             <a:endParaRPr lang="en-GB"/>
           </a:p>
@@ -1884,7 +1933,7 @@
           <a:p>
             <a:fld id="{D3A8DC05-A492-4925-AD9C-10E003E84CDB}" type="slidenum">
               <a:rPr lang="en-GB" smtClean="0"/>
-              <a:t>‹#›</a:t>
+              <a:t>‹nr.›</a:t>
             </a:fld>
             <a:endParaRPr lang="en-GB"/>
           </a:p>
@@ -1972,7 +2021,7 @@
           <a:p>
             <a:fld id="{09E97F70-84DE-42B7-9F34-EEF1D7EF4F70}" type="datetimeFigureOut">
               <a:rPr lang="en-GB" smtClean="0"/>
-              <a:t>29/02/2024</a:t>
+              <a:t>01/03/2024</a:t>
             </a:fld>
             <a:endParaRPr lang="en-GB"/>
           </a:p>
@@ -2026,7 +2075,7 @@
           <a:p>
             <a:fld id="{D3A8DC05-A492-4925-AD9C-10E003E84CDB}" type="slidenum">
               <a:rPr lang="en-GB" smtClean="0"/>
-              <a:t>‹#›</a:t>
+              <a:t>‹nr.›</a:t>
             </a:fld>
             <a:endParaRPr lang="en-GB"/>
           </a:p>
@@ -2085,7 +2134,7 @@
           <a:p>
             <a:fld id="{09E97F70-84DE-42B7-9F34-EEF1D7EF4F70}" type="datetimeFigureOut">
               <a:rPr lang="en-GB" smtClean="0"/>
-              <a:t>29/02/2024</a:t>
+              <a:t>01/03/2024</a:t>
             </a:fld>
             <a:endParaRPr lang="en-GB"/>
           </a:p>
@@ -2139,7 +2188,7 @@
           <a:p>
             <a:fld id="{D3A8DC05-A492-4925-AD9C-10E003E84CDB}" type="slidenum">
               <a:rPr lang="en-GB" smtClean="0"/>
-              <a:t>‹#›</a:t>
+              <a:t>‹nr.›</a:t>
             </a:fld>
             <a:endParaRPr lang="en-GB"/>
           </a:p>
@@ -2398,7 +2447,7 @@
           <a:p>
             <a:fld id="{09E97F70-84DE-42B7-9F34-EEF1D7EF4F70}" type="datetimeFigureOut">
               <a:rPr lang="en-GB" smtClean="0"/>
-              <a:t>29/02/2024</a:t>
+              <a:t>01/03/2024</a:t>
             </a:fld>
             <a:endParaRPr lang="en-GB"/>
           </a:p>
@@ -2452,7 +2501,7 @@
           <a:p>
             <a:fld id="{D3A8DC05-A492-4925-AD9C-10E003E84CDB}" type="slidenum">
               <a:rPr lang="en-GB" smtClean="0"/>
-              <a:t>‹#›</a:t>
+              <a:t>‹nr.›</a:t>
             </a:fld>
             <a:endParaRPr lang="en-GB"/>
           </a:p>
@@ -2687,7 +2736,7 @@
           <a:p>
             <a:fld id="{09E97F70-84DE-42B7-9F34-EEF1D7EF4F70}" type="datetimeFigureOut">
               <a:rPr lang="en-GB" smtClean="0"/>
-              <a:t>29/02/2024</a:t>
+              <a:t>01/03/2024</a:t>
             </a:fld>
             <a:endParaRPr lang="en-GB"/>
           </a:p>
@@ -2741,7 +2790,7 @@
           <a:p>
             <a:fld id="{D3A8DC05-A492-4925-AD9C-10E003E84CDB}" type="slidenum">
               <a:rPr lang="en-GB" smtClean="0"/>
-              <a:t>‹#›</a:t>
+              <a:t>‹nr.›</a:t>
             </a:fld>
             <a:endParaRPr lang="en-GB"/>
           </a:p>
@@ -2930,7 +2979,7 @@
           <a:p>
             <a:fld id="{09E97F70-84DE-42B7-9F34-EEF1D7EF4F70}" type="datetimeFigureOut">
               <a:rPr lang="en-GB" smtClean="0"/>
-              <a:t>29/02/2024</a:t>
+              <a:t>01/03/2024</a:t>
             </a:fld>
             <a:endParaRPr lang="en-GB"/>
           </a:p>
@@ -3020,7 +3069,7 @@
           <a:p>
             <a:fld id="{D3A8DC05-A492-4925-AD9C-10E003E84CDB}" type="slidenum">
               <a:rPr lang="en-GB" smtClean="0"/>
-              <a:t>‹#›</a:t>
+              <a:t>‹nr.›</a:t>
             </a:fld>
             <a:endParaRPr lang="en-GB"/>
           </a:p>
@@ -3521,7 +3570,106 @@
                 <a:ea typeface="+mj-ea"/>
                 <a:cs typeface="+mj-cs"/>
               </a:rPr>
-              <a:t>: 0.056 eV/Å</a:t>
+              <a:t>: </a:t>
+            </a:r>
+            <a:br>
+              <a:rPr lang="en-US" sz="2000" kern="1200" dirty="0">
+                <a:solidFill>
+                  <a:schemeClr val="tx1"/>
+                </a:solidFill>
+                <a:latin typeface="+mj-lt"/>
+                <a:ea typeface="+mj-ea"/>
+                <a:cs typeface="+mj-cs"/>
+              </a:rPr>
+            </a:br>
+            <a:r>
+              <a:rPr lang="en-US" sz="2000" kern="1200" dirty="0">
+                <a:solidFill>
+                  <a:schemeClr val="tx1"/>
+                </a:solidFill>
+                <a:latin typeface="+mj-lt"/>
+                <a:ea typeface="+mj-ea"/>
+                <a:cs typeface="+mj-cs"/>
+              </a:rPr>
+              <a:t>0.0</a:t>
+            </a:r>
+            <a:r>
+              <a:rPr lang="en-US" sz="2000" dirty="0"/>
+              <a:t>0131</a:t>
+            </a:r>
+            <a:r>
+              <a:rPr lang="en-US" sz="2000" kern="1200" dirty="0">
+                <a:solidFill>
+                  <a:schemeClr val="tx1"/>
+                </a:solidFill>
+                <a:latin typeface="+mj-lt"/>
+                <a:ea typeface="+mj-ea"/>
+                <a:cs typeface="+mj-cs"/>
+              </a:rPr>
+              <a:t> Å</a:t>
+            </a:r>
+            <a:br>
+              <a:rPr lang="en-US" sz="2000" kern="1200" dirty="0">
+                <a:solidFill>
+                  <a:schemeClr val="tx1"/>
+                </a:solidFill>
+                <a:latin typeface="+mj-lt"/>
+                <a:ea typeface="+mj-ea"/>
+                <a:cs typeface="+mj-cs"/>
+              </a:rPr>
+            </a:br>
+            <a:br>
+              <a:rPr lang="en-US" sz="2000" kern="1200" dirty="0">
+                <a:solidFill>
+                  <a:schemeClr val="tx1"/>
+                </a:solidFill>
+                <a:latin typeface="+mj-lt"/>
+                <a:ea typeface="+mj-ea"/>
+                <a:cs typeface="+mj-cs"/>
+              </a:rPr>
+            </a:br>
+            <a:r>
+              <a:rPr lang="en-US" sz="2000" kern="1200" dirty="0" err="1">
+                <a:solidFill>
+                  <a:schemeClr val="tx1"/>
+                </a:solidFill>
+                <a:latin typeface="+mj-lt"/>
+                <a:ea typeface="+mj-ea"/>
+                <a:cs typeface="+mj-cs"/>
+              </a:rPr>
+              <a:t>mae</a:t>
+            </a:r>
+            <a:r>
+              <a:rPr lang="en-US" sz="2000" kern="1200" dirty="0">
+                <a:solidFill>
+                  <a:schemeClr val="tx1"/>
+                </a:solidFill>
+                <a:latin typeface="+mj-lt"/>
+                <a:ea typeface="+mj-ea"/>
+                <a:cs typeface="+mj-cs"/>
+              </a:rPr>
+              <a:t> at last pred: </a:t>
+            </a:r>
+            <a:br>
+              <a:rPr lang="en-US" sz="2000" kern="1200" dirty="0">
+                <a:solidFill>
+                  <a:schemeClr val="tx1"/>
+                </a:solidFill>
+                <a:latin typeface="+mj-lt"/>
+                <a:ea typeface="+mj-ea"/>
+                <a:cs typeface="+mj-cs"/>
+              </a:rPr>
+            </a:br>
+            <a:r>
+              <a:rPr lang="en-US" sz="2000" kern="1200" dirty="0">
+                <a:solidFill>
+                  <a:schemeClr val="tx1"/>
+                </a:solidFill>
+                <a:latin typeface="+mj-lt"/>
+                <a:ea typeface="+mj-ea"/>
+                <a:cs typeface="+mj-cs"/>
+              </a:rPr>
+              <a:t>0.0294 Å</a:t>
             </a:r>
             <a:endParaRPr lang="en-US" sz="3600" kern="1200" dirty="0">
               <a:solidFill>
@@ -3684,6 +3832,38 @@
               <a:t>mae</a:t>
             </a:r>
             <a:r>
+              <a:rPr lang="en-US" sz="2000" kern="1200">
+                <a:solidFill>
+                  <a:schemeClr val="tx1"/>
+                </a:solidFill>
+                <a:latin typeface="+mj-lt"/>
+                <a:ea typeface="+mj-ea"/>
+                <a:cs typeface="+mj-cs"/>
+              </a:rPr>
+              <a:t>: </a:t>
+            </a:r>
+            <a:br>
+              <a:rPr lang="en-US" sz="2000" kern="1200">
+                <a:solidFill>
+                  <a:schemeClr val="tx1"/>
+                </a:solidFill>
+                <a:latin typeface="+mj-lt"/>
+                <a:ea typeface="+mj-ea"/>
+                <a:cs typeface="+mj-cs"/>
+              </a:rPr>
+            </a:br>
+            <a:r>
+              <a:rPr lang="en-US" sz="2000" kern="1200">
+                <a:solidFill>
+                  <a:schemeClr val="tx1"/>
+                </a:solidFill>
+                <a:latin typeface="+mj-lt"/>
+                <a:ea typeface="+mj-ea"/>
+                <a:cs typeface="+mj-cs"/>
+              </a:rPr>
+              <a:t>0.012 </a:t>
+            </a:r>
+            <a:r>
               <a:rPr lang="en-US" sz="2000" kern="1200" dirty="0">
                 <a:solidFill>
                   <a:schemeClr val="tx1"/>
@@ -3692,7 +3872,7 @@
                 <a:ea typeface="+mj-ea"/>
                 <a:cs typeface="+mj-cs"/>
               </a:rPr>
-              <a:t>: 0.012 eV/Å</a:t>
+              <a:t>eV/Å</a:t>
             </a:r>
             <a:endParaRPr lang="en-US" sz="3600" kern="1200" dirty="0">
               <a:solidFill>

</xml_diff>

<commit_message>
ppt for subgroup meeting
</commit_message>
<xml_diff>
--- a/Master thesis/Meetings/06-03 Comparing model and simulation.pptx
+++ b/Master thesis/Meetings/06-03 Comparing model and simulation.pptx
@@ -6,11 +6,18 @@
   </p:sldMasterIdLst>
   <p:sldIdLst>
     <p:sldId id="256" r:id="rId2"/>
-    <p:sldId id="262" r:id="rId3"/>
-    <p:sldId id="263" r:id="rId4"/>
-    <p:sldId id="260" r:id="rId5"/>
-    <p:sldId id="261" r:id="rId6"/>
+    <p:sldId id="492" r:id="rId3"/>
+    <p:sldId id="493" r:id="rId4"/>
+    <p:sldId id="496" r:id="rId5"/>
+    <p:sldId id="498" r:id="rId6"/>
     <p:sldId id="259" r:id="rId7"/>
+    <p:sldId id="500" r:id="rId8"/>
+    <p:sldId id="501" r:id="rId9"/>
+    <p:sldId id="503" r:id="rId10"/>
+    <p:sldId id="494" r:id="rId11"/>
+    <p:sldId id="495" r:id="rId12"/>
+    <p:sldId id="502" r:id="rId13"/>
+    <p:sldId id="497" r:id="rId14"/>
   </p:sldIdLst>
   <p:sldSz cx="12192000" cy="6858000"/>
   <p:notesSz cx="6858000" cy="9144000"/>
@@ -318,7 +325,7 @@
           <a:p>
             <a:fld id="{09E97F70-84DE-42B7-9F34-EEF1D7EF4F70}" type="datetimeFigureOut">
               <a:rPr lang="en-GB" smtClean="0"/>
-              <a:t>04/03/2024</a:t>
+              <a:t>05/03/2024</a:t>
             </a:fld>
             <a:endParaRPr lang="en-GB"/>
           </a:p>
@@ -372,7 +379,7 @@
           <a:p>
             <a:fld id="{D3A8DC05-A492-4925-AD9C-10E003E84CDB}" type="slidenum">
               <a:rPr lang="en-GB" smtClean="0"/>
-              <a:t>‹nr.›</a:t>
+              <a:t>‹#›</a:t>
             </a:fld>
             <a:endParaRPr lang="en-GB"/>
           </a:p>
@@ -518,7 +525,7 @@
           <a:p>
             <a:fld id="{09E97F70-84DE-42B7-9F34-EEF1D7EF4F70}" type="datetimeFigureOut">
               <a:rPr lang="en-GB" smtClean="0"/>
-              <a:t>04/03/2024</a:t>
+              <a:t>05/03/2024</a:t>
             </a:fld>
             <a:endParaRPr lang="en-GB"/>
           </a:p>
@@ -572,7 +579,7 @@
           <a:p>
             <a:fld id="{D3A8DC05-A492-4925-AD9C-10E003E84CDB}" type="slidenum">
               <a:rPr lang="en-GB" smtClean="0"/>
-              <a:t>‹nr.›</a:t>
+              <a:t>‹#›</a:t>
             </a:fld>
             <a:endParaRPr lang="en-GB"/>
           </a:p>
@@ -728,7 +735,7 @@
           <a:p>
             <a:fld id="{09E97F70-84DE-42B7-9F34-EEF1D7EF4F70}" type="datetimeFigureOut">
               <a:rPr lang="en-GB" smtClean="0"/>
-              <a:t>04/03/2024</a:t>
+              <a:t>05/03/2024</a:t>
             </a:fld>
             <a:endParaRPr lang="en-GB"/>
           </a:p>
@@ -782,7 +789,7 @@
           <a:p>
             <a:fld id="{D3A8DC05-A492-4925-AD9C-10E003E84CDB}" type="slidenum">
               <a:rPr lang="en-GB" smtClean="0"/>
-              <a:t>‹nr.›</a:t>
+              <a:t>‹#›</a:t>
             </a:fld>
             <a:endParaRPr lang="en-GB"/>
           </a:p>
@@ -792,6 +799,253 @@
     <p:extLst>
       <p:ext uri="{BB962C8B-B14F-4D97-AF65-F5344CB8AC3E}">
         <p14:creationId xmlns:p14="http://schemas.microsoft.com/office/powerpoint/2010/main" val="1608595759"/>
+      </p:ext>
+    </p:extLst>
+  </p:cSld>
+  <p:clrMapOvr>
+    <a:masterClrMapping/>
+  </p:clrMapOvr>
+</p:sldLayout>
+</file>
+
+<file path=ppt/slideLayouts/slideLayout12.xml><?xml version="1.0" encoding="utf-8"?>
+<p:sldLayout xmlns:a="http://schemas.openxmlformats.org/drawingml/2006/main" xmlns:r="http://schemas.openxmlformats.org/officeDocument/2006/relationships" xmlns:p="http://schemas.openxmlformats.org/presentationml/2006/main" userDrawn="1">
+  <p:cSld name="Title, content, and image">
+    <p:spTree>
+      <p:nvGrpSpPr>
+        <p:cNvPr id="1" name=""/>
+        <p:cNvGrpSpPr/>
+        <p:nvPr/>
+      </p:nvGrpSpPr>
+      <p:grpSpPr>
+        <a:xfrm>
+          <a:off x="0" y="0"/>
+          <a:ext cx="0" cy="0"/>
+          <a:chOff x="0" y="0"/>
+          <a:chExt cx="0" cy="0"/>
+        </a:xfrm>
+      </p:grpSpPr>
+      <p:sp>
+        <p:nvSpPr>
+          <p:cNvPr id="8" name="Pladsholder til billede 9"/>
+          <p:cNvSpPr>
+            <a:spLocks noGrp="1"/>
+          </p:cNvSpPr>
+          <p:nvPr>
+            <p:ph type="pic" sz="quarter" idx="14" hasCustomPrompt="1"/>
+          </p:nvPr>
+        </p:nvSpPr>
+        <p:spPr>
+          <a:xfrm>
+            <a:off x="6244651" y="1628775"/>
+            <a:ext cx="5356800" cy="4672800"/>
+          </a:xfrm>
+          <a:solidFill>
+            <a:schemeClr val="bg1">
+              <a:lumMod val="75000"/>
+            </a:schemeClr>
+          </a:solidFill>
+        </p:spPr>
+        <p:txBody>
+          <a:bodyPr lIns="360000" tIns="1080000" rIns="360000" anchor="ctr" anchorCtr="0"/>
+          <a:lstStyle>
+            <a:lvl1pPr marL="0" indent="0" algn="ctr">
+              <a:buNone/>
+              <a:defRPr sz="2400" baseline="0">
+                <a:solidFill>
+                  <a:schemeClr val="bg1"/>
+                </a:solidFill>
+                <a:sym typeface="Wingdings" panose="05000000000000000000" pitchFamily="2" charset="2"/>
+              </a:defRPr>
+            </a:lvl1pPr>
+          </a:lstStyle>
+          <a:p>
+            <a:r>
+              <a:rPr lang="en-GB" dirty="0"/>
+              <a:t>Click icon to insert image</a:t>
+            </a:r>
+          </a:p>
+        </p:txBody>
+      </p:sp>
+      <p:sp>
+        <p:nvSpPr>
+          <p:cNvPr id="2" name="Titel 1"/>
+          <p:cNvSpPr>
+            <a:spLocks noGrp="1"/>
+          </p:cNvSpPr>
+          <p:nvPr>
+            <p:ph type="title" hasCustomPrompt="1"/>
+          </p:nvPr>
+        </p:nvSpPr>
+        <p:spPr>
+          <a:xfrm>
+            <a:off x="588965" y="620712"/>
+            <a:ext cx="11012486" cy="865187"/>
+          </a:xfrm>
+        </p:spPr>
+        <p:txBody>
+          <a:bodyPr/>
+          <a:lstStyle>
+            <a:lvl1pPr>
+              <a:defRPr b="0" i="0" baseline="0"/>
+            </a:lvl1pPr>
+          </a:lstStyle>
+          <a:p>
+            <a:pPr lvl="0"/>
+            <a:r>
+              <a:rPr lang="en-GB" dirty="0"/>
+              <a:t>Click to add title</a:t>
+            </a:r>
+          </a:p>
+        </p:txBody>
+      </p:sp>
+      <p:sp>
+        <p:nvSpPr>
+          <p:cNvPr id="3" name="Pladsholder til indhold 2"/>
+          <p:cNvSpPr>
+            <a:spLocks noGrp="1"/>
+          </p:cNvSpPr>
+          <p:nvPr>
+            <p:ph sz="half" idx="1" hasCustomPrompt="1"/>
+          </p:nvPr>
+        </p:nvSpPr>
+        <p:spPr>
+          <a:xfrm>
+            <a:off x="588964" y="1628775"/>
+            <a:ext cx="5356800" cy="4672800"/>
+          </a:xfrm>
+        </p:spPr>
+        <p:txBody>
+          <a:bodyPr vert="horz" lIns="0" tIns="0" rIns="0" bIns="0" rtlCol="0">
+            <a:noAutofit/>
+          </a:bodyPr>
+          <a:lstStyle>
+            <a:lvl1pPr>
+              <a:defRPr lang="da-DK" b="0" i="0" baseline="0" dirty="0" smtClean="0"/>
+            </a:lvl1pPr>
+            <a:lvl2pPr>
+              <a:defRPr lang="da-DK" b="0" i="0" baseline="0" dirty="0" smtClean="0"/>
+            </a:lvl2pPr>
+            <a:lvl3pPr>
+              <a:defRPr lang="da-DK" b="0" i="0" baseline="0" dirty="0" smtClean="0"/>
+            </a:lvl3pPr>
+            <a:lvl4pPr>
+              <a:defRPr lang="da-DK" dirty="0" smtClean="0"/>
+            </a:lvl4pPr>
+            <a:lvl5pPr>
+              <a:defRPr lang="da-DK" dirty="0"/>
+            </a:lvl5pPr>
+          </a:lstStyle>
+          <a:p>
+            <a:pPr lvl="0"/>
+            <a:r>
+              <a:rPr lang="en-GB" dirty="0"/>
+              <a:t>Click to add text</a:t>
+            </a:r>
+          </a:p>
+          <a:p>
+            <a:pPr lvl="1"/>
+            <a:r>
+              <a:rPr lang="en-GB" dirty="0" err="1"/>
+              <a:t>Andet</a:t>
+            </a:r>
+            <a:r>
+              <a:rPr lang="en-GB" dirty="0"/>
+              <a:t> </a:t>
+            </a:r>
+            <a:r>
+              <a:rPr lang="en-GB" dirty="0" err="1"/>
+              <a:t>niveau</a:t>
+            </a:r>
+            <a:endParaRPr lang="en-GB" dirty="0"/>
+          </a:p>
+          <a:p>
+            <a:pPr lvl="2"/>
+            <a:r>
+              <a:rPr lang="en-GB" dirty="0" err="1"/>
+              <a:t>Tredje</a:t>
+            </a:r>
+            <a:r>
+              <a:rPr lang="en-GB" dirty="0"/>
+              <a:t> </a:t>
+            </a:r>
+            <a:r>
+              <a:rPr lang="en-GB" dirty="0" err="1"/>
+              <a:t>niveau</a:t>
+            </a:r>
+            <a:endParaRPr lang="en-GB" dirty="0"/>
+          </a:p>
+        </p:txBody>
+      </p:sp>
+      <p:sp>
+        <p:nvSpPr>
+          <p:cNvPr id="5" name="Pladsholder til dato 4"/>
+          <p:cNvSpPr>
+            <a:spLocks noGrp="1"/>
+          </p:cNvSpPr>
+          <p:nvPr>
+            <p:ph type="dt" sz="half" idx="10"/>
+          </p:nvPr>
+        </p:nvSpPr>
+        <p:spPr/>
+        <p:txBody>
+          <a:bodyPr/>
+          <a:lstStyle/>
+          <a:p>
+            <a:fld id="{782CEA36-139A-4E3F-B6A0-7BD657AD45E8}" type="datetime1">
+              <a:rPr lang="en-GB" smtClean="0"/>
+              <a:t>05/03/2024</a:t>
+            </a:fld>
+            <a:endParaRPr lang="en-GB" dirty="0"/>
+          </a:p>
+        </p:txBody>
+      </p:sp>
+      <p:sp>
+        <p:nvSpPr>
+          <p:cNvPr id="6" name="Pladsholder til sidefod 5"/>
+          <p:cNvSpPr>
+            <a:spLocks noGrp="1"/>
+          </p:cNvSpPr>
+          <p:nvPr>
+            <p:ph type="ftr" sz="quarter" idx="11"/>
+          </p:nvPr>
+        </p:nvSpPr>
+        <p:spPr/>
+        <p:txBody>
+          <a:bodyPr/>
+          <a:lstStyle/>
+          <a:p>
+            <a:endParaRPr lang="en-GB" dirty="0"/>
+          </a:p>
+        </p:txBody>
+      </p:sp>
+      <p:sp>
+        <p:nvSpPr>
+          <p:cNvPr id="7" name="Pladsholder til slidenummer 6"/>
+          <p:cNvSpPr>
+            <a:spLocks noGrp="1"/>
+          </p:cNvSpPr>
+          <p:nvPr>
+            <p:ph type="sldNum" sz="quarter" idx="12"/>
+          </p:nvPr>
+        </p:nvSpPr>
+        <p:spPr/>
+        <p:txBody>
+          <a:bodyPr/>
+          <a:lstStyle/>
+          <a:p>
+            <a:fld id="{091A926C-488A-4E3E-9C21-57CAA120E114}" type="slidenum">
+              <a:rPr lang="en-GB" smtClean="0"/>
+              <a:t>‹#›</a:t>
+            </a:fld>
+            <a:endParaRPr lang="en-GB" dirty="0"/>
+          </a:p>
+        </p:txBody>
+      </p:sp>
+    </p:spTree>
+    <p:extLst>
+      <p:ext uri="{BB962C8B-B14F-4D97-AF65-F5344CB8AC3E}">
+        <p14:creationId xmlns:p14="http://schemas.microsoft.com/office/powerpoint/2010/main" val="2343346392"/>
       </p:ext>
     </p:extLst>
   </p:cSld>
@@ -928,7 +1182,7 @@
           <a:p>
             <a:fld id="{09E97F70-84DE-42B7-9F34-EEF1D7EF4F70}" type="datetimeFigureOut">
               <a:rPr lang="en-GB" smtClean="0"/>
-              <a:t>04/03/2024</a:t>
+              <a:t>05/03/2024</a:t>
             </a:fld>
             <a:endParaRPr lang="en-GB"/>
           </a:p>
@@ -982,7 +1236,7 @@
           <a:p>
             <a:fld id="{D3A8DC05-A492-4925-AD9C-10E003E84CDB}" type="slidenum">
               <a:rPr lang="en-GB" smtClean="0"/>
-              <a:t>‹nr.›</a:t>
+              <a:t>‹#›</a:t>
             </a:fld>
             <a:endParaRPr lang="en-GB"/>
           </a:p>
@@ -1204,7 +1458,7 @@
           <a:p>
             <a:fld id="{09E97F70-84DE-42B7-9F34-EEF1D7EF4F70}" type="datetimeFigureOut">
               <a:rPr lang="en-GB" smtClean="0"/>
-              <a:t>04/03/2024</a:t>
+              <a:t>05/03/2024</a:t>
             </a:fld>
             <a:endParaRPr lang="en-GB"/>
           </a:p>
@@ -1258,7 +1512,7 @@
           <a:p>
             <a:fld id="{D3A8DC05-A492-4925-AD9C-10E003E84CDB}" type="slidenum">
               <a:rPr lang="en-GB" smtClean="0"/>
-              <a:t>‹nr.›</a:t>
+              <a:t>‹#›</a:t>
             </a:fld>
             <a:endParaRPr lang="en-GB"/>
           </a:p>
@@ -1472,7 +1726,7 @@
           <a:p>
             <a:fld id="{09E97F70-84DE-42B7-9F34-EEF1D7EF4F70}" type="datetimeFigureOut">
               <a:rPr lang="en-GB" smtClean="0"/>
-              <a:t>04/03/2024</a:t>
+              <a:t>05/03/2024</a:t>
             </a:fld>
             <a:endParaRPr lang="en-GB"/>
           </a:p>
@@ -1526,7 +1780,7 @@
           <a:p>
             <a:fld id="{D3A8DC05-A492-4925-AD9C-10E003E84CDB}" type="slidenum">
               <a:rPr lang="en-GB" smtClean="0"/>
-              <a:t>‹nr.›</a:t>
+              <a:t>‹#›</a:t>
             </a:fld>
             <a:endParaRPr lang="en-GB"/>
           </a:p>
@@ -1887,7 +2141,7 @@
           <a:p>
             <a:fld id="{09E97F70-84DE-42B7-9F34-EEF1D7EF4F70}" type="datetimeFigureOut">
               <a:rPr lang="en-GB" smtClean="0"/>
-              <a:t>04/03/2024</a:t>
+              <a:t>05/03/2024</a:t>
             </a:fld>
             <a:endParaRPr lang="en-GB"/>
           </a:p>
@@ -1941,7 +2195,7 @@
           <a:p>
             <a:fld id="{D3A8DC05-A492-4925-AD9C-10E003E84CDB}" type="slidenum">
               <a:rPr lang="en-GB" smtClean="0"/>
-              <a:t>‹nr.›</a:t>
+              <a:t>‹#›</a:t>
             </a:fld>
             <a:endParaRPr lang="en-GB"/>
           </a:p>
@@ -2029,7 +2283,7 @@
           <a:p>
             <a:fld id="{09E97F70-84DE-42B7-9F34-EEF1D7EF4F70}" type="datetimeFigureOut">
               <a:rPr lang="en-GB" smtClean="0"/>
-              <a:t>04/03/2024</a:t>
+              <a:t>05/03/2024</a:t>
             </a:fld>
             <a:endParaRPr lang="en-GB"/>
           </a:p>
@@ -2083,7 +2337,7 @@
           <a:p>
             <a:fld id="{D3A8DC05-A492-4925-AD9C-10E003E84CDB}" type="slidenum">
               <a:rPr lang="en-GB" smtClean="0"/>
-              <a:t>‹nr.›</a:t>
+              <a:t>‹#›</a:t>
             </a:fld>
             <a:endParaRPr lang="en-GB"/>
           </a:p>
@@ -2142,7 +2396,7 @@
           <a:p>
             <a:fld id="{09E97F70-84DE-42B7-9F34-EEF1D7EF4F70}" type="datetimeFigureOut">
               <a:rPr lang="en-GB" smtClean="0"/>
-              <a:t>04/03/2024</a:t>
+              <a:t>05/03/2024</a:t>
             </a:fld>
             <a:endParaRPr lang="en-GB"/>
           </a:p>
@@ -2196,7 +2450,7 @@
           <a:p>
             <a:fld id="{D3A8DC05-A492-4925-AD9C-10E003E84CDB}" type="slidenum">
               <a:rPr lang="en-GB" smtClean="0"/>
-              <a:t>‹nr.›</a:t>
+              <a:t>‹#›</a:t>
             </a:fld>
             <a:endParaRPr lang="en-GB"/>
           </a:p>
@@ -2455,7 +2709,7 @@
           <a:p>
             <a:fld id="{09E97F70-84DE-42B7-9F34-EEF1D7EF4F70}" type="datetimeFigureOut">
               <a:rPr lang="en-GB" smtClean="0"/>
-              <a:t>04/03/2024</a:t>
+              <a:t>05/03/2024</a:t>
             </a:fld>
             <a:endParaRPr lang="en-GB"/>
           </a:p>
@@ -2509,7 +2763,7 @@
           <a:p>
             <a:fld id="{D3A8DC05-A492-4925-AD9C-10E003E84CDB}" type="slidenum">
               <a:rPr lang="en-GB" smtClean="0"/>
-              <a:t>‹nr.›</a:t>
+              <a:t>‹#›</a:t>
             </a:fld>
             <a:endParaRPr lang="en-GB"/>
           </a:p>
@@ -2744,7 +2998,7 @@
           <a:p>
             <a:fld id="{09E97F70-84DE-42B7-9F34-EEF1D7EF4F70}" type="datetimeFigureOut">
               <a:rPr lang="en-GB" smtClean="0"/>
-              <a:t>04/03/2024</a:t>
+              <a:t>05/03/2024</a:t>
             </a:fld>
             <a:endParaRPr lang="en-GB"/>
           </a:p>
@@ -2798,7 +3052,7 @@
           <a:p>
             <a:fld id="{D3A8DC05-A492-4925-AD9C-10E003E84CDB}" type="slidenum">
               <a:rPr lang="en-GB" smtClean="0"/>
-              <a:t>‹nr.›</a:t>
+              <a:t>‹#›</a:t>
             </a:fld>
             <a:endParaRPr lang="en-GB"/>
           </a:p>
@@ -2987,7 +3241,7 @@
           <a:p>
             <a:fld id="{09E97F70-84DE-42B7-9F34-EEF1D7EF4F70}" type="datetimeFigureOut">
               <a:rPr lang="en-GB" smtClean="0"/>
-              <a:t>04/03/2024</a:t>
+              <a:t>05/03/2024</a:t>
             </a:fld>
             <a:endParaRPr lang="en-GB"/>
           </a:p>
@@ -3077,7 +3331,7 @@
           <a:p>
             <a:fld id="{D3A8DC05-A492-4925-AD9C-10E003E84CDB}" type="slidenum">
               <a:rPr lang="en-GB" smtClean="0"/>
-              <a:t>‹nr.›</a:t>
+              <a:t>‹#›</a:t>
             </a:fld>
             <a:endParaRPr lang="en-GB"/>
           </a:p>
@@ -3103,6 +3357,7 @@
     <p:sldLayoutId id="2147483657" r:id="rId9"/>
     <p:sldLayoutId id="2147483658" r:id="rId10"/>
     <p:sldLayoutId id="2147483659" r:id="rId11"/>
+    <p:sldLayoutId id="2147483660" r:id="rId12"/>
   </p:sldLayoutIdLst>
   <p:txStyles>
     <p:titleStyle>
@@ -3471,6 +3726,454 @@
 </p:sld>
 </file>
 
+<file path=ppt/slides/slide10.xml><?xml version="1.0" encoding="utf-8"?>
+<p:sld xmlns:a="http://schemas.openxmlformats.org/drawingml/2006/main" xmlns:r="http://schemas.openxmlformats.org/officeDocument/2006/relationships" xmlns:p="http://schemas.openxmlformats.org/presentationml/2006/main">
+  <p:cSld>
+    <p:spTree>
+      <p:nvGrpSpPr>
+        <p:cNvPr id="1" name=""/>
+        <p:cNvGrpSpPr/>
+        <p:nvPr/>
+      </p:nvGrpSpPr>
+      <p:grpSpPr>
+        <a:xfrm>
+          <a:off x="0" y="0"/>
+          <a:ext cx="0" cy="0"/>
+          <a:chOff x="0" y="0"/>
+          <a:chExt cx="0" cy="0"/>
+        </a:xfrm>
+      </p:grpSpPr>
+      <p:sp>
+        <p:nvSpPr>
+          <p:cNvPr id="3" name="Title 2">
+            <a:extLst>
+              <a:ext uri="{FF2B5EF4-FFF2-40B4-BE49-F238E27FC236}">
+                <a16:creationId xmlns:a16="http://schemas.microsoft.com/office/drawing/2014/main" id="{7A19C08E-21AE-9330-A6AA-10242825EF6A}"/>
+              </a:ext>
+            </a:extLst>
+          </p:cNvPr>
+          <p:cNvSpPr>
+            <a:spLocks noGrp="1"/>
+          </p:cNvSpPr>
+          <p:nvPr>
+            <p:ph type="title"/>
+          </p:nvPr>
+        </p:nvSpPr>
+        <p:spPr>
+          <a:xfrm>
+            <a:off x="838200" y="184805"/>
+            <a:ext cx="10515600" cy="1505883"/>
+          </a:xfrm>
+        </p:spPr>
+        <p:txBody>
+          <a:bodyPr vert="horz" lIns="91440" tIns="45720" rIns="91440" bIns="45720" rtlCol="0" anchor="ctr">
+            <a:normAutofit/>
+          </a:bodyPr>
+          <a:lstStyle/>
+          <a:p>
+            <a:pPr algn="ctr"/>
+            <a:r>
+              <a:rPr lang="en-US" sz="5200" kern="1200" dirty="0">
+                <a:solidFill>
+                  <a:schemeClr val="tx1"/>
+                </a:solidFill>
+                <a:latin typeface="+mj-lt"/>
+                <a:ea typeface="+mj-ea"/>
+                <a:cs typeface="+mj-cs"/>
+              </a:rPr>
+              <a:t>MAE of positions at predicted steps</a:t>
+            </a:r>
+          </a:p>
+        </p:txBody>
+      </p:sp>
+      <p:pic>
+        <p:nvPicPr>
+          <p:cNvPr id="8" name="Picture 7">
+            <a:extLst>
+              <a:ext uri="{FF2B5EF4-FFF2-40B4-BE49-F238E27FC236}">
+                <a16:creationId xmlns:a16="http://schemas.microsoft.com/office/drawing/2014/main" id="{BD32B867-C520-A579-3E18-A0CDFCA5F996}"/>
+              </a:ext>
+            </a:extLst>
+          </p:cNvPr>
+          <p:cNvPicPr>
+            <a:picLocks noChangeAspect="1"/>
+          </p:cNvPicPr>
+          <p:nvPr/>
+        </p:nvPicPr>
+        <p:blipFill>
+          <a:blip r:embed="rId2"/>
+          <a:stretch>
+            <a:fillRect/>
+          </a:stretch>
+        </p:blipFill>
+        <p:spPr>
+          <a:xfrm>
+            <a:off x="3107693" y="1845426"/>
+            <a:ext cx="5973561" cy="4450303"/>
+          </a:xfrm>
+          <a:prstGeom prst="rect">
+            <a:avLst/>
+          </a:prstGeom>
+        </p:spPr>
+      </p:pic>
+    </p:spTree>
+    <p:extLst>
+      <p:ext uri="{BB962C8B-B14F-4D97-AF65-F5344CB8AC3E}">
+        <p14:creationId xmlns:p14="http://schemas.microsoft.com/office/powerpoint/2010/main" val="1215100649"/>
+      </p:ext>
+    </p:extLst>
+  </p:cSld>
+  <p:clrMapOvr>
+    <a:masterClrMapping/>
+  </p:clrMapOvr>
+</p:sld>
+</file>
+
+<file path=ppt/slides/slide11.xml><?xml version="1.0" encoding="utf-8"?>
+<p:sld xmlns:a="http://schemas.openxmlformats.org/drawingml/2006/main" xmlns:r="http://schemas.openxmlformats.org/officeDocument/2006/relationships" xmlns:p="http://schemas.openxmlformats.org/presentationml/2006/main">
+  <p:cSld>
+    <p:spTree>
+      <p:nvGrpSpPr>
+        <p:cNvPr id="1" name=""/>
+        <p:cNvGrpSpPr/>
+        <p:nvPr/>
+      </p:nvGrpSpPr>
+      <p:grpSpPr>
+        <a:xfrm>
+          <a:off x="0" y="0"/>
+          <a:ext cx="0" cy="0"/>
+          <a:chOff x="0" y="0"/>
+          <a:chExt cx="0" cy="0"/>
+        </a:xfrm>
+      </p:grpSpPr>
+      <p:sp>
+        <p:nvSpPr>
+          <p:cNvPr id="3" name="Title 2">
+            <a:extLst>
+              <a:ext uri="{FF2B5EF4-FFF2-40B4-BE49-F238E27FC236}">
+                <a16:creationId xmlns:a16="http://schemas.microsoft.com/office/drawing/2014/main" id="{7A19C08E-21AE-9330-A6AA-10242825EF6A}"/>
+              </a:ext>
+            </a:extLst>
+          </p:cNvPr>
+          <p:cNvSpPr>
+            <a:spLocks noGrp="1"/>
+          </p:cNvSpPr>
+          <p:nvPr>
+            <p:ph type="title"/>
+          </p:nvPr>
+        </p:nvSpPr>
+        <p:spPr>
+          <a:xfrm>
+            <a:off x="838200" y="184805"/>
+            <a:ext cx="10515600" cy="1505883"/>
+          </a:xfrm>
+        </p:spPr>
+        <p:txBody>
+          <a:bodyPr vert="horz" lIns="91440" tIns="45720" rIns="91440" bIns="45720" rtlCol="0" anchor="ctr">
+            <a:normAutofit/>
+          </a:bodyPr>
+          <a:lstStyle/>
+          <a:p>
+            <a:r>
+              <a:rPr lang="en-US" sz="5200" kern="1200">
+                <a:solidFill>
+                  <a:schemeClr val="tx1"/>
+                </a:solidFill>
+                <a:latin typeface="+mj-lt"/>
+                <a:ea typeface="+mj-ea"/>
+                <a:cs typeface="+mj-cs"/>
+              </a:rPr>
+              <a:t>MAE of positions at predicted steps</a:t>
+            </a:r>
+          </a:p>
+        </p:txBody>
+      </p:sp>
+      <p:pic>
+        <p:nvPicPr>
+          <p:cNvPr id="8" name="Picture 7">
+            <a:extLst>
+              <a:ext uri="{FF2B5EF4-FFF2-40B4-BE49-F238E27FC236}">
+                <a16:creationId xmlns:a16="http://schemas.microsoft.com/office/drawing/2014/main" id="{BD32B867-C520-A579-3E18-A0CDFCA5F996}"/>
+              </a:ext>
+            </a:extLst>
+          </p:cNvPr>
+          <p:cNvPicPr>
+            <a:picLocks noChangeAspect="1"/>
+          </p:cNvPicPr>
+          <p:nvPr/>
+        </p:nvPicPr>
+        <p:blipFill>
+          <a:blip r:embed="rId2">
+            <a:extLst>
+              <a:ext uri="{28A0092B-C50C-407E-A947-70E740481C1C}">
+                <a14:useLocalDpi xmlns:a14="http://schemas.microsoft.com/office/drawing/2010/main" val="0"/>
+              </a:ext>
+            </a:extLst>
+          </a:blip>
+          <a:srcRect/>
+          <a:stretch/>
+        </p:blipFill>
+        <p:spPr>
+          <a:xfrm>
+            <a:off x="3107693" y="1888792"/>
+            <a:ext cx="5973561" cy="4363571"/>
+          </a:xfrm>
+          <a:prstGeom prst="rect">
+            <a:avLst/>
+          </a:prstGeom>
+        </p:spPr>
+      </p:pic>
+    </p:spTree>
+    <p:extLst>
+      <p:ext uri="{BB962C8B-B14F-4D97-AF65-F5344CB8AC3E}">
+        <p14:creationId xmlns:p14="http://schemas.microsoft.com/office/powerpoint/2010/main" val="3211767963"/>
+      </p:ext>
+    </p:extLst>
+  </p:cSld>
+  <p:clrMapOvr>
+    <a:masterClrMapping/>
+  </p:clrMapOvr>
+</p:sld>
+</file>
+
+<file path=ppt/slides/slide12.xml><?xml version="1.0" encoding="utf-8"?>
+<p:sld xmlns:a="http://schemas.openxmlformats.org/drawingml/2006/main" xmlns:r="http://schemas.openxmlformats.org/officeDocument/2006/relationships" xmlns:p="http://schemas.openxmlformats.org/presentationml/2006/main">
+  <p:cSld>
+    <p:bg>
+      <p:bgPr>
+        <a:solidFill>
+          <a:schemeClr val="bg1"/>
+        </a:solidFill>
+        <a:effectLst/>
+      </p:bgPr>
+    </p:bg>
+    <p:spTree>
+      <p:nvGrpSpPr>
+        <p:cNvPr id="1" name=""/>
+        <p:cNvGrpSpPr/>
+        <p:nvPr/>
+      </p:nvGrpSpPr>
+      <p:grpSpPr>
+        <a:xfrm>
+          <a:off x="0" y="0"/>
+          <a:ext cx="0" cy="0"/>
+          <a:chOff x="0" y="0"/>
+          <a:chExt cx="0" cy="0"/>
+        </a:xfrm>
+      </p:grpSpPr>
+      <p:pic>
+        <p:nvPicPr>
+          <p:cNvPr id="8" name="Picture Placeholder 7">
+            <a:extLst>
+              <a:ext uri="{FF2B5EF4-FFF2-40B4-BE49-F238E27FC236}">
+                <a16:creationId xmlns:a16="http://schemas.microsoft.com/office/drawing/2014/main" id="{AF960803-454D-1722-37C2-81DA9370B89D}"/>
+              </a:ext>
+            </a:extLst>
+          </p:cNvPr>
+          <p:cNvPicPr>
+            <a:picLocks noGrp="1" noChangeAspect="1"/>
+          </p:cNvPicPr>
+          <p:nvPr>
+            <p:ph type="pic" sz="quarter" idx="14"/>
+          </p:nvPr>
+        </p:nvPicPr>
+        <p:blipFill>
+          <a:blip r:embed="rId2"/>
+          <a:stretch/>
+        </p:blipFill>
+        <p:spPr>
+          <a:xfrm>
+            <a:off x="2306158" y="643466"/>
+            <a:ext cx="7579683" cy="5571067"/>
+          </a:xfrm>
+          <a:prstGeom prst="rect">
+            <a:avLst/>
+          </a:prstGeom>
+        </p:spPr>
+      </p:pic>
+    </p:spTree>
+    <p:extLst>
+      <p:ext uri="{BB962C8B-B14F-4D97-AF65-F5344CB8AC3E}">
+        <p14:creationId xmlns:p14="http://schemas.microsoft.com/office/powerpoint/2010/main" val="2382153416"/>
+      </p:ext>
+    </p:extLst>
+  </p:cSld>
+  <p:clrMapOvr>
+    <a:masterClrMapping/>
+  </p:clrMapOvr>
+</p:sld>
+</file>
+
+<file path=ppt/slides/slide13.xml><?xml version="1.0" encoding="utf-8"?>
+<p:sld xmlns:a="http://schemas.openxmlformats.org/drawingml/2006/main" xmlns:r="http://schemas.openxmlformats.org/officeDocument/2006/relationships" xmlns:p="http://schemas.openxmlformats.org/presentationml/2006/main">
+  <p:cSld>
+    <p:bg>
+      <p:bgPr>
+        <a:solidFill>
+          <a:schemeClr val="bg1"/>
+        </a:solidFill>
+        <a:effectLst/>
+      </p:bgPr>
+    </p:bg>
+    <p:spTree>
+      <p:nvGrpSpPr>
+        <p:cNvPr id="1" name=""/>
+        <p:cNvGrpSpPr/>
+        <p:nvPr/>
+      </p:nvGrpSpPr>
+      <p:grpSpPr>
+        <a:xfrm>
+          <a:off x="0" y="0"/>
+          <a:ext cx="0" cy="0"/>
+          <a:chOff x="0" y="0"/>
+          <a:chExt cx="0" cy="0"/>
+        </a:xfrm>
+      </p:grpSpPr>
+      <p:sp useBgFill="1">
+        <p:nvSpPr>
+          <p:cNvPr id="13" name="Rectangle 12">
+            <a:extLst>
+              <a:ext uri="{FF2B5EF4-FFF2-40B4-BE49-F238E27FC236}">
+                <a16:creationId xmlns:a16="http://schemas.microsoft.com/office/drawing/2014/main" id="{53F29798-D584-4792-9B62-3F5F5C36D619}"/>
+              </a:ext>
+              <a:ext uri="{C183D7F6-B498-43B3-948B-1728B52AA6E4}">
+                <adec:decorative xmlns:adec="http://schemas.microsoft.com/office/drawing/2017/decorative" val="1"/>
+              </a:ext>
+            </a:extLst>
+          </p:cNvPr>
+          <p:cNvSpPr>
+            <a:spLocks noGrp="1" noRot="1" noChangeAspect="1" noMove="1" noResize="1" noEditPoints="1" noAdjustHandles="1" noChangeArrowheads="1" noChangeShapeType="1" noTextEdit="1"/>
+          </p:cNvSpPr>
+          <p:nvPr>
+            <p:extLst>
+              <p:ext uri="{386F3935-93C4-4BCD-93E2-E3B085C9AB24}">
+                <p16:designElem xmlns:p16="http://schemas.microsoft.com/office/powerpoint/2015/main" val="1"/>
+              </p:ext>
+            </p:extLst>
+          </p:nvPr>
+        </p:nvSpPr>
+        <p:spPr>
+          <a:xfrm>
+            <a:off x="0" y="0"/>
+            <a:ext cx="12188952" cy="6858000"/>
+          </a:xfrm>
+          <a:prstGeom prst="rect">
+            <a:avLst/>
+          </a:prstGeom>
+          <a:ln>
+            <a:noFill/>
+          </a:ln>
+        </p:spPr>
+        <p:style>
+          <a:lnRef idx="2">
+            <a:schemeClr val="accent1">
+              <a:shade val="50000"/>
+            </a:schemeClr>
+          </a:lnRef>
+          <a:fillRef idx="1">
+            <a:schemeClr val="accent1"/>
+          </a:fillRef>
+          <a:effectRef idx="0">
+            <a:schemeClr val="accent1"/>
+          </a:effectRef>
+          <a:fontRef idx="minor">
+            <a:schemeClr val="lt1"/>
+          </a:fontRef>
+        </p:style>
+        <p:txBody>
+          <a:bodyPr rtlCol="0" anchor="ctr"/>
+          <a:lstStyle/>
+          <a:p>
+            <a:pPr algn="ctr"/>
+            <a:endParaRPr lang="en-US"/>
+          </a:p>
+        </p:txBody>
+      </p:sp>
+      <p:sp>
+        <p:nvSpPr>
+          <p:cNvPr id="3" name="Title 2">
+            <a:extLst>
+              <a:ext uri="{FF2B5EF4-FFF2-40B4-BE49-F238E27FC236}">
+                <a16:creationId xmlns:a16="http://schemas.microsoft.com/office/drawing/2014/main" id="{1A62183C-BF12-69F1-BF43-FBE7565F7B8F}"/>
+              </a:ext>
+            </a:extLst>
+          </p:cNvPr>
+          <p:cNvSpPr>
+            <a:spLocks noGrp="1"/>
+          </p:cNvSpPr>
+          <p:nvPr>
+            <p:ph type="title"/>
+          </p:nvPr>
+        </p:nvSpPr>
+        <p:spPr>
+          <a:xfrm>
+            <a:off x="838200" y="184805"/>
+            <a:ext cx="10515600" cy="1505883"/>
+          </a:xfrm>
+        </p:spPr>
+        <p:txBody>
+          <a:bodyPr vert="horz" lIns="91440" tIns="45720" rIns="91440" bIns="45720" rtlCol="0" anchor="ctr">
+            <a:normAutofit/>
+          </a:bodyPr>
+          <a:lstStyle/>
+          <a:p>
+            <a:r>
+              <a:rPr lang="en-US" sz="4800" kern="1200">
+                <a:solidFill>
+                  <a:schemeClr val="tx1"/>
+                </a:solidFill>
+                <a:latin typeface="+mj-lt"/>
+                <a:ea typeface="+mj-ea"/>
+                <a:cs typeface="+mj-cs"/>
+              </a:rPr>
+              <a:t>Force trajectory of simulation and model</a:t>
+            </a:r>
+          </a:p>
+        </p:txBody>
+      </p:sp>
+      <p:pic>
+        <p:nvPicPr>
+          <p:cNvPr id="8" name="Picture 7">
+            <a:extLst>
+              <a:ext uri="{FF2B5EF4-FFF2-40B4-BE49-F238E27FC236}">
+                <a16:creationId xmlns:a16="http://schemas.microsoft.com/office/drawing/2014/main" id="{7C2CFB03-2097-7187-65AD-615E8CD738B4}"/>
+              </a:ext>
+            </a:extLst>
+          </p:cNvPr>
+          <p:cNvPicPr>
+            <a:picLocks noChangeAspect="1"/>
+          </p:cNvPicPr>
+          <p:nvPr/>
+        </p:nvPicPr>
+        <p:blipFill>
+          <a:blip r:embed="rId2"/>
+          <a:stretch>
+            <a:fillRect/>
+          </a:stretch>
+        </p:blipFill>
+        <p:spPr>
+          <a:xfrm>
+            <a:off x="2519933" y="1845426"/>
+            <a:ext cx="7149081" cy="4450303"/>
+          </a:xfrm>
+          <a:prstGeom prst="rect">
+            <a:avLst/>
+          </a:prstGeom>
+        </p:spPr>
+      </p:pic>
+    </p:spTree>
+    <p:extLst>
+      <p:ext uri="{BB962C8B-B14F-4D97-AF65-F5344CB8AC3E}">
+        <p14:creationId xmlns:p14="http://schemas.microsoft.com/office/powerpoint/2010/main" val="1613750500"/>
+      </p:ext>
+    </p:extLst>
+  </p:cSld>
+  <p:clrMapOvr>
+    <a:masterClrMapping/>
+  </p:clrMapOvr>
+</p:sld>
+</file>
+
 <file path=ppt/slides/slide2.xml><?xml version="1.0" encoding="utf-8"?>
 <p:sld xmlns:a="http://schemas.openxmlformats.org/drawingml/2006/main" xmlns:r="http://schemas.openxmlformats.org/officeDocument/2006/relationships" xmlns:p="http://schemas.openxmlformats.org/presentationml/2006/main">
   <p:cSld>
@@ -3490,10 +4193,10 @@
       </p:grpSpPr>
       <p:sp>
         <p:nvSpPr>
-          <p:cNvPr id="7" name="Title 1">
-            <a:extLst>
-              <a:ext uri="{FF2B5EF4-FFF2-40B4-BE49-F238E27FC236}">
-                <a16:creationId xmlns:a16="http://schemas.microsoft.com/office/drawing/2014/main" id="{1092B001-612C-064D-8731-B535569F220A}"/>
+          <p:cNvPr id="3" name="Title 2">
+            <a:extLst>
+              <a:ext uri="{FF2B5EF4-FFF2-40B4-BE49-F238E27FC236}">
+                <a16:creationId xmlns:a16="http://schemas.microsoft.com/office/drawing/2014/main" id="{A3FA7ABA-9506-6B9C-9BC7-8531077BAFC4}"/>
               </a:ext>
             </a:extLst>
           </p:cNvPr>
@@ -3504,270 +4207,1961 @@
             <p:ph type="title"/>
           </p:nvPr>
         </p:nvSpPr>
+        <p:spPr/>
+        <p:txBody>
+          <a:bodyPr/>
+          <a:lstStyle/>
+          <a:p>
+            <a:r>
+              <a:rPr lang="da-DK" dirty="0"/>
+              <a:t>OLS regularization</a:t>
+            </a:r>
+            <a:endParaRPr lang="en-GB" dirty="0"/>
+          </a:p>
+        </p:txBody>
+      </p:sp>
+      <mc:AlternateContent xmlns:mc="http://schemas.openxmlformats.org/markup-compatibility/2006">
+        <mc:Choice xmlns:a14="http://schemas.microsoft.com/office/drawing/2010/main" Requires="a14">
+          <p:sp>
+            <p:nvSpPr>
+              <p:cNvPr id="4" name="Content Placeholder 3">
+                <a:extLst>
+                  <a:ext uri="{FF2B5EF4-FFF2-40B4-BE49-F238E27FC236}">
+                    <a16:creationId xmlns:a16="http://schemas.microsoft.com/office/drawing/2014/main" id="{9D491D46-254D-9BAD-982D-9800866E0F29}"/>
+                  </a:ext>
+                </a:extLst>
+              </p:cNvPr>
+              <p:cNvSpPr>
+                <a:spLocks noGrp="1"/>
+              </p:cNvSpPr>
+              <p:nvPr>
+                <p:ph sz="half" idx="1"/>
+              </p:nvPr>
+            </p:nvSpPr>
+            <p:spPr/>
+            <p:txBody>
+              <a:bodyPr/>
+              <a:lstStyle/>
+              <a:p>
+                <a:pPr>
+                  <a:lnSpc>
+                    <a:spcPct val="150000"/>
+                  </a:lnSpc>
+                </a:pPr>
+                <a:r>
+                  <a:rPr lang="da-DK" dirty="0"/>
+                  <a:t>Create AR(2) function</a:t>
+                </a:r>
+              </a:p>
+              <a:p>
+                <a:pPr lvl="1">
+                  <a:lnSpc>
+                    <a:spcPct val="150000"/>
+                  </a:lnSpc>
+                </a:pPr>
+                <a14:m>
+                  <m:oMath xmlns:m="http://schemas.openxmlformats.org/officeDocument/2006/math">
+                    <m:sSub>
+                      <m:sSubPr>
+                        <m:ctrlPr>
+                          <a:rPr lang="en-GB" sz="2400" i="1" kern="100" smtClean="0">
+                            <a:effectLst/>
+                            <a:latin typeface="Cambria Math" panose="02040503050406030204" pitchFamily="18" charset="0"/>
+                            <a:ea typeface="Calibri" panose="020F0502020204030204" pitchFamily="34" charset="0"/>
+                            <a:cs typeface="Times New Roman" panose="02020603050405020304" pitchFamily="18" charset="0"/>
+                          </a:rPr>
+                        </m:ctrlPr>
+                      </m:sSubPr>
+                      <m:e>
+                        <m:r>
+                          <a:rPr lang="en-GB" sz="2400" i="1" kern="100">
+                            <a:effectLst/>
+                            <a:latin typeface="Cambria Math" panose="02040503050406030204" pitchFamily="18" charset="0"/>
+                            <a:ea typeface="Calibri" panose="020F0502020204030204" pitchFamily="34" charset="0"/>
+                            <a:cs typeface="Times New Roman" panose="02020603050405020304" pitchFamily="18" charset="0"/>
+                          </a:rPr>
+                          <m:t>𝑥</m:t>
+                        </m:r>
+                      </m:e>
+                      <m:sub>
+                        <m:r>
+                          <a:rPr lang="en-GB" sz="2400" i="1" kern="100">
+                            <a:effectLst/>
+                            <a:latin typeface="Cambria Math" panose="02040503050406030204" pitchFamily="18" charset="0"/>
+                            <a:ea typeface="Calibri" panose="020F0502020204030204" pitchFamily="34" charset="0"/>
+                            <a:cs typeface="Times New Roman" panose="02020603050405020304" pitchFamily="18" charset="0"/>
+                          </a:rPr>
+                          <m:t>𝑡</m:t>
+                        </m:r>
+                      </m:sub>
+                    </m:sSub>
+                    <m:r>
+                      <a:rPr lang="en-GB" sz="2400" i="1" kern="100">
+                        <a:effectLst/>
+                        <a:latin typeface="Cambria Math" panose="02040503050406030204" pitchFamily="18" charset="0"/>
+                        <a:ea typeface="Calibri" panose="020F0502020204030204" pitchFamily="34" charset="0"/>
+                        <a:cs typeface="Times New Roman" panose="02020603050405020304" pitchFamily="18" charset="0"/>
+                      </a:rPr>
+                      <m:t>=</m:t>
+                    </m:r>
+                    <m:sSub>
+                      <m:sSubPr>
+                        <m:ctrlPr>
+                          <a:rPr lang="en-GB" sz="2400" i="1" kern="100">
+                            <a:effectLst/>
+                            <a:latin typeface="Cambria Math" panose="02040503050406030204" pitchFamily="18" charset="0"/>
+                            <a:ea typeface="Calibri" panose="020F0502020204030204" pitchFamily="34" charset="0"/>
+                            <a:cs typeface="Times New Roman" panose="02020603050405020304" pitchFamily="18" charset="0"/>
+                          </a:rPr>
+                        </m:ctrlPr>
+                      </m:sSubPr>
+                      <m:e>
+                        <m:r>
+                          <a:rPr lang="en-GB" sz="2400" i="1" kern="100">
+                            <a:effectLst/>
+                            <a:latin typeface="Cambria Math" panose="02040503050406030204" pitchFamily="18" charset="0"/>
+                            <a:ea typeface="Calibri" panose="020F0502020204030204" pitchFamily="34" charset="0"/>
+                            <a:cs typeface="Times New Roman" panose="02020603050405020304" pitchFamily="18" charset="0"/>
+                          </a:rPr>
+                          <m:t>𝑎</m:t>
+                        </m:r>
+                      </m:e>
+                      <m:sub>
+                        <m:r>
+                          <a:rPr lang="en-GB" sz="2400" i="1" kern="100">
+                            <a:effectLst/>
+                            <a:latin typeface="Cambria Math" panose="02040503050406030204" pitchFamily="18" charset="0"/>
+                            <a:ea typeface="Calibri" panose="020F0502020204030204" pitchFamily="34" charset="0"/>
+                            <a:cs typeface="Times New Roman" panose="02020603050405020304" pitchFamily="18" charset="0"/>
+                          </a:rPr>
+                          <m:t>1</m:t>
+                        </m:r>
+                      </m:sub>
+                    </m:sSub>
+                    <m:sSub>
+                      <m:sSubPr>
+                        <m:ctrlPr>
+                          <a:rPr lang="en-GB" sz="2400" i="1" kern="100">
+                            <a:effectLst/>
+                            <a:latin typeface="Cambria Math" panose="02040503050406030204" pitchFamily="18" charset="0"/>
+                            <a:ea typeface="Calibri" panose="020F0502020204030204" pitchFamily="34" charset="0"/>
+                            <a:cs typeface="Times New Roman" panose="02020603050405020304" pitchFamily="18" charset="0"/>
+                          </a:rPr>
+                        </m:ctrlPr>
+                      </m:sSubPr>
+                      <m:e>
+                        <m:r>
+                          <a:rPr lang="en-GB" sz="2400" i="1" kern="100">
+                            <a:effectLst/>
+                            <a:latin typeface="Cambria Math" panose="02040503050406030204" pitchFamily="18" charset="0"/>
+                            <a:ea typeface="Calibri" panose="020F0502020204030204" pitchFamily="34" charset="0"/>
+                            <a:cs typeface="Times New Roman" panose="02020603050405020304" pitchFamily="18" charset="0"/>
+                          </a:rPr>
+                          <m:t>𝑥</m:t>
+                        </m:r>
+                      </m:e>
+                      <m:sub>
+                        <m:r>
+                          <a:rPr lang="en-GB" sz="2400" i="1" kern="100">
+                            <a:effectLst/>
+                            <a:latin typeface="Cambria Math" panose="02040503050406030204" pitchFamily="18" charset="0"/>
+                            <a:ea typeface="Calibri" panose="020F0502020204030204" pitchFamily="34" charset="0"/>
+                            <a:cs typeface="Times New Roman" panose="02020603050405020304" pitchFamily="18" charset="0"/>
+                          </a:rPr>
+                          <m:t>𝑡</m:t>
+                        </m:r>
+                        <m:r>
+                          <a:rPr lang="en-GB" sz="2400" i="1" kern="100">
+                            <a:effectLst/>
+                            <a:latin typeface="Cambria Math" panose="02040503050406030204" pitchFamily="18" charset="0"/>
+                            <a:ea typeface="Calibri" panose="020F0502020204030204" pitchFamily="34" charset="0"/>
+                            <a:cs typeface="Times New Roman" panose="02020603050405020304" pitchFamily="18" charset="0"/>
+                          </a:rPr>
+                          <m:t>−1</m:t>
+                        </m:r>
+                      </m:sub>
+                    </m:sSub>
+                    <m:r>
+                      <a:rPr lang="en-GB" sz="2400" i="1" kern="100">
+                        <a:effectLst/>
+                        <a:latin typeface="Cambria Math" panose="02040503050406030204" pitchFamily="18" charset="0"/>
+                        <a:ea typeface="Calibri" panose="020F0502020204030204" pitchFamily="34" charset="0"/>
+                        <a:cs typeface="Times New Roman" panose="02020603050405020304" pitchFamily="18" charset="0"/>
+                      </a:rPr>
+                      <m:t>+</m:t>
+                    </m:r>
+                    <m:sSub>
+                      <m:sSubPr>
+                        <m:ctrlPr>
+                          <a:rPr lang="en-GB" sz="2400" i="1" kern="100">
+                            <a:effectLst/>
+                            <a:latin typeface="Cambria Math" panose="02040503050406030204" pitchFamily="18" charset="0"/>
+                            <a:ea typeface="Calibri" panose="020F0502020204030204" pitchFamily="34" charset="0"/>
+                            <a:cs typeface="Times New Roman" panose="02020603050405020304" pitchFamily="18" charset="0"/>
+                          </a:rPr>
+                        </m:ctrlPr>
+                      </m:sSubPr>
+                      <m:e>
+                        <m:r>
+                          <a:rPr lang="en-GB" sz="2400" i="1" kern="100">
+                            <a:effectLst/>
+                            <a:latin typeface="Cambria Math" panose="02040503050406030204" pitchFamily="18" charset="0"/>
+                            <a:ea typeface="Calibri" panose="020F0502020204030204" pitchFamily="34" charset="0"/>
+                            <a:cs typeface="Times New Roman" panose="02020603050405020304" pitchFamily="18" charset="0"/>
+                          </a:rPr>
+                          <m:t>𝑎</m:t>
+                        </m:r>
+                      </m:e>
+                      <m:sub>
+                        <m:r>
+                          <a:rPr lang="en-GB" sz="2400" i="1" kern="100">
+                            <a:effectLst/>
+                            <a:latin typeface="Cambria Math" panose="02040503050406030204" pitchFamily="18" charset="0"/>
+                            <a:ea typeface="Calibri" panose="020F0502020204030204" pitchFamily="34" charset="0"/>
+                            <a:cs typeface="Times New Roman" panose="02020603050405020304" pitchFamily="18" charset="0"/>
+                          </a:rPr>
+                          <m:t>2</m:t>
+                        </m:r>
+                      </m:sub>
+                    </m:sSub>
+                    <m:sSub>
+                      <m:sSubPr>
+                        <m:ctrlPr>
+                          <a:rPr lang="en-GB" sz="2400" i="1" kern="100">
+                            <a:effectLst/>
+                            <a:latin typeface="Cambria Math" panose="02040503050406030204" pitchFamily="18" charset="0"/>
+                            <a:ea typeface="Calibri" panose="020F0502020204030204" pitchFamily="34" charset="0"/>
+                            <a:cs typeface="Times New Roman" panose="02020603050405020304" pitchFamily="18" charset="0"/>
+                          </a:rPr>
+                        </m:ctrlPr>
+                      </m:sSubPr>
+                      <m:e>
+                        <m:r>
+                          <a:rPr lang="en-GB" sz="2400" i="1" kern="100">
+                            <a:effectLst/>
+                            <a:latin typeface="Cambria Math" panose="02040503050406030204" pitchFamily="18" charset="0"/>
+                            <a:ea typeface="Calibri" panose="020F0502020204030204" pitchFamily="34" charset="0"/>
+                            <a:cs typeface="Times New Roman" panose="02020603050405020304" pitchFamily="18" charset="0"/>
+                          </a:rPr>
+                          <m:t>𝑥</m:t>
+                        </m:r>
+                      </m:e>
+                      <m:sub>
+                        <m:r>
+                          <a:rPr lang="en-GB" sz="2400" i="1" kern="100">
+                            <a:effectLst/>
+                            <a:latin typeface="Cambria Math" panose="02040503050406030204" pitchFamily="18" charset="0"/>
+                            <a:ea typeface="Calibri" panose="020F0502020204030204" pitchFamily="34" charset="0"/>
+                            <a:cs typeface="Times New Roman" panose="02020603050405020304" pitchFamily="18" charset="0"/>
+                          </a:rPr>
+                          <m:t>𝑡</m:t>
+                        </m:r>
+                        <m:r>
+                          <a:rPr lang="en-GB" sz="2400" i="1" kern="100">
+                            <a:effectLst/>
+                            <a:latin typeface="Cambria Math" panose="02040503050406030204" pitchFamily="18" charset="0"/>
+                            <a:ea typeface="Calibri" panose="020F0502020204030204" pitchFamily="34" charset="0"/>
+                            <a:cs typeface="Times New Roman" panose="02020603050405020304" pitchFamily="18" charset="0"/>
+                          </a:rPr>
+                          <m:t>−2</m:t>
+                        </m:r>
+                      </m:sub>
+                    </m:sSub>
+                    <m:r>
+                      <a:rPr lang="en-GB" sz="2400" i="1" kern="100">
+                        <a:effectLst/>
+                        <a:latin typeface="Cambria Math" panose="02040503050406030204" pitchFamily="18" charset="0"/>
+                        <a:ea typeface="Calibri" panose="020F0502020204030204" pitchFamily="34" charset="0"/>
+                        <a:cs typeface="Times New Roman" panose="02020603050405020304" pitchFamily="18" charset="0"/>
+                      </a:rPr>
+                      <m:t>+</m:t>
+                    </m:r>
+                    <m:r>
+                      <a:rPr lang="en-GB" sz="2400" i="1" kern="100" smtClean="0">
+                        <a:effectLst/>
+                        <a:latin typeface="Cambria Math" panose="02040503050406030204" pitchFamily="18" charset="0"/>
+                        <a:ea typeface="Calibri" panose="020F0502020204030204" pitchFamily="34" charset="0"/>
+                        <a:cs typeface="Times New Roman" panose="02020603050405020304" pitchFamily="18" charset="0"/>
+                      </a:rPr>
+                      <m:t>𝑐</m:t>
+                    </m:r>
+                  </m:oMath>
+                </a14:m>
+                <a:endParaRPr lang="da-DK" dirty="0"/>
+              </a:p>
+              <a:p>
+                <a:pPr marL="457200" lvl="1" indent="0">
+                  <a:lnSpc>
+                    <a:spcPct val="150000"/>
+                  </a:lnSpc>
+                  <a:buNone/>
+                </a:pPr>
+                <a:endParaRPr lang="da-DK" dirty="0"/>
+              </a:p>
+              <a:p>
+                <a:pPr>
+                  <a:lnSpc>
+                    <a:spcPct val="150000"/>
+                  </a:lnSpc>
+                </a:pPr>
+                <a:r>
+                  <a:rPr lang="da-DK" dirty="0"/>
+                  <a:t>Using information form other time series</a:t>
+                </a:r>
+              </a:p>
+              <a:p>
+                <a:pPr lvl="1">
+                  <a:lnSpc>
+                    <a:spcPct val="150000"/>
+                  </a:lnSpc>
+                </a:pPr>
+                <a:endParaRPr lang="en-GB" kern="100" dirty="0">
+                  <a:latin typeface="Calibri" panose="020F0502020204030204" pitchFamily="34" charset="0"/>
+                  <a:cs typeface="Times New Roman" panose="02020603050405020304" pitchFamily="18" charset="0"/>
+                </a:endParaRPr>
+              </a:p>
+              <a:p>
+                <a:pPr lvl="1">
+                  <a:lnSpc>
+                    <a:spcPct val="150000"/>
+                  </a:lnSpc>
+                </a:pPr>
+                <a:endParaRPr lang="en-GB" kern="100" dirty="0">
+                  <a:latin typeface="Calibri" panose="020F0502020204030204" pitchFamily="34" charset="0"/>
+                  <a:cs typeface="Times New Roman" panose="02020603050405020304" pitchFamily="18" charset="0"/>
+                </a:endParaRPr>
+              </a:p>
+              <a:p>
+                <a:pPr lvl="1">
+                  <a:lnSpc>
+                    <a:spcPct val="150000"/>
+                  </a:lnSpc>
+                </a:pPr>
+                <a:endParaRPr lang="da-DK" dirty="0"/>
+              </a:p>
+              <a:p>
+                <a:pPr lvl="1"/>
+                <a:endParaRPr lang="en-GB" sz="1800" kern="100" dirty="0">
+                  <a:effectLst/>
+                  <a:latin typeface="Calibri" panose="020F0502020204030204" pitchFamily="34" charset="0"/>
+                  <a:ea typeface="Calibri" panose="020F0502020204030204" pitchFamily="34" charset="0"/>
+                  <a:cs typeface="Times New Roman" panose="02020603050405020304" pitchFamily="18" charset="0"/>
+                </a:endParaRPr>
+              </a:p>
+              <a:p>
+                <a:pPr lvl="1"/>
+                <a:endParaRPr lang="en-GB" sz="1800" kern="100" dirty="0">
+                  <a:effectLst/>
+                  <a:latin typeface="Calibri" panose="020F0502020204030204" pitchFamily="34" charset="0"/>
+                  <a:ea typeface="Calibri" panose="020F0502020204030204" pitchFamily="34" charset="0"/>
+                  <a:cs typeface="Times New Roman" panose="02020603050405020304" pitchFamily="18" charset="0"/>
+                </a:endParaRPr>
+              </a:p>
+            </p:txBody>
+          </p:sp>
+        </mc:Choice>
+        <mc:Fallback>
+          <p:sp>
+            <p:nvSpPr>
+              <p:cNvPr id="4" name="Content Placeholder 3">
+                <a:extLst>
+                  <a:ext uri="{FF2B5EF4-FFF2-40B4-BE49-F238E27FC236}">
+                    <a16:creationId xmlns:a16="http://schemas.microsoft.com/office/drawing/2014/main" id="{9D491D46-254D-9BAD-982D-9800866E0F29}"/>
+                  </a:ext>
+                </a:extLst>
+              </p:cNvPr>
+              <p:cNvSpPr>
+                <a:spLocks noGrp="1" noRot="1" noChangeAspect="1" noMove="1" noResize="1" noEditPoints="1" noAdjustHandles="1" noChangeArrowheads="1" noChangeShapeType="1" noTextEdit="1"/>
+              </p:cNvSpPr>
+              <p:nvPr>
+                <p:ph sz="half" idx="1"/>
+              </p:nvPr>
+            </p:nvSpPr>
+            <p:spPr>
+              <a:blipFill>
+                <a:blip r:embed="rId2"/>
+                <a:stretch>
+                  <a:fillRect l="-3759" r="-2847"/>
+                </a:stretch>
+              </a:blipFill>
+            </p:spPr>
+            <p:txBody>
+              <a:bodyPr/>
+              <a:lstStyle/>
+              <a:p>
+                <a:r>
+                  <a:rPr lang="en-GB">
+                    <a:noFill/>
+                  </a:rPr>
+                  <a:t> </a:t>
+                </a:r>
+              </a:p>
+            </p:txBody>
+          </p:sp>
+        </mc:Fallback>
+      </mc:AlternateContent>
+      <p:sp>
+        <p:nvSpPr>
+          <p:cNvPr id="5" name="Date Placeholder 1">
+            <a:extLst>
+              <a:ext uri="{FF2B5EF4-FFF2-40B4-BE49-F238E27FC236}">
+                <a16:creationId xmlns:a16="http://schemas.microsoft.com/office/drawing/2014/main" id="{0E74F337-C0E3-6045-1ABB-08A746855234}"/>
+              </a:ext>
+            </a:extLst>
+          </p:cNvPr>
+          <p:cNvSpPr>
+            <a:spLocks noGrp="1"/>
+          </p:cNvSpPr>
+          <p:nvPr>
+            <p:ph type="dt" sz="half" idx="10"/>
+          </p:nvPr>
+        </p:nvSpPr>
         <p:spPr>
           <a:xfrm>
-            <a:off x="762001" y="1141711"/>
-            <a:ext cx="3234466" cy="3474364"/>
-          </a:xfrm>
-        </p:spPr>
-        <p:txBody>
-          <a:bodyPr vert="horz" lIns="91440" tIns="45720" rIns="91440" bIns="45720" rtlCol="0" anchor="t">
-            <a:normAutofit/>
-          </a:bodyPr>
-          <a:lstStyle/>
-          <a:p>
-            <a:r>
-              <a:rPr lang="en-US" sz="3600" kern="1200" dirty="0">
-                <a:solidFill>
-                  <a:schemeClr val="tx1"/>
-                </a:solidFill>
-                <a:latin typeface="+mj-lt"/>
-                <a:ea typeface="+mj-ea"/>
-                <a:cs typeface="+mj-cs"/>
-              </a:rPr>
-              <a:t>Comparing angle</a:t>
-            </a:r>
-            <a:br>
-              <a:rPr lang="en-US" sz="3600" kern="1200" dirty="0">
-                <a:solidFill>
-                  <a:schemeClr val="tx1"/>
-                </a:solidFill>
-                <a:latin typeface="+mj-lt"/>
-                <a:ea typeface="+mj-ea"/>
-                <a:cs typeface="+mj-cs"/>
-              </a:rPr>
-            </a:br>
-            <a:br>
-              <a:rPr lang="en-US" sz="3600" kern="1200" dirty="0">
-                <a:solidFill>
-                  <a:schemeClr val="tx1"/>
-                </a:solidFill>
-                <a:latin typeface="+mj-lt"/>
-                <a:ea typeface="+mj-ea"/>
-                <a:cs typeface="+mj-cs"/>
-              </a:rPr>
-            </a:br>
-            <a:r>
-              <a:rPr lang="en-US" sz="2000" kern="1200" dirty="0">
-                <a:solidFill>
-                  <a:schemeClr val="tx1"/>
-                </a:solidFill>
-                <a:latin typeface="+mj-lt"/>
-                <a:ea typeface="+mj-ea"/>
-                <a:cs typeface="+mj-cs"/>
-              </a:rPr>
-              <a:t>Model </a:t>
-            </a:r>
-            <a:r>
-              <a:rPr lang="en-US" sz="2000" kern="1200" dirty="0" err="1">
-                <a:solidFill>
-                  <a:schemeClr val="tx1"/>
-                </a:solidFill>
-                <a:latin typeface="+mj-lt"/>
-                <a:ea typeface="+mj-ea"/>
-                <a:cs typeface="+mj-cs"/>
-              </a:rPr>
-              <a:t>mae</a:t>
-            </a:r>
-            <a:r>
-              <a:rPr lang="en-US" sz="2000" kern="1200" dirty="0">
-                <a:solidFill>
-                  <a:schemeClr val="tx1"/>
-                </a:solidFill>
-                <a:latin typeface="+mj-lt"/>
-                <a:ea typeface="+mj-ea"/>
-                <a:cs typeface="+mj-cs"/>
-              </a:rPr>
-              <a:t>: </a:t>
-            </a:r>
-            <a:br>
-              <a:rPr lang="en-US" sz="2000" kern="1200" dirty="0">
-                <a:solidFill>
-                  <a:schemeClr val="tx1"/>
-                </a:solidFill>
-                <a:latin typeface="+mj-lt"/>
-                <a:ea typeface="+mj-ea"/>
-                <a:cs typeface="+mj-cs"/>
-              </a:rPr>
-            </a:br>
-            <a:r>
-              <a:rPr lang="en-US" sz="2000" kern="1200" dirty="0">
-                <a:solidFill>
-                  <a:schemeClr val="tx1"/>
-                </a:solidFill>
-                <a:latin typeface="+mj-lt"/>
-                <a:ea typeface="+mj-ea"/>
-                <a:cs typeface="+mj-cs"/>
-              </a:rPr>
-              <a:t>0.0</a:t>
-            </a:r>
-            <a:r>
-              <a:rPr lang="en-US" sz="2000" dirty="0"/>
-              <a:t>0131</a:t>
-            </a:r>
-            <a:r>
-              <a:rPr lang="en-US" sz="2000" kern="1200" dirty="0">
-                <a:solidFill>
-                  <a:schemeClr val="tx1"/>
-                </a:solidFill>
-                <a:latin typeface="+mj-lt"/>
-                <a:ea typeface="+mj-ea"/>
-                <a:cs typeface="+mj-cs"/>
-              </a:rPr>
-              <a:t> Å</a:t>
-            </a:r>
-            <a:br>
-              <a:rPr lang="en-US" sz="2000" kern="1200" dirty="0">
-                <a:solidFill>
-                  <a:schemeClr val="tx1"/>
-                </a:solidFill>
-                <a:latin typeface="+mj-lt"/>
-                <a:ea typeface="+mj-ea"/>
-                <a:cs typeface="+mj-cs"/>
-              </a:rPr>
-            </a:br>
-            <a:br>
-              <a:rPr lang="en-US" sz="2000" kern="1200" dirty="0">
-                <a:solidFill>
-                  <a:schemeClr val="tx1"/>
-                </a:solidFill>
-                <a:latin typeface="+mj-lt"/>
-                <a:ea typeface="+mj-ea"/>
-                <a:cs typeface="+mj-cs"/>
-              </a:rPr>
-            </a:br>
-            <a:r>
-              <a:rPr lang="en-US" sz="2000" kern="1200" dirty="0" err="1">
-                <a:solidFill>
-                  <a:schemeClr val="tx1"/>
-                </a:solidFill>
-                <a:latin typeface="+mj-lt"/>
-                <a:ea typeface="+mj-ea"/>
-                <a:cs typeface="+mj-cs"/>
-              </a:rPr>
-              <a:t>mae</a:t>
-            </a:r>
-            <a:r>
-              <a:rPr lang="en-US" sz="2000" kern="1200" dirty="0">
-                <a:solidFill>
-                  <a:schemeClr val="tx1"/>
-                </a:solidFill>
-                <a:latin typeface="+mj-lt"/>
-                <a:ea typeface="+mj-ea"/>
-                <a:cs typeface="+mj-cs"/>
-              </a:rPr>
-              <a:t> at last pred: </a:t>
-            </a:r>
-            <a:br>
-              <a:rPr lang="en-US" sz="2000" kern="1200" dirty="0">
-                <a:solidFill>
-                  <a:schemeClr val="tx1"/>
-                </a:solidFill>
-                <a:latin typeface="+mj-lt"/>
-                <a:ea typeface="+mj-ea"/>
-                <a:cs typeface="+mj-cs"/>
-              </a:rPr>
-            </a:br>
-            <a:r>
-              <a:rPr lang="en-US" sz="2000" kern="1200" dirty="0">
-                <a:solidFill>
-                  <a:schemeClr val="tx1"/>
-                </a:solidFill>
-                <a:latin typeface="+mj-lt"/>
-                <a:ea typeface="+mj-ea"/>
-                <a:cs typeface="+mj-cs"/>
-              </a:rPr>
-              <a:t>0.0294 Å</a:t>
-            </a:r>
-            <a:endParaRPr lang="en-US" sz="3600" kern="1200" dirty="0">
-              <a:solidFill>
-                <a:schemeClr val="tx1"/>
-              </a:solidFill>
-              <a:latin typeface="+mj-lt"/>
-              <a:ea typeface="+mj-ea"/>
-              <a:cs typeface="+mj-cs"/>
-            </a:endParaRPr>
-          </a:p>
-        </p:txBody>
-      </p:sp>
-      <p:pic>
-        <p:nvPicPr>
-          <p:cNvPr id="5" name="Content Placeholder 4" descr="A graph of a graph&#10;&#10;Description automatically generated">
-            <a:extLst>
-              <a:ext uri="{FF2B5EF4-FFF2-40B4-BE49-F238E27FC236}">
-                <a16:creationId xmlns:a16="http://schemas.microsoft.com/office/drawing/2014/main" id="{7105CB3B-DC9B-B4D4-918F-B0EFFFD6FA73}"/>
-              </a:ext>
-            </a:extLst>
-          </p:cNvPr>
-          <p:cNvPicPr>
-            <a:picLocks noGrp="1" noChangeAspect="1"/>
-          </p:cNvPicPr>
-          <p:nvPr>
-            <p:ph idx="1"/>
-          </p:nvPr>
-        </p:nvPicPr>
-        <p:blipFill>
-          <a:blip r:embed="rId2">
-            <a:extLst>
-              <a:ext uri="{28A0092B-C50C-407E-A947-70E740481C1C}">
-                <a14:useLocalDpi xmlns:a14="http://schemas.microsoft.com/office/drawing/2010/main" val="0"/>
-              </a:ext>
-            </a:extLst>
-          </a:blip>
-          <a:stretch>
-            <a:fillRect/>
-          </a:stretch>
-        </p:blipFill>
+            <a:off x="838200" y="6356350"/>
+            <a:ext cx="2743200" cy="365125"/>
+          </a:xfrm>
+        </p:spPr>
+        <p:txBody>
+          <a:bodyPr/>
+          <a:lstStyle/>
+          <a:p>
+            <a:fld id="{DD0E0F33-965B-4006-BF25-D26E1C84904D}" type="datetime1">
+              <a:rPr lang="en-GB" smtClean="0"/>
+              <a:t>05/03/2024</a:t>
+            </a:fld>
+            <a:endParaRPr lang="en-GB" dirty="0"/>
+          </a:p>
+        </p:txBody>
+      </p:sp>
+      <p:sp>
+        <p:nvSpPr>
+          <p:cNvPr id="6" name="Slide Number Placeholder 2">
+            <a:extLst>
+              <a:ext uri="{FF2B5EF4-FFF2-40B4-BE49-F238E27FC236}">
+                <a16:creationId xmlns:a16="http://schemas.microsoft.com/office/drawing/2014/main" id="{F9475D71-AB73-3186-0D79-B90CA448E941}"/>
+              </a:ext>
+            </a:extLst>
+          </p:cNvPr>
+          <p:cNvSpPr>
+            <a:spLocks noGrp="1"/>
+          </p:cNvSpPr>
+          <p:nvPr>
+            <p:ph type="sldNum" sz="quarter" idx="12"/>
+          </p:nvPr>
+        </p:nvSpPr>
         <p:spPr>
           <a:xfrm>
-            <a:off x="4615543" y="855081"/>
-            <a:ext cx="6711317" cy="5167716"/>
+            <a:off x="8610600" y="6356350"/>
+            <a:ext cx="2743200" cy="365125"/>
+          </a:xfrm>
+        </p:spPr>
+        <p:txBody>
+          <a:bodyPr/>
+          <a:lstStyle/>
+          <a:p>
+            <a:fld id="{091A926C-488A-4E3E-9C21-57CAA120E114}" type="slidenum">
+              <a:rPr lang="en-GB" smtClean="0"/>
+              <a:t>2</a:t>
+            </a:fld>
+            <a:endParaRPr lang="en-GB" dirty="0"/>
+          </a:p>
+        </p:txBody>
+      </p:sp>
+      <p:sp>
+        <p:nvSpPr>
+          <p:cNvPr id="2" name="Oval 1">
+            <a:extLst>
+              <a:ext uri="{FF2B5EF4-FFF2-40B4-BE49-F238E27FC236}">
+                <a16:creationId xmlns:a16="http://schemas.microsoft.com/office/drawing/2014/main" id="{4CAAC441-1B69-9C81-E9E0-2486CDBD37C7}"/>
+              </a:ext>
+            </a:extLst>
+          </p:cNvPr>
+          <p:cNvSpPr/>
+          <p:nvPr/>
+        </p:nvSpPr>
+        <p:spPr>
+          <a:xfrm>
+            <a:off x="1539536" y="5228118"/>
+            <a:ext cx="177800" cy="191655"/>
+          </a:xfrm>
+          <a:prstGeom prst="ellipse">
+            <a:avLst/>
+          </a:prstGeom>
+          <a:solidFill>
+            <a:schemeClr val="tx1"/>
+          </a:solidFill>
+        </p:spPr>
+        <p:style>
+          <a:lnRef idx="2">
+            <a:schemeClr val="accent1">
+              <a:shade val="15000"/>
+            </a:schemeClr>
+          </a:lnRef>
+          <a:fillRef idx="1">
+            <a:schemeClr val="accent1"/>
+          </a:fillRef>
+          <a:effectRef idx="0">
+            <a:schemeClr val="accent1"/>
+          </a:effectRef>
+          <a:fontRef idx="minor">
+            <a:schemeClr val="lt1"/>
+          </a:fontRef>
+        </p:style>
+        <p:txBody>
+          <a:bodyPr rtlCol="0" anchor="ctr"/>
+          <a:lstStyle/>
+          <a:p>
+            <a:pPr algn="ctr"/>
+            <a:endParaRPr lang="en-GB"/>
+          </a:p>
+        </p:txBody>
+      </p:sp>
+      <p:sp>
+        <p:nvSpPr>
+          <p:cNvPr id="7" name="Oval 6">
+            <a:extLst>
+              <a:ext uri="{FF2B5EF4-FFF2-40B4-BE49-F238E27FC236}">
+                <a16:creationId xmlns:a16="http://schemas.microsoft.com/office/drawing/2014/main" id="{1CF5EBA0-E164-A277-898D-E2B132ED91DE}"/>
+              </a:ext>
+            </a:extLst>
+          </p:cNvPr>
+          <p:cNvSpPr/>
+          <p:nvPr/>
+        </p:nvSpPr>
+        <p:spPr>
+          <a:xfrm>
+            <a:off x="2042917" y="5228117"/>
+            <a:ext cx="177800" cy="191655"/>
+          </a:xfrm>
+          <a:prstGeom prst="ellipse">
+            <a:avLst/>
+          </a:prstGeom>
+          <a:solidFill>
+            <a:schemeClr val="tx1"/>
+          </a:solidFill>
+        </p:spPr>
+        <p:style>
+          <a:lnRef idx="2">
+            <a:schemeClr val="accent1">
+              <a:shade val="15000"/>
+            </a:schemeClr>
+          </a:lnRef>
+          <a:fillRef idx="1">
+            <a:schemeClr val="accent1"/>
+          </a:fillRef>
+          <a:effectRef idx="0">
+            <a:schemeClr val="accent1"/>
+          </a:effectRef>
+          <a:fontRef idx="minor">
+            <a:schemeClr val="lt1"/>
+          </a:fontRef>
+        </p:style>
+        <p:txBody>
+          <a:bodyPr rtlCol="0" anchor="ctr"/>
+          <a:lstStyle/>
+          <a:p>
+            <a:pPr algn="ctr"/>
+            <a:endParaRPr lang="en-GB"/>
+          </a:p>
+        </p:txBody>
+      </p:sp>
+      <p:sp>
+        <p:nvSpPr>
+          <p:cNvPr id="8" name="Oval 7">
+            <a:extLst>
+              <a:ext uri="{FF2B5EF4-FFF2-40B4-BE49-F238E27FC236}">
+                <a16:creationId xmlns:a16="http://schemas.microsoft.com/office/drawing/2014/main" id="{11B6AF4D-4310-27DC-5D30-3F81FF09659E}"/>
+              </a:ext>
+            </a:extLst>
+          </p:cNvPr>
+          <p:cNvSpPr/>
+          <p:nvPr/>
+        </p:nvSpPr>
+        <p:spPr>
+          <a:xfrm>
+            <a:off x="2545433" y="5228116"/>
+            <a:ext cx="177800" cy="191655"/>
+          </a:xfrm>
+          <a:prstGeom prst="ellipse">
+            <a:avLst/>
+          </a:prstGeom>
+          <a:solidFill>
+            <a:schemeClr val="tx1"/>
+          </a:solidFill>
+        </p:spPr>
+        <p:style>
+          <a:lnRef idx="2">
+            <a:schemeClr val="accent1">
+              <a:shade val="15000"/>
+            </a:schemeClr>
+          </a:lnRef>
+          <a:fillRef idx="1">
+            <a:schemeClr val="accent1"/>
+          </a:fillRef>
+          <a:effectRef idx="0">
+            <a:schemeClr val="accent1"/>
+          </a:effectRef>
+          <a:fontRef idx="minor">
+            <a:schemeClr val="lt1"/>
+          </a:fontRef>
+        </p:style>
+        <p:txBody>
+          <a:bodyPr rtlCol="0" anchor="ctr"/>
+          <a:lstStyle/>
+          <a:p>
+            <a:pPr algn="ctr"/>
+            <a:endParaRPr lang="en-GB"/>
+          </a:p>
+        </p:txBody>
+      </p:sp>
+      <p:sp>
+        <p:nvSpPr>
+          <p:cNvPr id="9" name="Oval 8">
+            <a:extLst>
+              <a:ext uri="{FF2B5EF4-FFF2-40B4-BE49-F238E27FC236}">
+                <a16:creationId xmlns:a16="http://schemas.microsoft.com/office/drawing/2014/main" id="{FFE2A0C1-490F-0A9D-5522-FAEE73D144DC}"/>
+              </a:ext>
+            </a:extLst>
+          </p:cNvPr>
+          <p:cNvSpPr/>
+          <p:nvPr/>
+        </p:nvSpPr>
+        <p:spPr>
+          <a:xfrm>
+            <a:off x="3047949" y="5228116"/>
+            <a:ext cx="177800" cy="191655"/>
+          </a:xfrm>
+          <a:prstGeom prst="ellipse">
+            <a:avLst/>
+          </a:prstGeom>
+          <a:solidFill>
+            <a:schemeClr val="bg1"/>
+          </a:solidFill>
+          <a:ln w="28575">
+            <a:solidFill>
+              <a:schemeClr val="tx1"/>
+            </a:solidFill>
+          </a:ln>
+        </p:spPr>
+        <p:style>
+          <a:lnRef idx="2">
+            <a:schemeClr val="accent1">
+              <a:shade val="15000"/>
+            </a:schemeClr>
+          </a:lnRef>
+          <a:fillRef idx="1">
+            <a:schemeClr val="accent1"/>
+          </a:fillRef>
+          <a:effectRef idx="0">
+            <a:schemeClr val="accent1"/>
+          </a:effectRef>
+          <a:fontRef idx="minor">
+            <a:schemeClr val="lt1"/>
+          </a:fontRef>
+        </p:style>
+        <p:txBody>
+          <a:bodyPr rtlCol="0" anchor="ctr"/>
+          <a:lstStyle/>
+          <a:p>
+            <a:pPr algn="ctr"/>
+            <a:endParaRPr lang="en-GB"/>
+          </a:p>
+        </p:txBody>
+      </p:sp>
+      <p:sp>
+        <p:nvSpPr>
+          <p:cNvPr id="11" name="Oval 10">
+            <a:extLst>
+              <a:ext uri="{FF2B5EF4-FFF2-40B4-BE49-F238E27FC236}">
+                <a16:creationId xmlns:a16="http://schemas.microsoft.com/office/drawing/2014/main" id="{FBD7956D-F2D3-A0B7-B8A0-2A44D8B4B3EB}"/>
+              </a:ext>
+            </a:extLst>
+          </p:cNvPr>
+          <p:cNvSpPr/>
+          <p:nvPr/>
+        </p:nvSpPr>
+        <p:spPr>
+          <a:xfrm>
+            <a:off x="3552195" y="5228116"/>
+            <a:ext cx="177800" cy="191655"/>
+          </a:xfrm>
+          <a:prstGeom prst="ellipse">
+            <a:avLst/>
+          </a:prstGeom>
+          <a:solidFill>
+            <a:schemeClr val="bg1"/>
+          </a:solidFill>
+          <a:ln w="28575">
+            <a:solidFill>
+              <a:schemeClr val="tx1"/>
+            </a:solidFill>
+          </a:ln>
+        </p:spPr>
+        <p:style>
+          <a:lnRef idx="2">
+            <a:schemeClr val="accent1">
+              <a:shade val="15000"/>
+            </a:schemeClr>
+          </a:lnRef>
+          <a:fillRef idx="1">
+            <a:schemeClr val="accent1"/>
+          </a:fillRef>
+          <a:effectRef idx="0">
+            <a:schemeClr val="accent1"/>
+          </a:effectRef>
+          <a:fontRef idx="minor">
+            <a:schemeClr val="lt1"/>
+          </a:fontRef>
+        </p:style>
+        <p:txBody>
+          <a:bodyPr rtlCol="0" anchor="ctr"/>
+          <a:lstStyle/>
+          <a:p>
+            <a:pPr algn="ctr"/>
+            <a:endParaRPr lang="en-GB"/>
+          </a:p>
+        </p:txBody>
+      </p:sp>
+      <p:sp>
+        <p:nvSpPr>
+          <p:cNvPr id="12" name="Oval 11">
+            <a:extLst>
+              <a:ext uri="{FF2B5EF4-FFF2-40B4-BE49-F238E27FC236}">
+                <a16:creationId xmlns:a16="http://schemas.microsoft.com/office/drawing/2014/main" id="{85189D32-A0A9-FC26-F3E6-B901B31701A9}"/>
+              </a:ext>
+            </a:extLst>
+          </p:cNvPr>
+          <p:cNvSpPr/>
+          <p:nvPr/>
+        </p:nvSpPr>
+        <p:spPr>
+          <a:xfrm>
+            <a:off x="4055576" y="5228116"/>
+            <a:ext cx="177800" cy="191655"/>
+          </a:xfrm>
+          <a:prstGeom prst="ellipse">
+            <a:avLst/>
+          </a:prstGeom>
+          <a:solidFill>
+            <a:schemeClr val="bg1"/>
+          </a:solidFill>
+          <a:ln w="28575">
+            <a:solidFill>
+              <a:schemeClr val="tx1"/>
+            </a:solidFill>
+          </a:ln>
+        </p:spPr>
+        <p:style>
+          <a:lnRef idx="2">
+            <a:schemeClr val="accent1">
+              <a:shade val="15000"/>
+            </a:schemeClr>
+          </a:lnRef>
+          <a:fillRef idx="1">
+            <a:schemeClr val="accent1"/>
+          </a:fillRef>
+          <a:effectRef idx="0">
+            <a:schemeClr val="accent1"/>
+          </a:effectRef>
+          <a:fontRef idx="minor">
+            <a:schemeClr val="lt1"/>
+          </a:fontRef>
+        </p:style>
+        <p:txBody>
+          <a:bodyPr rtlCol="0" anchor="ctr"/>
+          <a:lstStyle/>
+          <a:p>
+            <a:pPr algn="ctr"/>
+            <a:endParaRPr lang="en-GB"/>
+          </a:p>
+        </p:txBody>
+      </p:sp>
+      <p:cxnSp>
+        <p:nvCxnSpPr>
+          <p:cNvPr id="13" name="Connector: Curved 12">
+            <a:extLst>
+              <a:ext uri="{FF2B5EF4-FFF2-40B4-BE49-F238E27FC236}">
+                <a16:creationId xmlns:a16="http://schemas.microsoft.com/office/drawing/2014/main" id="{C446561E-09E1-DB41-FB39-0E4F5FBC688E}"/>
+              </a:ext>
+            </a:extLst>
+          </p:cNvPr>
+          <p:cNvCxnSpPr>
+            <a:stCxn id="8" idx="0"/>
+            <a:endCxn id="9" idx="7"/>
+          </p:cNvCxnSpPr>
+          <p:nvPr/>
+        </p:nvCxnSpPr>
+        <p:spPr>
+          <a:xfrm rot="5400000" flipH="1" flipV="1">
+            <a:off x="2885591" y="4976858"/>
+            <a:ext cx="12700" cy="502516"/>
+          </a:xfrm>
+          <a:prstGeom prst="curvedConnector3">
+            <a:avLst>
+              <a:gd name="adj1" fmla="val 1800000"/>
+            </a:avLst>
+          </a:prstGeom>
+          <a:ln>
+            <a:solidFill>
+              <a:schemeClr val="tx1"/>
+            </a:solidFill>
+            <a:tailEnd type="triangle"/>
+          </a:ln>
+        </p:spPr>
+        <p:style>
+          <a:lnRef idx="1">
+            <a:schemeClr val="accent1"/>
+          </a:lnRef>
+          <a:fillRef idx="0">
+            <a:schemeClr val="accent1"/>
+          </a:fillRef>
+          <a:effectRef idx="0">
+            <a:schemeClr val="accent1"/>
+          </a:effectRef>
+          <a:fontRef idx="minor">
+            <a:schemeClr val="tx1"/>
+          </a:fontRef>
+        </p:style>
+      </p:cxnSp>
+      <p:cxnSp>
+        <p:nvCxnSpPr>
+          <p:cNvPr id="14" name="Connector: Curved 13">
+            <a:extLst>
+              <a:ext uri="{FF2B5EF4-FFF2-40B4-BE49-F238E27FC236}">
+                <a16:creationId xmlns:a16="http://schemas.microsoft.com/office/drawing/2014/main" id="{4417C975-99C7-E8E5-A9DF-A551056F34D1}"/>
+              </a:ext>
+            </a:extLst>
+          </p:cNvPr>
+          <p:cNvCxnSpPr>
+            <a:stCxn id="7" idx="0"/>
+            <a:endCxn id="9" idx="0"/>
+          </p:cNvCxnSpPr>
+          <p:nvPr/>
+        </p:nvCxnSpPr>
+        <p:spPr>
+          <a:xfrm rot="5400000" flipH="1" flipV="1">
+            <a:off x="2634333" y="4725601"/>
+            <a:ext cx="1" cy="1005032"/>
+          </a:xfrm>
+          <a:prstGeom prst="curvedConnector3">
+            <a:avLst>
+              <a:gd name="adj1" fmla="val 22860100000"/>
+            </a:avLst>
+          </a:prstGeom>
+          <a:ln>
+            <a:solidFill>
+              <a:schemeClr val="tx1"/>
+            </a:solidFill>
+            <a:tailEnd type="triangle"/>
+          </a:ln>
+        </p:spPr>
+        <p:style>
+          <a:lnRef idx="1">
+            <a:schemeClr val="accent1"/>
+          </a:lnRef>
+          <a:fillRef idx="0">
+            <a:schemeClr val="accent1"/>
+          </a:fillRef>
+          <a:effectRef idx="0">
+            <a:schemeClr val="accent1"/>
+          </a:effectRef>
+          <a:fontRef idx="minor">
+            <a:schemeClr val="tx1"/>
+          </a:fontRef>
+        </p:style>
+      </p:cxnSp>
+      <p:sp>
+        <p:nvSpPr>
+          <p:cNvPr id="15" name="TextBox 14">
+            <a:extLst>
+              <a:ext uri="{FF2B5EF4-FFF2-40B4-BE49-F238E27FC236}">
+                <a16:creationId xmlns:a16="http://schemas.microsoft.com/office/drawing/2014/main" id="{490B0BC9-BB1D-6B46-A606-BA0C3666CB1A}"/>
+              </a:ext>
+            </a:extLst>
+          </p:cNvPr>
+          <p:cNvSpPr txBox="1"/>
+          <p:nvPr/>
+        </p:nvSpPr>
+        <p:spPr>
+          <a:xfrm>
+            <a:off x="876897" y="5139277"/>
+            <a:ext cx="700811" cy="369332"/>
           </a:xfrm>
           <a:prstGeom prst="rect">
             <a:avLst/>
           </a:prstGeom>
-        </p:spPr>
-      </p:pic>
-      <p:pic>
-        <p:nvPicPr>
-          <p:cNvPr id="3" name="Billede 2">
-            <a:extLst>
-              <a:ext uri="{FF2B5EF4-FFF2-40B4-BE49-F238E27FC236}">
-                <a16:creationId xmlns:a16="http://schemas.microsoft.com/office/drawing/2014/main" id="{FC08ABE5-9A22-98B3-2C6C-A07690956206}"/>
-              </a:ext>
-            </a:extLst>
-          </p:cNvPr>
-          <p:cNvPicPr>
-            <a:picLocks noChangeAspect="1"/>
-          </p:cNvPicPr>
+          <a:noFill/>
+        </p:spPr>
+        <p:txBody>
+          <a:bodyPr wrap="square" rtlCol="0">
+            <a:spAutoFit/>
+          </a:bodyPr>
+          <a:lstStyle/>
+          <a:p>
+            <a:r>
+              <a:rPr lang="da-DK" dirty="0"/>
+              <a:t>O(x):</a:t>
+            </a:r>
+            <a:endParaRPr lang="en-GB" dirty="0"/>
+          </a:p>
+        </p:txBody>
+      </p:sp>
+      <p:sp>
+        <p:nvSpPr>
+          <p:cNvPr id="16" name="Oval 15">
+            <a:extLst>
+              <a:ext uri="{FF2B5EF4-FFF2-40B4-BE49-F238E27FC236}">
+                <a16:creationId xmlns:a16="http://schemas.microsoft.com/office/drawing/2014/main" id="{D66DF017-D526-88C9-C908-300BD2161023}"/>
+              </a:ext>
+            </a:extLst>
+          </p:cNvPr>
+          <p:cNvSpPr/>
           <p:nvPr/>
-        </p:nvPicPr>
-        <p:blipFill>
-          <a:blip r:embed="rId3"/>
-          <a:stretch>
-            <a:fillRect/>
-          </a:stretch>
-        </p:blipFill>
+        </p:nvSpPr>
         <p:spPr>
           <a:xfrm>
-            <a:off x="678730" y="4343181"/>
-            <a:ext cx="2877221" cy="2162922"/>
+            <a:off x="1539536" y="5783650"/>
+            <a:ext cx="177800" cy="191655"/>
+          </a:xfrm>
+          <a:prstGeom prst="ellipse">
+            <a:avLst/>
+          </a:prstGeom>
+          <a:solidFill>
+            <a:schemeClr val="tx1"/>
+          </a:solidFill>
+        </p:spPr>
+        <p:style>
+          <a:lnRef idx="2">
+            <a:schemeClr val="accent1">
+              <a:shade val="15000"/>
+            </a:schemeClr>
+          </a:lnRef>
+          <a:fillRef idx="1">
+            <a:schemeClr val="accent1"/>
+          </a:fillRef>
+          <a:effectRef idx="0">
+            <a:schemeClr val="accent1"/>
+          </a:effectRef>
+          <a:fontRef idx="minor">
+            <a:schemeClr val="lt1"/>
+          </a:fontRef>
+        </p:style>
+        <p:txBody>
+          <a:bodyPr rtlCol="0" anchor="ctr"/>
+          <a:lstStyle/>
+          <a:p>
+            <a:pPr algn="ctr"/>
+            <a:endParaRPr lang="en-GB"/>
+          </a:p>
+        </p:txBody>
+      </p:sp>
+      <p:sp>
+        <p:nvSpPr>
+          <p:cNvPr id="17" name="Oval 16">
+            <a:extLst>
+              <a:ext uri="{FF2B5EF4-FFF2-40B4-BE49-F238E27FC236}">
+                <a16:creationId xmlns:a16="http://schemas.microsoft.com/office/drawing/2014/main" id="{2462106F-9ED5-CB7B-7AB7-D34FD1B3D490}"/>
+              </a:ext>
+            </a:extLst>
+          </p:cNvPr>
+          <p:cNvSpPr/>
+          <p:nvPr/>
+        </p:nvSpPr>
+        <p:spPr>
+          <a:xfrm>
+            <a:off x="2042917" y="5783649"/>
+            <a:ext cx="177800" cy="191655"/>
+          </a:xfrm>
+          <a:prstGeom prst="ellipse">
+            <a:avLst/>
+          </a:prstGeom>
+          <a:solidFill>
+            <a:schemeClr val="tx1"/>
+          </a:solidFill>
+        </p:spPr>
+        <p:style>
+          <a:lnRef idx="2">
+            <a:schemeClr val="accent1">
+              <a:shade val="15000"/>
+            </a:schemeClr>
+          </a:lnRef>
+          <a:fillRef idx="1">
+            <a:schemeClr val="accent1"/>
+          </a:fillRef>
+          <a:effectRef idx="0">
+            <a:schemeClr val="accent1"/>
+          </a:effectRef>
+          <a:fontRef idx="minor">
+            <a:schemeClr val="lt1"/>
+          </a:fontRef>
+        </p:style>
+        <p:txBody>
+          <a:bodyPr rtlCol="0" anchor="ctr"/>
+          <a:lstStyle/>
+          <a:p>
+            <a:pPr algn="ctr"/>
+            <a:endParaRPr lang="en-GB"/>
+          </a:p>
+        </p:txBody>
+      </p:sp>
+      <p:sp>
+        <p:nvSpPr>
+          <p:cNvPr id="18" name="Oval 17">
+            <a:extLst>
+              <a:ext uri="{FF2B5EF4-FFF2-40B4-BE49-F238E27FC236}">
+                <a16:creationId xmlns:a16="http://schemas.microsoft.com/office/drawing/2014/main" id="{317F8DEB-34D0-C417-ACA6-03EB077826A6}"/>
+              </a:ext>
+            </a:extLst>
+          </p:cNvPr>
+          <p:cNvSpPr/>
+          <p:nvPr/>
+        </p:nvSpPr>
+        <p:spPr>
+          <a:xfrm>
+            <a:off x="2545433" y="5783648"/>
+            <a:ext cx="177800" cy="191655"/>
+          </a:xfrm>
+          <a:prstGeom prst="ellipse">
+            <a:avLst/>
+          </a:prstGeom>
+          <a:solidFill>
+            <a:schemeClr val="tx1"/>
+          </a:solidFill>
+        </p:spPr>
+        <p:style>
+          <a:lnRef idx="2">
+            <a:schemeClr val="accent1">
+              <a:shade val="15000"/>
+            </a:schemeClr>
+          </a:lnRef>
+          <a:fillRef idx="1">
+            <a:schemeClr val="accent1"/>
+          </a:fillRef>
+          <a:effectRef idx="0">
+            <a:schemeClr val="accent1"/>
+          </a:effectRef>
+          <a:fontRef idx="minor">
+            <a:schemeClr val="lt1"/>
+          </a:fontRef>
+        </p:style>
+        <p:txBody>
+          <a:bodyPr rtlCol="0" anchor="ctr"/>
+          <a:lstStyle/>
+          <a:p>
+            <a:pPr algn="ctr"/>
+            <a:endParaRPr lang="en-GB"/>
+          </a:p>
+        </p:txBody>
+      </p:sp>
+      <p:sp>
+        <p:nvSpPr>
+          <p:cNvPr id="19" name="Oval 18">
+            <a:extLst>
+              <a:ext uri="{FF2B5EF4-FFF2-40B4-BE49-F238E27FC236}">
+                <a16:creationId xmlns:a16="http://schemas.microsoft.com/office/drawing/2014/main" id="{8ADEA7BF-E6E6-0CA8-8968-B1D35E97A7CF}"/>
+              </a:ext>
+            </a:extLst>
+          </p:cNvPr>
+          <p:cNvSpPr/>
+          <p:nvPr/>
+        </p:nvSpPr>
+        <p:spPr>
+          <a:xfrm>
+            <a:off x="3047949" y="5783648"/>
+            <a:ext cx="177800" cy="191655"/>
+          </a:xfrm>
+          <a:prstGeom prst="ellipse">
+            <a:avLst/>
+          </a:prstGeom>
+          <a:solidFill>
+            <a:schemeClr val="bg1"/>
+          </a:solidFill>
+          <a:ln w="28575">
+            <a:solidFill>
+              <a:schemeClr val="tx1"/>
+            </a:solidFill>
+          </a:ln>
+        </p:spPr>
+        <p:style>
+          <a:lnRef idx="2">
+            <a:schemeClr val="accent1">
+              <a:shade val="15000"/>
+            </a:schemeClr>
+          </a:lnRef>
+          <a:fillRef idx="1">
+            <a:schemeClr val="accent1"/>
+          </a:fillRef>
+          <a:effectRef idx="0">
+            <a:schemeClr val="accent1"/>
+          </a:effectRef>
+          <a:fontRef idx="minor">
+            <a:schemeClr val="lt1"/>
+          </a:fontRef>
+        </p:style>
+        <p:txBody>
+          <a:bodyPr rtlCol="0" anchor="ctr"/>
+          <a:lstStyle/>
+          <a:p>
+            <a:pPr algn="ctr"/>
+            <a:endParaRPr lang="en-GB"/>
+          </a:p>
+        </p:txBody>
+      </p:sp>
+      <p:sp>
+        <p:nvSpPr>
+          <p:cNvPr id="20" name="Oval 19">
+            <a:extLst>
+              <a:ext uri="{FF2B5EF4-FFF2-40B4-BE49-F238E27FC236}">
+                <a16:creationId xmlns:a16="http://schemas.microsoft.com/office/drawing/2014/main" id="{6D048EB4-7621-086C-8170-866FE8ABA69A}"/>
+              </a:ext>
+            </a:extLst>
+          </p:cNvPr>
+          <p:cNvSpPr/>
+          <p:nvPr/>
+        </p:nvSpPr>
+        <p:spPr>
+          <a:xfrm>
+            <a:off x="3552195" y="5783648"/>
+            <a:ext cx="177800" cy="191655"/>
+          </a:xfrm>
+          <a:prstGeom prst="ellipse">
+            <a:avLst/>
+          </a:prstGeom>
+          <a:solidFill>
+            <a:schemeClr val="bg1"/>
+          </a:solidFill>
+          <a:ln w="28575">
+            <a:solidFill>
+              <a:schemeClr val="tx1"/>
+            </a:solidFill>
+          </a:ln>
+        </p:spPr>
+        <p:style>
+          <a:lnRef idx="2">
+            <a:schemeClr val="accent1">
+              <a:shade val="15000"/>
+            </a:schemeClr>
+          </a:lnRef>
+          <a:fillRef idx="1">
+            <a:schemeClr val="accent1"/>
+          </a:fillRef>
+          <a:effectRef idx="0">
+            <a:schemeClr val="accent1"/>
+          </a:effectRef>
+          <a:fontRef idx="minor">
+            <a:schemeClr val="lt1"/>
+          </a:fontRef>
+        </p:style>
+        <p:txBody>
+          <a:bodyPr rtlCol="0" anchor="ctr"/>
+          <a:lstStyle/>
+          <a:p>
+            <a:pPr algn="ctr"/>
+            <a:endParaRPr lang="en-GB"/>
+          </a:p>
+        </p:txBody>
+      </p:sp>
+      <p:sp>
+        <p:nvSpPr>
+          <p:cNvPr id="21" name="Oval 20">
+            <a:extLst>
+              <a:ext uri="{FF2B5EF4-FFF2-40B4-BE49-F238E27FC236}">
+                <a16:creationId xmlns:a16="http://schemas.microsoft.com/office/drawing/2014/main" id="{88F8C8CB-80A2-79D9-DE5C-9826C7C33F1D}"/>
+              </a:ext>
+            </a:extLst>
+          </p:cNvPr>
+          <p:cNvSpPr/>
+          <p:nvPr/>
+        </p:nvSpPr>
+        <p:spPr>
+          <a:xfrm>
+            <a:off x="4055576" y="5783648"/>
+            <a:ext cx="177800" cy="191655"/>
+          </a:xfrm>
+          <a:prstGeom prst="ellipse">
+            <a:avLst/>
+          </a:prstGeom>
+          <a:solidFill>
+            <a:schemeClr val="bg1"/>
+          </a:solidFill>
+          <a:ln w="28575">
+            <a:solidFill>
+              <a:schemeClr val="tx1"/>
+            </a:solidFill>
+          </a:ln>
+        </p:spPr>
+        <p:style>
+          <a:lnRef idx="2">
+            <a:schemeClr val="accent1">
+              <a:shade val="15000"/>
+            </a:schemeClr>
+          </a:lnRef>
+          <a:fillRef idx="1">
+            <a:schemeClr val="accent1"/>
+          </a:fillRef>
+          <a:effectRef idx="0">
+            <a:schemeClr val="accent1"/>
+          </a:effectRef>
+          <a:fontRef idx="minor">
+            <a:schemeClr val="lt1"/>
+          </a:fontRef>
+        </p:style>
+        <p:txBody>
+          <a:bodyPr rtlCol="0" anchor="ctr"/>
+          <a:lstStyle/>
+          <a:p>
+            <a:pPr algn="ctr"/>
+            <a:endParaRPr lang="en-GB"/>
+          </a:p>
+        </p:txBody>
+      </p:sp>
+      <p:sp>
+        <p:nvSpPr>
+          <p:cNvPr id="22" name="TextBox 21">
+            <a:extLst>
+              <a:ext uri="{FF2B5EF4-FFF2-40B4-BE49-F238E27FC236}">
+                <a16:creationId xmlns:a16="http://schemas.microsoft.com/office/drawing/2014/main" id="{C9AF952B-691D-ADFD-1265-46DB8F8C1B33}"/>
+              </a:ext>
+            </a:extLst>
+          </p:cNvPr>
+          <p:cNvSpPr txBox="1"/>
+          <p:nvPr/>
+        </p:nvSpPr>
+        <p:spPr>
+          <a:xfrm>
+            <a:off x="876897" y="5694809"/>
+            <a:ext cx="700811" cy="369332"/>
           </a:xfrm>
           <a:prstGeom prst="rect">
             <a:avLst/>
           </a:prstGeom>
-        </p:spPr>
-      </p:pic>
+          <a:noFill/>
+        </p:spPr>
+        <p:txBody>
+          <a:bodyPr wrap="square" rtlCol="0">
+            <a:spAutoFit/>
+          </a:bodyPr>
+          <a:lstStyle/>
+          <a:p>
+            <a:r>
+              <a:rPr lang="da-DK" dirty="0"/>
+              <a:t>O(y):</a:t>
+            </a:r>
+            <a:endParaRPr lang="en-GB" dirty="0"/>
+          </a:p>
+        </p:txBody>
+      </p:sp>
+      <p:cxnSp>
+        <p:nvCxnSpPr>
+          <p:cNvPr id="23" name="Connector: Curved 22">
+            <a:extLst>
+              <a:ext uri="{FF2B5EF4-FFF2-40B4-BE49-F238E27FC236}">
+                <a16:creationId xmlns:a16="http://schemas.microsoft.com/office/drawing/2014/main" id="{6BD7A52A-ABC6-A0FD-B41C-094B8A7A9590}"/>
+              </a:ext>
+            </a:extLst>
+          </p:cNvPr>
+          <p:cNvCxnSpPr>
+            <a:stCxn id="17" idx="0"/>
+            <a:endCxn id="9" idx="3"/>
+          </p:cNvCxnSpPr>
+          <p:nvPr/>
+        </p:nvCxnSpPr>
+        <p:spPr>
+          <a:xfrm rot="5400000" flipH="1" flipV="1">
+            <a:off x="2406930" y="5116592"/>
+            <a:ext cx="391945" cy="942170"/>
+          </a:xfrm>
+          <a:prstGeom prst="curvedConnector3">
+            <a:avLst/>
+          </a:prstGeom>
+          <a:ln>
+            <a:solidFill>
+              <a:schemeClr val="tx1"/>
+            </a:solidFill>
+            <a:tailEnd type="triangle"/>
+          </a:ln>
+        </p:spPr>
+        <p:style>
+          <a:lnRef idx="1">
+            <a:schemeClr val="accent1"/>
+          </a:lnRef>
+          <a:fillRef idx="0">
+            <a:schemeClr val="accent1"/>
+          </a:fillRef>
+          <a:effectRef idx="0">
+            <a:schemeClr val="accent1"/>
+          </a:effectRef>
+          <a:fontRef idx="minor">
+            <a:schemeClr val="tx1"/>
+          </a:fontRef>
+        </p:style>
+      </p:cxnSp>
+      <p:cxnSp>
+        <p:nvCxnSpPr>
+          <p:cNvPr id="24" name="Connector: Curved 23">
+            <a:extLst>
+              <a:ext uri="{FF2B5EF4-FFF2-40B4-BE49-F238E27FC236}">
+                <a16:creationId xmlns:a16="http://schemas.microsoft.com/office/drawing/2014/main" id="{C86A0015-2BFA-54C0-4D63-4813FCE3C764}"/>
+              </a:ext>
+            </a:extLst>
+          </p:cNvPr>
+          <p:cNvCxnSpPr>
+            <a:stCxn id="18" idx="0"/>
+            <a:endCxn id="9" idx="3"/>
+          </p:cNvCxnSpPr>
+          <p:nvPr/>
+        </p:nvCxnSpPr>
+        <p:spPr>
+          <a:xfrm rot="5400000" flipH="1" flipV="1">
+            <a:off x="2658188" y="5367849"/>
+            <a:ext cx="391944" cy="439654"/>
+          </a:xfrm>
+          <a:prstGeom prst="curvedConnector3">
+            <a:avLst/>
+          </a:prstGeom>
+          <a:ln>
+            <a:solidFill>
+              <a:schemeClr val="tx1"/>
+            </a:solidFill>
+            <a:tailEnd type="triangle"/>
+          </a:ln>
+        </p:spPr>
+        <p:style>
+          <a:lnRef idx="1">
+            <a:schemeClr val="accent1"/>
+          </a:lnRef>
+          <a:fillRef idx="0">
+            <a:schemeClr val="accent1"/>
+          </a:fillRef>
+          <a:effectRef idx="0">
+            <a:schemeClr val="accent1"/>
+          </a:effectRef>
+          <a:fontRef idx="minor">
+            <a:schemeClr val="tx1"/>
+          </a:fontRef>
+        </p:style>
+      </p:cxnSp>
+      <p:cxnSp>
+        <p:nvCxnSpPr>
+          <p:cNvPr id="25" name="Connector: Curved 24">
+            <a:extLst>
+              <a:ext uri="{FF2B5EF4-FFF2-40B4-BE49-F238E27FC236}">
+                <a16:creationId xmlns:a16="http://schemas.microsoft.com/office/drawing/2014/main" id="{14A77A54-D13B-8B72-652C-74008EAED4AB}"/>
+              </a:ext>
+            </a:extLst>
+          </p:cNvPr>
+          <p:cNvCxnSpPr>
+            <a:stCxn id="7" idx="4"/>
+            <a:endCxn id="19" idx="0"/>
+          </p:cNvCxnSpPr>
+          <p:nvPr/>
+        </p:nvCxnSpPr>
+        <p:spPr>
+          <a:xfrm rot="16200000" flipH="1">
+            <a:off x="2452395" y="5099194"/>
+            <a:ext cx="363876" cy="1005032"/>
+          </a:xfrm>
+          <a:prstGeom prst="curvedConnector3">
+            <a:avLst/>
+          </a:prstGeom>
+          <a:ln>
+            <a:solidFill>
+              <a:schemeClr val="tx1"/>
+            </a:solidFill>
+            <a:tailEnd type="triangle"/>
+          </a:ln>
+        </p:spPr>
+        <p:style>
+          <a:lnRef idx="1">
+            <a:schemeClr val="accent1"/>
+          </a:lnRef>
+          <a:fillRef idx="0">
+            <a:schemeClr val="accent1"/>
+          </a:fillRef>
+          <a:effectRef idx="0">
+            <a:schemeClr val="accent1"/>
+          </a:effectRef>
+          <a:fontRef idx="minor">
+            <a:schemeClr val="tx1"/>
+          </a:fontRef>
+        </p:style>
+      </p:cxnSp>
+      <p:cxnSp>
+        <p:nvCxnSpPr>
+          <p:cNvPr id="26" name="Connector: Curved 25">
+            <a:extLst>
+              <a:ext uri="{FF2B5EF4-FFF2-40B4-BE49-F238E27FC236}">
+                <a16:creationId xmlns:a16="http://schemas.microsoft.com/office/drawing/2014/main" id="{639D540E-AA23-451C-87D7-76B2AC184EB3}"/>
+              </a:ext>
+            </a:extLst>
+          </p:cNvPr>
+          <p:cNvCxnSpPr>
+            <a:stCxn id="8" idx="4"/>
+            <a:endCxn id="19" idx="0"/>
+          </p:cNvCxnSpPr>
+          <p:nvPr/>
+        </p:nvCxnSpPr>
+        <p:spPr>
+          <a:xfrm rot="16200000" flipH="1">
+            <a:off x="2703653" y="5350451"/>
+            <a:ext cx="363877" cy="502516"/>
+          </a:xfrm>
+          <a:prstGeom prst="curvedConnector3">
+            <a:avLst/>
+          </a:prstGeom>
+          <a:ln>
+            <a:solidFill>
+              <a:schemeClr val="tx1"/>
+            </a:solidFill>
+            <a:tailEnd type="triangle"/>
+          </a:ln>
+        </p:spPr>
+        <p:style>
+          <a:lnRef idx="1">
+            <a:schemeClr val="accent1"/>
+          </a:lnRef>
+          <a:fillRef idx="0">
+            <a:schemeClr val="accent1"/>
+          </a:fillRef>
+          <a:effectRef idx="0">
+            <a:schemeClr val="accent1"/>
+          </a:effectRef>
+          <a:fontRef idx="minor">
+            <a:schemeClr val="tx1"/>
+          </a:fontRef>
+        </p:style>
+      </p:cxnSp>
+      <p:cxnSp>
+        <p:nvCxnSpPr>
+          <p:cNvPr id="27" name="Connector: Curved 26">
+            <a:extLst>
+              <a:ext uri="{FF2B5EF4-FFF2-40B4-BE49-F238E27FC236}">
+                <a16:creationId xmlns:a16="http://schemas.microsoft.com/office/drawing/2014/main" id="{86E9EB95-D154-5E74-A48D-9D8DDEC51DFC}"/>
+              </a:ext>
+            </a:extLst>
+          </p:cNvPr>
+          <p:cNvCxnSpPr>
+            <a:stCxn id="17" idx="4"/>
+            <a:endCxn id="19" idx="4"/>
+          </p:cNvCxnSpPr>
+          <p:nvPr/>
+        </p:nvCxnSpPr>
+        <p:spPr>
+          <a:xfrm rot="5400000" flipH="1" flipV="1">
+            <a:off x="2634332" y="5472788"/>
+            <a:ext cx="1" cy="1005032"/>
+          </a:xfrm>
+          <a:prstGeom prst="curvedConnector3">
+            <a:avLst>
+              <a:gd name="adj1" fmla="val -22860000000"/>
+            </a:avLst>
+          </a:prstGeom>
+          <a:ln>
+            <a:solidFill>
+              <a:schemeClr val="tx1"/>
+            </a:solidFill>
+            <a:tailEnd type="triangle"/>
+          </a:ln>
+        </p:spPr>
+        <p:style>
+          <a:lnRef idx="1">
+            <a:schemeClr val="accent1"/>
+          </a:lnRef>
+          <a:fillRef idx="0">
+            <a:schemeClr val="accent1"/>
+          </a:fillRef>
+          <a:effectRef idx="0">
+            <a:schemeClr val="accent1"/>
+          </a:effectRef>
+          <a:fontRef idx="minor">
+            <a:schemeClr val="tx1"/>
+          </a:fontRef>
+        </p:style>
+      </p:cxnSp>
+      <p:cxnSp>
+        <p:nvCxnSpPr>
+          <p:cNvPr id="28" name="Connector: Curved 27">
+            <a:extLst>
+              <a:ext uri="{FF2B5EF4-FFF2-40B4-BE49-F238E27FC236}">
+                <a16:creationId xmlns:a16="http://schemas.microsoft.com/office/drawing/2014/main" id="{1F8BECBD-7C2C-12C4-4D9D-530A15DB5A4F}"/>
+              </a:ext>
+            </a:extLst>
+          </p:cNvPr>
+          <p:cNvCxnSpPr>
+            <a:stCxn id="18" idx="4"/>
+            <a:endCxn id="19" idx="4"/>
+          </p:cNvCxnSpPr>
+          <p:nvPr/>
+        </p:nvCxnSpPr>
+        <p:spPr>
+          <a:xfrm rot="16200000" flipH="1">
+            <a:off x="2885591" y="5724045"/>
+            <a:ext cx="12700" cy="502516"/>
+          </a:xfrm>
+          <a:prstGeom prst="curvedConnector3">
+            <a:avLst>
+              <a:gd name="adj1" fmla="val 1800000"/>
+            </a:avLst>
+          </a:prstGeom>
+          <a:ln>
+            <a:solidFill>
+              <a:schemeClr val="tx1"/>
+            </a:solidFill>
+            <a:tailEnd type="triangle"/>
+          </a:ln>
+        </p:spPr>
+        <p:style>
+          <a:lnRef idx="1">
+            <a:schemeClr val="accent1"/>
+          </a:lnRef>
+          <a:fillRef idx="0">
+            <a:schemeClr val="accent1"/>
+          </a:fillRef>
+          <a:effectRef idx="0">
+            <a:schemeClr val="accent1"/>
+          </a:effectRef>
+          <a:fontRef idx="minor">
+            <a:schemeClr val="tx1"/>
+          </a:fontRef>
+        </p:style>
+      </p:cxnSp>
     </p:spTree>
     <p:extLst>
       <p:ext uri="{BB962C8B-B14F-4D97-AF65-F5344CB8AC3E}">
-        <p14:creationId xmlns:p14="http://schemas.microsoft.com/office/powerpoint/2010/main" val="683960906"/>
+        <p14:creationId xmlns:p14="http://schemas.microsoft.com/office/powerpoint/2010/main" val="3289304602"/>
       </p:ext>
     </p:extLst>
   </p:cSld>
   <p:clrMapOvr>
     <a:masterClrMapping/>
   </p:clrMapOvr>
+  <p:timing>
+    <p:tnLst>
+      <p:par>
+        <p:cTn id="1" dur="indefinite" restart="never" nodeType="tmRoot">
+          <p:childTnLst>
+            <p:seq concurrent="1" nextAc="seek">
+              <p:cTn id="2" dur="indefinite" nodeType="mainSeq">
+                <p:childTnLst>
+                  <p:par>
+                    <p:cTn id="3" fill="hold">
+                      <p:stCondLst>
+                        <p:cond delay="indefinite"/>
+                      </p:stCondLst>
+                      <p:childTnLst>
+                        <p:par>
+                          <p:cTn id="4" fill="hold">
+                            <p:stCondLst>
+                              <p:cond delay="0"/>
+                            </p:stCondLst>
+                            <p:childTnLst>
+                              <p:par>
+                                <p:cTn id="5" presetID="1" presetClass="entr" presetSubtype="0" fill="hold" grpId="0" nodeType="clickEffect">
+                                  <p:stCondLst>
+                                    <p:cond delay="0"/>
+                                  </p:stCondLst>
+                                  <p:childTnLst>
+                                    <p:set>
+                                      <p:cBhvr>
+                                        <p:cTn id="6" dur="1" fill="hold">
+                                          <p:stCondLst>
+                                            <p:cond delay="0"/>
+                                          </p:stCondLst>
+                                        </p:cTn>
+                                        <p:tgtEl>
+                                          <p:spTgt spid="16"/>
+                                        </p:tgtEl>
+                                        <p:attrNameLst>
+                                          <p:attrName>style.visibility</p:attrName>
+                                        </p:attrNameLst>
+                                      </p:cBhvr>
+                                      <p:to>
+                                        <p:strVal val="visible"/>
+                                      </p:to>
+                                    </p:set>
+                                  </p:childTnLst>
+                                </p:cTn>
+                              </p:par>
+                              <p:par>
+                                <p:cTn id="7" presetID="1" presetClass="entr" presetSubtype="0" fill="hold" grpId="0" nodeType="withEffect">
+                                  <p:stCondLst>
+                                    <p:cond delay="0"/>
+                                  </p:stCondLst>
+                                  <p:childTnLst>
+                                    <p:set>
+                                      <p:cBhvr>
+                                        <p:cTn id="8" dur="1" fill="hold">
+                                          <p:stCondLst>
+                                            <p:cond delay="0"/>
+                                          </p:stCondLst>
+                                        </p:cTn>
+                                        <p:tgtEl>
+                                          <p:spTgt spid="17"/>
+                                        </p:tgtEl>
+                                        <p:attrNameLst>
+                                          <p:attrName>style.visibility</p:attrName>
+                                        </p:attrNameLst>
+                                      </p:cBhvr>
+                                      <p:to>
+                                        <p:strVal val="visible"/>
+                                      </p:to>
+                                    </p:set>
+                                  </p:childTnLst>
+                                </p:cTn>
+                              </p:par>
+                              <p:par>
+                                <p:cTn id="9" presetID="1" presetClass="entr" presetSubtype="0" fill="hold" grpId="0" nodeType="withEffect">
+                                  <p:stCondLst>
+                                    <p:cond delay="0"/>
+                                  </p:stCondLst>
+                                  <p:childTnLst>
+                                    <p:set>
+                                      <p:cBhvr>
+                                        <p:cTn id="10" dur="1" fill="hold">
+                                          <p:stCondLst>
+                                            <p:cond delay="0"/>
+                                          </p:stCondLst>
+                                        </p:cTn>
+                                        <p:tgtEl>
+                                          <p:spTgt spid="18"/>
+                                        </p:tgtEl>
+                                        <p:attrNameLst>
+                                          <p:attrName>style.visibility</p:attrName>
+                                        </p:attrNameLst>
+                                      </p:cBhvr>
+                                      <p:to>
+                                        <p:strVal val="visible"/>
+                                      </p:to>
+                                    </p:set>
+                                  </p:childTnLst>
+                                </p:cTn>
+                              </p:par>
+                              <p:par>
+                                <p:cTn id="11" presetID="1" presetClass="entr" presetSubtype="0" fill="hold" grpId="0" nodeType="withEffect">
+                                  <p:stCondLst>
+                                    <p:cond delay="0"/>
+                                  </p:stCondLst>
+                                  <p:childTnLst>
+                                    <p:set>
+                                      <p:cBhvr>
+                                        <p:cTn id="12" dur="1" fill="hold">
+                                          <p:stCondLst>
+                                            <p:cond delay="0"/>
+                                          </p:stCondLst>
+                                        </p:cTn>
+                                        <p:tgtEl>
+                                          <p:spTgt spid="19"/>
+                                        </p:tgtEl>
+                                        <p:attrNameLst>
+                                          <p:attrName>style.visibility</p:attrName>
+                                        </p:attrNameLst>
+                                      </p:cBhvr>
+                                      <p:to>
+                                        <p:strVal val="visible"/>
+                                      </p:to>
+                                    </p:set>
+                                  </p:childTnLst>
+                                </p:cTn>
+                              </p:par>
+                              <p:par>
+                                <p:cTn id="13" presetID="1" presetClass="entr" presetSubtype="0" fill="hold" grpId="0" nodeType="withEffect">
+                                  <p:stCondLst>
+                                    <p:cond delay="0"/>
+                                  </p:stCondLst>
+                                  <p:childTnLst>
+                                    <p:set>
+                                      <p:cBhvr>
+                                        <p:cTn id="14" dur="1" fill="hold">
+                                          <p:stCondLst>
+                                            <p:cond delay="0"/>
+                                          </p:stCondLst>
+                                        </p:cTn>
+                                        <p:tgtEl>
+                                          <p:spTgt spid="20"/>
+                                        </p:tgtEl>
+                                        <p:attrNameLst>
+                                          <p:attrName>style.visibility</p:attrName>
+                                        </p:attrNameLst>
+                                      </p:cBhvr>
+                                      <p:to>
+                                        <p:strVal val="visible"/>
+                                      </p:to>
+                                    </p:set>
+                                  </p:childTnLst>
+                                </p:cTn>
+                              </p:par>
+                              <p:par>
+                                <p:cTn id="15" presetID="1" presetClass="entr" presetSubtype="0" fill="hold" grpId="0" nodeType="withEffect">
+                                  <p:stCondLst>
+                                    <p:cond delay="0"/>
+                                  </p:stCondLst>
+                                  <p:childTnLst>
+                                    <p:set>
+                                      <p:cBhvr>
+                                        <p:cTn id="16" dur="1" fill="hold">
+                                          <p:stCondLst>
+                                            <p:cond delay="0"/>
+                                          </p:stCondLst>
+                                        </p:cTn>
+                                        <p:tgtEl>
+                                          <p:spTgt spid="21"/>
+                                        </p:tgtEl>
+                                        <p:attrNameLst>
+                                          <p:attrName>style.visibility</p:attrName>
+                                        </p:attrNameLst>
+                                      </p:cBhvr>
+                                      <p:to>
+                                        <p:strVal val="visible"/>
+                                      </p:to>
+                                    </p:set>
+                                  </p:childTnLst>
+                                </p:cTn>
+                              </p:par>
+                              <p:par>
+                                <p:cTn id="17" presetID="1" presetClass="entr" presetSubtype="0" fill="hold" grpId="0" nodeType="withEffect">
+                                  <p:stCondLst>
+                                    <p:cond delay="0"/>
+                                  </p:stCondLst>
+                                  <p:childTnLst>
+                                    <p:set>
+                                      <p:cBhvr>
+                                        <p:cTn id="18" dur="1" fill="hold">
+                                          <p:stCondLst>
+                                            <p:cond delay="0"/>
+                                          </p:stCondLst>
+                                        </p:cTn>
+                                        <p:tgtEl>
+                                          <p:spTgt spid="22"/>
+                                        </p:tgtEl>
+                                        <p:attrNameLst>
+                                          <p:attrName>style.visibility</p:attrName>
+                                        </p:attrNameLst>
+                                      </p:cBhvr>
+                                      <p:to>
+                                        <p:strVal val="visible"/>
+                                      </p:to>
+                                    </p:set>
+                                  </p:childTnLst>
+                                </p:cTn>
+                              </p:par>
+                              <p:par>
+                                <p:cTn id="19" presetID="1" presetClass="entr" presetSubtype="0" fill="hold" nodeType="withEffect">
+                                  <p:stCondLst>
+                                    <p:cond delay="0"/>
+                                  </p:stCondLst>
+                                  <p:childTnLst>
+                                    <p:set>
+                                      <p:cBhvr>
+                                        <p:cTn id="20" dur="1" fill="hold">
+                                          <p:stCondLst>
+                                            <p:cond delay="0"/>
+                                          </p:stCondLst>
+                                        </p:cTn>
+                                        <p:tgtEl>
+                                          <p:spTgt spid="24"/>
+                                        </p:tgtEl>
+                                        <p:attrNameLst>
+                                          <p:attrName>style.visibility</p:attrName>
+                                        </p:attrNameLst>
+                                      </p:cBhvr>
+                                      <p:to>
+                                        <p:strVal val="visible"/>
+                                      </p:to>
+                                    </p:set>
+                                  </p:childTnLst>
+                                </p:cTn>
+                              </p:par>
+                              <p:par>
+                                <p:cTn id="21" presetID="1" presetClass="entr" presetSubtype="0" fill="hold" nodeType="withEffect">
+                                  <p:stCondLst>
+                                    <p:cond delay="0"/>
+                                  </p:stCondLst>
+                                  <p:childTnLst>
+                                    <p:set>
+                                      <p:cBhvr>
+                                        <p:cTn id="22" dur="1" fill="hold">
+                                          <p:stCondLst>
+                                            <p:cond delay="0"/>
+                                          </p:stCondLst>
+                                        </p:cTn>
+                                        <p:tgtEl>
+                                          <p:spTgt spid="23"/>
+                                        </p:tgtEl>
+                                        <p:attrNameLst>
+                                          <p:attrName>style.visibility</p:attrName>
+                                        </p:attrNameLst>
+                                      </p:cBhvr>
+                                      <p:to>
+                                        <p:strVal val="visible"/>
+                                      </p:to>
+                                    </p:set>
+                                  </p:childTnLst>
+                                </p:cTn>
+                              </p:par>
+                            </p:childTnLst>
+                          </p:cTn>
+                        </p:par>
+                      </p:childTnLst>
+                    </p:cTn>
+                  </p:par>
+                  <p:par>
+                    <p:cTn id="23" fill="hold">
+                      <p:stCondLst>
+                        <p:cond delay="indefinite"/>
+                      </p:stCondLst>
+                      <p:childTnLst>
+                        <p:par>
+                          <p:cTn id="24" fill="hold">
+                            <p:stCondLst>
+                              <p:cond delay="0"/>
+                            </p:stCondLst>
+                            <p:childTnLst>
+                              <p:par>
+                                <p:cTn id="25" presetID="1" presetClass="entr" presetSubtype="0" fill="hold" nodeType="clickEffect">
+                                  <p:stCondLst>
+                                    <p:cond delay="0"/>
+                                  </p:stCondLst>
+                                  <p:childTnLst>
+                                    <p:set>
+                                      <p:cBhvr>
+                                        <p:cTn id="26" dur="1" fill="hold">
+                                          <p:stCondLst>
+                                            <p:cond delay="0"/>
+                                          </p:stCondLst>
+                                        </p:cTn>
+                                        <p:tgtEl>
+                                          <p:spTgt spid="28"/>
+                                        </p:tgtEl>
+                                        <p:attrNameLst>
+                                          <p:attrName>style.visibility</p:attrName>
+                                        </p:attrNameLst>
+                                      </p:cBhvr>
+                                      <p:to>
+                                        <p:strVal val="visible"/>
+                                      </p:to>
+                                    </p:set>
+                                  </p:childTnLst>
+                                </p:cTn>
+                              </p:par>
+                              <p:par>
+                                <p:cTn id="27" presetID="1" presetClass="entr" presetSubtype="0" fill="hold" nodeType="withEffect">
+                                  <p:stCondLst>
+                                    <p:cond delay="0"/>
+                                  </p:stCondLst>
+                                  <p:childTnLst>
+                                    <p:set>
+                                      <p:cBhvr>
+                                        <p:cTn id="28" dur="1" fill="hold">
+                                          <p:stCondLst>
+                                            <p:cond delay="0"/>
+                                          </p:stCondLst>
+                                        </p:cTn>
+                                        <p:tgtEl>
+                                          <p:spTgt spid="27"/>
+                                        </p:tgtEl>
+                                        <p:attrNameLst>
+                                          <p:attrName>style.visibility</p:attrName>
+                                        </p:attrNameLst>
+                                      </p:cBhvr>
+                                      <p:to>
+                                        <p:strVal val="visible"/>
+                                      </p:to>
+                                    </p:set>
+                                  </p:childTnLst>
+                                </p:cTn>
+                              </p:par>
+                              <p:par>
+                                <p:cTn id="29" presetID="1" presetClass="entr" presetSubtype="0" fill="hold" nodeType="withEffect">
+                                  <p:stCondLst>
+                                    <p:cond delay="0"/>
+                                  </p:stCondLst>
+                                  <p:childTnLst>
+                                    <p:set>
+                                      <p:cBhvr>
+                                        <p:cTn id="30" dur="1" fill="hold">
+                                          <p:stCondLst>
+                                            <p:cond delay="0"/>
+                                          </p:stCondLst>
+                                        </p:cTn>
+                                        <p:tgtEl>
+                                          <p:spTgt spid="26"/>
+                                        </p:tgtEl>
+                                        <p:attrNameLst>
+                                          <p:attrName>style.visibility</p:attrName>
+                                        </p:attrNameLst>
+                                      </p:cBhvr>
+                                      <p:to>
+                                        <p:strVal val="visible"/>
+                                      </p:to>
+                                    </p:set>
+                                  </p:childTnLst>
+                                </p:cTn>
+                              </p:par>
+                              <p:par>
+                                <p:cTn id="31" presetID="1" presetClass="entr" presetSubtype="0" fill="hold" nodeType="withEffect">
+                                  <p:stCondLst>
+                                    <p:cond delay="0"/>
+                                  </p:stCondLst>
+                                  <p:childTnLst>
+                                    <p:set>
+                                      <p:cBhvr>
+                                        <p:cTn id="32" dur="1" fill="hold">
+                                          <p:stCondLst>
+                                            <p:cond delay="0"/>
+                                          </p:stCondLst>
+                                        </p:cTn>
+                                        <p:tgtEl>
+                                          <p:spTgt spid="25"/>
+                                        </p:tgtEl>
+                                        <p:attrNameLst>
+                                          <p:attrName>style.visibility</p:attrName>
+                                        </p:attrNameLst>
+                                      </p:cBhvr>
+                                      <p:to>
+                                        <p:strVal val="visible"/>
+                                      </p:to>
+                                    </p:set>
+                                  </p:childTnLst>
+                                </p:cTn>
+                              </p:par>
+                            </p:childTnLst>
+                          </p:cTn>
+                        </p:par>
+                      </p:childTnLst>
+                    </p:cTn>
+                  </p:par>
+                </p:childTnLst>
+              </p:cTn>
+              <p:prevCondLst>
+                <p:cond evt="onPrev" delay="0">
+                  <p:tgtEl>
+                    <p:sldTgt/>
+                  </p:tgtEl>
+                </p:cond>
+              </p:prevCondLst>
+              <p:nextCondLst>
+                <p:cond evt="onNext" delay="0">
+                  <p:tgtEl>
+                    <p:sldTgt/>
+                  </p:tgtEl>
+                </p:cond>
+              </p:nextCondLst>
+            </p:seq>
+          </p:childTnLst>
+        </p:cTn>
+      </p:par>
+    </p:tnLst>
+    <p:bldLst>
+      <p:bldP spid="16" grpId="0" animBg="1"/>
+      <p:bldP spid="17" grpId="0" animBg="1"/>
+      <p:bldP spid="18" grpId="0" animBg="1"/>
+      <p:bldP spid="19" grpId="0" animBg="1"/>
+      <p:bldP spid="20" grpId="0" animBg="1"/>
+      <p:bldP spid="21" grpId="0" animBg="1"/>
+      <p:bldP spid="22" grpId="0"/>
+    </p:bldLst>
+  </p:timing>
 </p:sld>
 </file>
 
@@ -3790,10 +6184,10 @@
       </p:grpSpPr>
       <p:sp>
         <p:nvSpPr>
-          <p:cNvPr id="2" name="Title 1">
-            <a:extLst>
-              <a:ext uri="{FF2B5EF4-FFF2-40B4-BE49-F238E27FC236}">
-                <a16:creationId xmlns:a16="http://schemas.microsoft.com/office/drawing/2014/main" id="{E0328880-41C7-6813-2A09-C1BBFE9E70E7}"/>
+          <p:cNvPr id="3" name="Title 2">
+            <a:extLst>
+              <a:ext uri="{FF2B5EF4-FFF2-40B4-BE49-F238E27FC236}">
+                <a16:creationId xmlns:a16="http://schemas.microsoft.com/office/drawing/2014/main" id="{8B9C47DF-AB3F-2B17-D913-F2BA643651F2}"/>
               </a:ext>
             </a:extLst>
           </p:cNvPr>
@@ -3804,140 +6198,100 @@
             <p:ph type="title"/>
           </p:nvPr>
         </p:nvSpPr>
+        <p:spPr/>
+        <p:txBody>
+          <a:bodyPr/>
+          <a:lstStyle/>
+          <a:p>
+            <a:r>
+              <a:rPr lang="da-DK" dirty="0"/>
+              <a:t>OLS VAR regularization</a:t>
+            </a:r>
+            <a:endParaRPr lang="en-GB" dirty="0"/>
+          </a:p>
+        </p:txBody>
+      </p:sp>
+      <p:sp>
+        <p:nvSpPr>
+          <p:cNvPr id="5" name="Date Placeholder 1">
+            <a:extLst>
+              <a:ext uri="{FF2B5EF4-FFF2-40B4-BE49-F238E27FC236}">
+                <a16:creationId xmlns:a16="http://schemas.microsoft.com/office/drawing/2014/main" id="{183492D8-302C-5DDF-5D43-898AE0D5168B}"/>
+              </a:ext>
+            </a:extLst>
+          </p:cNvPr>
+          <p:cNvSpPr>
+            <a:spLocks noGrp="1"/>
+          </p:cNvSpPr>
+          <p:nvPr>
+            <p:ph type="dt" sz="half" idx="10"/>
+          </p:nvPr>
+        </p:nvSpPr>
         <p:spPr>
           <a:xfrm>
-            <a:off x="762001" y="1141711"/>
-            <a:ext cx="3234466" cy="3474364"/>
-          </a:xfrm>
-        </p:spPr>
-        <p:txBody>
-          <a:bodyPr vert="horz" lIns="91440" tIns="45720" rIns="91440" bIns="45720" rtlCol="0" anchor="t">
-            <a:normAutofit/>
-          </a:bodyPr>
-          <a:lstStyle/>
-          <a:p>
-            <a:r>
-              <a:rPr lang="en-US" sz="3600" kern="1200" dirty="0">
-                <a:solidFill>
-                  <a:schemeClr val="tx1"/>
-                </a:solidFill>
-                <a:latin typeface="+mj-lt"/>
-                <a:ea typeface="+mj-ea"/>
-                <a:cs typeface="+mj-cs"/>
-              </a:rPr>
-              <a:t>Comparing angle</a:t>
-            </a:r>
-            <a:br>
-              <a:rPr lang="en-US" sz="3600" kern="1200" dirty="0">
-                <a:solidFill>
-                  <a:schemeClr val="tx1"/>
-                </a:solidFill>
-                <a:latin typeface="+mj-lt"/>
-                <a:ea typeface="+mj-ea"/>
-                <a:cs typeface="+mj-cs"/>
-              </a:rPr>
-            </a:br>
-            <a:br>
-              <a:rPr lang="en-US" sz="3600" kern="1200" dirty="0">
-                <a:solidFill>
-                  <a:schemeClr val="tx1"/>
-                </a:solidFill>
-                <a:latin typeface="+mj-lt"/>
-                <a:ea typeface="+mj-ea"/>
-                <a:cs typeface="+mj-cs"/>
-              </a:rPr>
-            </a:br>
-            <a:r>
-              <a:rPr lang="en-US" sz="2000" kern="1200" dirty="0">
-                <a:solidFill>
-                  <a:schemeClr val="tx1"/>
-                </a:solidFill>
-                <a:latin typeface="+mj-lt"/>
-                <a:ea typeface="+mj-ea"/>
-                <a:cs typeface="+mj-cs"/>
-              </a:rPr>
-              <a:t>Model </a:t>
-            </a:r>
-            <a:r>
-              <a:rPr lang="en-US" sz="2000" kern="1200" dirty="0" err="1">
-                <a:solidFill>
-                  <a:schemeClr val="tx1"/>
-                </a:solidFill>
-                <a:latin typeface="+mj-lt"/>
-                <a:ea typeface="+mj-ea"/>
-                <a:cs typeface="+mj-cs"/>
-              </a:rPr>
-              <a:t>mae</a:t>
-            </a:r>
-            <a:r>
-              <a:rPr lang="en-US" sz="2000" kern="1200">
-                <a:solidFill>
-                  <a:schemeClr val="tx1"/>
-                </a:solidFill>
-                <a:latin typeface="+mj-lt"/>
-                <a:ea typeface="+mj-ea"/>
-                <a:cs typeface="+mj-cs"/>
-              </a:rPr>
-              <a:t>: </a:t>
-            </a:r>
-            <a:br>
-              <a:rPr lang="en-US" sz="2000" kern="1200">
-                <a:solidFill>
-                  <a:schemeClr val="tx1"/>
-                </a:solidFill>
-                <a:latin typeface="+mj-lt"/>
-                <a:ea typeface="+mj-ea"/>
-                <a:cs typeface="+mj-cs"/>
-              </a:rPr>
-            </a:br>
-            <a:r>
-              <a:rPr lang="en-US" sz="2000" kern="1200">
-                <a:solidFill>
-                  <a:schemeClr val="tx1"/>
-                </a:solidFill>
-                <a:latin typeface="+mj-lt"/>
-                <a:ea typeface="+mj-ea"/>
-                <a:cs typeface="+mj-cs"/>
-              </a:rPr>
-              <a:t>0.012 </a:t>
-            </a:r>
-            <a:r>
-              <a:rPr lang="en-US" sz="2000" kern="1200" dirty="0">
-                <a:solidFill>
-                  <a:schemeClr val="tx1"/>
-                </a:solidFill>
-                <a:latin typeface="+mj-lt"/>
-                <a:ea typeface="+mj-ea"/>
-                <a:cs typeface="+mj-cs"/>
-              </a:rPr>
-              <a:t>eV/Å</a:t>
-            </a:r>
-            <a:endParaRPr lang="en-US" sz="3600" kern="1200" dirty="0">
-              <a:solidFill>
-                <a:schemeClr val="tx1"/>
-              </a:solidFill>
-              <a:latin typeface="+mj-lt"/>
-              <a:ea typeface="+mj-ea"/>
-              <a:cs typeface="+mj-cs"/>
-            </a:endParaRPr>
+            <a:off x="838200" y="6356350"/>
+            <a:ext cx="2743200" cy="365125"/>
+          </a:xfrm>
+        </p:spPr>
+        <p:txBody>
+          <a:bodyPr/>
+          <a:lstStyle/>
+          <a:p>
+            <a:fld id="{DD0E0F33-965B-4006-BF25-D26E1C84904D}" type="datetime1">
+              <a:rPr lang="en-GB" smtClean="0"/>
+              <a:t>05/03/2024</a:t>
+            </a:fld>
+            <a:endParaRPr lang="en-GB" dirty="0"/>
+          </a:p>
+        </p:txBody>
+      </p:sp>
+      <p:sp>
+        <p:nvSpPr>
+          <p:cNvPr id="6" name="Slide Number Placeholder 2">
+            <a:extLst>
+              <a:ext uri="{FF2B5EF4-FFF2-40B4-BE49-F238E27FC236}">
+                <a16:creationId xmlns:a16="http://schemas.microsoft.com/office/drawing/2014/main" id="{C6AAA842-123F-F3C0-1189-7D7729A261DE}"/>
+              </a:ext>
+            </a:extLst>
+          </p:cNvPr>
+          <p:cNvSpPr>
+            <a:spLocks noGrp="1"/>
+          </p:cNvSpPr>
+          <p:nvPr>
+            <p:ph type="sldNum" sz="quarter" idx="12"/>
+          </p:nvPr>
+        </p:nvSpPr>
+        <p:spPr>
+          <a:xfrm>
+            <a:off x="8610600" y="6356350"/>
+            <a:ext cx="2743200" cy="365125"/>
+          </a:xfrm>
+        </p:spPr>
+        <p:txBody>
+          <a:bodyPr/>
+          <a:lstStyle/>
+          <a:p>
+            <a:fld id="{091A926C-488A-4E3E-9C21-57CAA120E114}" type="slidenum">
+              <a:rPr lang="en-GB" smtClean="0"/>
+              <a:t>3</a:t>
+            </a:fld>
+            <a:endParaRPr lang="en-GB" dirty="0"/>
           </a:p>
         </p:txBody>
       </p:sp>
       <p:pic>
         <p:nvPicPr>
-          <p:cNvPr id="5" name="Content Placeholder 4" descr="A graph of a graph of a graph&#10;&#10;Description automatically generated">
-            <a:extLst>
-              <a:ext uri="{FF2B5EF4-FFF2-40B4-BE49-F238E27FC236}">
-                <a16:creationId xmlns:a16="http://schemas.microsoft.com/office/drawing/2014/main" id="{E912A0D0-8053-1067-0152-A8AAED355EFC}"/>
+          <p:cNvPr id="8" name="Picture 7">
+            <a:extLst>
+              <a:ext uri="{FF2B5EF4-FFF2-40B4-BE49-F238E27FC236}">
+                <a16:creationId xmlns:a16="http://schemas.microsoft.com/office/drawing/2014/main" id="{351F94F4-E3B7-EB5C-7C10-38B4952AAFC1}"/>
               </a:ext>
             </a:extLst>
           </p:cNvPr>
           <p:cNvPicPr>
-            <a:picLocks noGrp="1" noChangeAspect="1"/>
+            <a:picLocks noChangeAspect="1"/>
           </p:cNvPicPr>
-          <p:nvPr>
-            <p:ph idx="1"/>
-          </p:nvPr>
+          <p:nvPr/>
         </p:nvPicPr>
         <p:blipFill>
           <a:blip r:embed="rId2">
@@ -3947,14 +6301,13 @@
               </a:ext>
             </a:extLst>
           </a:blip>
-          <a:stretch>
-            <a:fillRect/>
-          </a:stretch>
+          <a:srcRect/>
+          <a:stretch/>
         </p:blipFill>
         <p:spPr>
           <a:xfrm>
-            <a:off x="4615543" y="838302"/>
-            <a:ext cx="6711317" cy="5201273"/>
+            <a:off x="335280" y="2226209"/>
+            <a:ext cx="11521440" cy="3552559"/>
           </a:xfrm>
           <a:prstGeom prst="rect">
             <a:avLst/>
@@ -3964,7 +6317,7 @@
     </p:spTree>
     <p:extLst>
       <p:ext uri="{BB962C8B-B14F-4D97-AF65-F5344CB8AC3E}">
-        <p14:creationId xmlns:p14="http://schemas.microsoft.com/office/powerpoint/2010/main" val="2493231075"/>
+        <p14:creationId xmlns:p14="http://schemas.microsoft.com/office/powerpoint/2010/main" val="1709163067"/>
       </p:ext>
     </p:extLst>
   </p:cSld>
@@ -3977,6 +6330,14 @@
 <file path=ppt/slides/slide4.xml><?xml version="1.0" encoding="utf-8"?>
 <p:sld xmlns:a="http://schemas.openxmlformats.org/drawingml/2006/main" xmlns:r="http://schemas.openxmlformats.org/officeDocument/2006/relationships" xmlns:p="http://schemas.openxmlformats.org/presentationml/2006/main">
   <p:cSld>
+    <p:bg>
+      <p:bgPr>
+        <a:solidFill>
+          <a:schemeClr val="bg1"/>
+        </a:solidFill>
+        <a:effectLst/>
+      </p:bgPr>
+    </p:bg>
     <p:spTree>
       <p:nvGrpSpPr>
         <p:cNvPr id="1" name=""/>
@@ -3991,124 +6352,19 @@
           <a:chExt cx="0" cy="0"/>
         </a:xfrm>
       </p:grpSpPr>
-      <p:sp>
-        <p:nvSpPr>
-          <p:cNvPr id="7" name="Title 1">
-            <a:extLst>
-              <a:ext uri="{FF2B5EF4-FFF2-40B4-BE49-F238E27FC236}">
-                <a16:creationId xmlns:a16="http://schemas.microsoft.com/office/drawing/2014/main" id="{1092B001-612C-064D-8731-B535569F220A}"/>
-              </a:ext>
-            </a:extLst>
-          </p:cNvPr>
-          <p:cNvSpPr>
-            <a:spLocks noGrp="1"/>
-          </p:cNvSpPr>
-          <p:nvPr>
-            <p:ph type="title"/>
-          </p:nvPr>
-        </p:nvSpPr>
-        <p:spPr>
-          <a:xfrm>
-            <a:off x="762001" y="1141711"/>
-            <a:ext cx="3234466" cy="3474364"/>
-          </a:xfrm>
-        </p:spPr>
-        <p:txBody>
-          <a:bodyPr vert="horz" lIns="91440" tIns="45720" rIns="91440" bIns="45720" rtlCol="0" anchor="t">
-            <a:normAutofit/>
-          </a:bodyPr>
-          <a:lstStyle/>
-          <a:p>
-            <a:r>
-              <a:rPr lang="en-US" sz="3600" kern="1200" dirty="0">
-                <a:solidFill>
-                  <a:schemeClr val="tx1"/>
-                </a:solidFill>
-                <a:latin typeface="+mj-lt"/>
-                <a:ea typeface="+mj-ea"/>
-                <a:cs typeface="+mj-cs"/>
-              </a:rPr>
-              <a:t>Comparing dihedral</a:t>
-            </a:r>
-            <a:br>
-              <a:rPr lang="en-US" sz="3600" kern="1200" dirty="0">
-                <a:solidFill>
-                  <a:schemeClr val="tx1"/>
-                </a:solidFill>
-                <a:latin typeface="+mj-lt"/>
-                <a:ea typeface="+mj-ea"/>
-                <a:cs typeface="+mj-cs"/>
-              </a:rPr>
-            </a:br>
-            <a:br>
-              <a:rPr lang="en-US" sz="3600" kern="1200" dirty="0">
-                <a:solidFill>
-                  <a:schemeClr val="tx1"/>
-                </a:solidFill>
-                <a:latin typeface="+mj-lt"/>
-                <a:ea typeface="+mj-ea"/>
-                <a:cs typeface="+mj-cs"/>
-              </a:rPr>
-            </a:br>
-            <a:r>
-              <a:rPr lang="en-US" sz="2000" kern="1200" dirty="0">
-                <a:solidFill>
-                  <a:schemeClr val="tx1"/>
-                </a:solidFill>
-                <a:latin typeface="+mj-lt"/>
-                <a:ea typeface="+mj-ea"/>
-                <a:cs typeface="+mj-cs"/>
-              </a:rPr>
-              <a:t>Model </a:t>
-            </a:r>
-            <a:r>
-              <a:rPr lang="en-US" sz="2000" kern="1200" dirty="0" err="1">
-                <a:solidFill>
-                  <a:schemeClr val="tx1"/>
-                </a:solidFill>
-                <a:latin typeface="+mj-lt"/>
-                <a:ea typeface="+mj-ea"/>
-                <a:cs typeface="+mj-cs"/>
-              </a:rPr>
-              <a:t>mae</a:t>
-            </a:r>
-            <a:r>
-              <a:rPr lang="en-US" sz="2000" kern="1200" dirty="0">
-                <a:solidFill>
-                  <a:schemeClr val="tx1"/>
-                </a:solidFill>
-                <a:latin typeface="+mj-lt"/>
-                <a:ea typeface="+mj-ea"/>
-                <a:cs typeface="+mj-cs"/>
-              </a:rPr>
-              <a:t>: 0.056 eV/Å</a:t>
-            </a:r>
-            <a:endParaRPr lang="en-US" sz="3600" kern="1200" dirty="0">
-              <a:solidFill>
-                <a:schemeClr val="tx1"/>
-              </a:solidFill>
-              <a:latin typeface="+mj-lt"/>
-              <a:ea typeface="+mj-ea"/>
-              <a:cs typeface="+mj-cs"/>
-            </a:endParaRPr>
-          </a:p>
-        </p:txBody>
-      </p:sp>
       <p:pic>
         <p:nvPicPr>
-          <p:cNvPr id="5" name="Content Placeholder 4">
-            <a:extLst>
-              <a:ext uri="{FF2B5EF4-FFF2-40B4-BE49-F238E27FC236}">
-                <a16:creationId xmlns:a16="http://schemas.microsoft.com/office/drawing/2014/main" id="{7105CB3B-DC9B-B4D4-918F-B0EFFFD6FA73}"/>
+          <p:cNvPr id="6" name="Picture 5">
+            <a:extLst>
+              <a:ext uri="{FF2B5EF4-FFF2-40B4-BE49-F238E27FC236}">
+                <a16:creationId xmlns:a16="http://schemas.microsoft.com/office/drawing/2014/main" id="{4065F462-8577-12C9-75CC-127F460E2FEA}"/>
               </a:ext>
             </a:extLst>
           </p:cNvPr>
           <p:cNvPicPr>
-            <a:picLocks noGrp="1" noChangeAspect="1"/>
+            <a:picLocks noChangeAspect="1"/>
           </p:cNvPicPr>
-          <p:nvPr>
-            <p:ph idx="1"/>
-          </p:nvPr>
+          <p:nvPr/>
         </p:nvPicPr>
         <p:blipFill>
           <a:blip r:embed="rId2">
@@ -4123,8 +6379,74 @@
         </p:blipFill>
         <p:spPr>
           <a:xfrm>
-            <a:off x="4615543" y="855081"/>
-            <a:ext cx="6711317" cy="5167716"/>
+            <a:off x="3993502" y="164000"/>
+            <a:ext cx="7525312" cy="6580111"/>
+          </a:xfrm>
+          <a:prstGeom prst="rect">
+            <a:avLst/>
+          </a:prstGeom>
+        </p:spPr>
+      </p:pic>
+      <p:sp>
+        <p:nvSpPr>
+          <p:cNvPr id="9" name="TextBox 8">
+            <a:extLst>
+              <a:ext uri="{FF2B5EF4-FFF2-40B4-BE49-F238E27FC236}">
+                <a16:creationId xmlns:a16="http://schemas.microsoft.com/office/drawing/2014/main" id="{E5532A53-B0EB-09F3-039B-D326D5F1DA6A}"/>
+              </a:ext>
+            </a:extLst>
+          </p:cNvPr>
+          <p:cNvSpPr txBox="1"/>
+          <p:nvPr/>
+        </p:nvSpPr>
+        <p:spPr>
+          <a:xfrm>
+            <a:off x="597159" y="606491"/>
+            <a:ext cx="3107094" cy="1200329"/>
+          </a:xfrm>
+          <a:prstGeom prst="rect">
+            <a:avLst/>
+          </a:prstGeom>
+          <a:noFill/>
+        </p:spPr>
+        <p:txBody>
+          <a:bodyPr wrap="square" rtlCol="0">
+            <a:spAutoFit/>
+          </a:bodyPr>
+          <a:lstStyle/>
+          <a:p>
+            <a:r>
+              <a:rPr lang="da-DK" sz="3600" dirty="0"/>
+              <a:t>Distribution of angle</a:t>
+            </a:r>
+            <a:endParaRPr lang="en-GB" sz="3600" dirty="0"/>
+          </a:p>
+        </p:txBody>
+      </p:sp>
+      <p:pic>
+        <p:nvPicPr>
+          <p:cNvPr id="10" name="Billede 2">
+            <a:extLst>
+              <a:ext uri="{FF2B5EF4-FFF2-40B4-BE49-F238E27FC236}">
+                <a16:creationId xmlns:a16="http://schemas.microsoft.com/office/drawing/2014/main" id="{48BD58CF-CFC9-C762-A8BD-0894409D5746}"/>
+              </a:ext>
+            </a:extLst>
+          </p:cNvPr>
+          <p:cNvPicPr>
+            <a:picLocks noChangeAspect="1"/>
+          </p:cNvPicPr>
+          <p:nvPr/>
+        </p:nvPicPr>
+        <p:blipFill>
+          <a:blip r:embed="rId3"/>
+          <a:stretch>
+            <a:fillRect/>
+          </a:stretch>
+        </p:blipFill>
+        <p:spPr>
+          <a:xfrm>
+            <a:off x="408142" y="2682332"/>
+            <a:ext cx="2877221" cy="2162922"/>
           </a:xfrm>
           <a:prstGeom prst="rect">
             <a:avLst/>
@@ -4134,7 +6456,7 @@
     </p:spTree>
     <p:extLst>
       <p:ext uri="{BB962C8B-B14F-4D97-AF65-F5344CB8AC3E}">
-        <p14:creationId xmlns:p14="http://schemas.microsoft.com/office/powerpoint/2010/main" val="4268530491"/>
+        <p14:creationId xmlns:p14="http://schemas.microsoft.com/office/powerpoint/2010/main" val="1153429895"/>
       </p:ext>
     </p:extLst>
   </p:cSld>
@@ -4147,6 +6469,14 @@
 <file path=ppt/slides/slide5.xml><?xml version="1.0" encoding="utf-8"?>
 <p:sld xmlns:a="http://schemas.openxmlformats.org/drawingml/2006/main" xmlns:r="http://schemas.openxmlformats.org/officeDocument/2006/relationships" xmlns:p="http://schemas.openxmlformats.org/presentationml/2006/main">
   <p:cSld>
+    <p:bg>
+      <p:bgPr>
+        <a:solidFill>
+          <a:schemeClr val="bg1"/>
+        </a:solidFill>
+        <a:effectLst/>
+      </p:bgPr>
+    </p:bg>
     <p:spTree>
       <p:nvGrpSpPr>
         <p:cNvPr id="1" name=""/>
@@ -4161,12 +6491,72 @@
           <a:chExt cx="0" cy="0"/>
         </a:xfrm>
       </p:grpSpPr>
+      <p:sp useBgFill="1">
+        <p:nvSpPr>
+          <p:cNvPr id="12" name="Rectangle 11">
+            <a:extLst>
+              <a:ext uri="{FF2B5EF4-FFF2-40B4-BE49-F238E27FC236}">
+                <a16:creationId xmlns:a16="http://schemas.microsoft.com/office/drawing/2014/main" id="{53F29798-D584-4792-9B62-3F5F5C36D619}"/>
+              </a:ext>
+              <a:ext uri="{C183D7F6-B498-43B3-948B-1728B52AA6E4}">
+                <adec:decorative xmlns:adec="http://schemas.microsoft.com/office/drawing/2017/decorative" val="1"/>
+              </a:ext>
+            </a:extLst>
+          </p:cNvPr>
+          <p:cNvSpPr>
+            <a:spLocks noGrp="1" noRot="1" noChangeAspect="1" noMove="1" noResize="1" noEditPoints="1" noAdjustHandles="1" noChangeArrowheads="1" noChangeShapeType="1" noTextEdit="1"/>
+          </p:cNvSpPr>
+          <p:nvPr>
+            <p:extLst>
+              <p:ext uri="{386F3935-93C4-4BCD-93E2-E3B085C9AB24}">
+                <p16:designElem xmlns:p16="http://schemas.microsoft.com/office/powerpoint/2015/main" val="1"/>
+              </p:ext>
+            </p:extLst>
+          </p:nvPr>
+        </p:nvSpPr>
+        <p:spPr>
+          <a:xfrm>
+            <a:off x="0" y="0"/>
+            <a:ext cx="12188952" cy="6858000"/>
+          </a:xfrm>
+          <a:prstGeom prst="rect">
+            <a:avLst/>
+          </a:prstGeom>
+          <a:ln>
+            <a:noFill/>
+          </a:ln>
+        </p:spPr>
+        <p:style>
+          <a:lnRef idx="2">
+            <a:schemeClr val="accent1">
+              <a:shade val="50000"/>
+            </a:schemeClr>
+          </a:lnRef>
+          <a:fillRef idx="1">
+            <a:schemeClr val="accent1"/>
+          </a:fillRef>
+          <a:effectRef idx="0">
+            <a:schemeClr val="accent1"/>
+          </a:effectRef>
+          <a:fontRef idx="minor">
+            <a:schemeClr val="lt1"/>
+          </a:fontRef>
+        </p:style>
+        <p:txBody>
+          <a:bodyPr rtlCol="0" anchor="ctr"/>
+          <a:lstStyle/>
+          <a:p>
+            <a:pPr algn="ctr"/>
+            <a:endParaRPr lang="en-US"/>
+          </a:p>
+        </p:txBody>
+      </p:sp>
       <p:sp>
         <p:nvSpPr>
           <p:cNvPr id="2" name="Title 1">
             <a:extLst>
               <a:ext uri="{FF2B5EF4-FFF2-40B4-BE49-F238E27FC236}">
-                <a16:creationId xmlns:a16="http://schemas.microsoft.com/office/drawing/2014/main" id="{E0328880-41C7-6813-2A09-C1BBFE9E70E7}"/>
+                <a16:creationId xmlns:a16="http://schemas.microsoft.com/office/drawing/2014/main" id="{9505FA9E-8C96-FE9C-F9D1-8CF22868EE6A}"/>
               </a:ext>
             </a:extLst>
           </p:cNvPr>
@@ -4179,18 +6569,18 @@
         </p:nvSpPr>
         <p:spPr>
           <a:xfrm>
-            <a:off x="762001" y="1141711"/>
-            <a:ext cx="3234466" cy="3474364"/>
-          </a:xfrm>
-        </p:spPr>
-        <p:txBody>
-          <a:bodyPr vert="horz" lIns="91440" tIns="45720" rIns="91440" bIns="45720" rtlCol="0" anchor="t">
+            <a:off x="838200" y="184805"/>
+            <a:ext cx="10515600" cy="1505883"/>
+          </a:xfrm>
+        </p:spPr>
+        <p:txBody>
+          <a:bodyPr vert="horz" lIns="91440" tIns="45720" rIns="91440" bIns="45720" rtlCol="0" anchor="ctr">
             <a:normAutofit/>
           </a:bodyPr>
           <a:lstStyle/>
           <a:p>
             <a:r>
-              <a:rPr lang="en-US" sz="3600" kern="1200" dirty="0">
+              <a:rPr lang="en-US" sz="5200" kern="1200">
                 <a:solidFill>
                   <a:schemeClr val="tx1"/>
                 </a:solidFill>
@@ -4198,103 +6588,35 @@
                 <a:ea typeface="+mj-ea"/>
                 <a:cs typeface="+mj-cs"/>
               </a:rPr>
-              <a:t>Comparing dihedral</a:t>
-            </a:r>
-            <a:br>
-              <a:rPr lang="en-US" sz="3600" kern="1200" dirty="0">
-                <a:solidFill>
-                  <a:schemeClr val="tx1"/>
-                </a:solidFill>
-                <a:latin typeface="+mj-lt"/>
-                <a:ea typeface="+mj-ea"/>
-                <a:cs typeface="+mj-cs"/>
-              </a:rPr>
-            </a:br>
-            <a:br>
-              <a:rPr lang="en-US" sz="3600" kern="1200" dirty="0">
-                <a:solidFill>
-                  <a:schemeClr val="tx1"/>
-                </a:solidFill>
-                <a:latin typeface="+mj-lt"/>
-                <a:ea typeface="+mj-ea"/>
-                <a:cs typeface="+mj-cs"/>
-              </a:rPr>
-            </a:br>
-            <a:r>
-              <a:rPr lang="en-US" sz="2000" kern="1200" dirty="0">
-                <a:solidFill>
-                  <a:schemeClr val="tx1"/>
-                </a:solidFill>
-                <a:latin typeface="+mj-lt"/>
-                <a:ea typeface="+mj-ea"/>
-                <a:cs typeface="+mj-cs"/>
-              </a:rPr>
-              <a:t>Model </a:t>
-            </a:r>
-            <a:r>
-              <a:rPr lang="en-US" sz="2000" kern="1200" dirty="0" err="1">
-                <a:solidFill>
-                  <a:schemeClr val="tx1"/>
-                </a:solidFill>
-                <a:latin typeface="+mj-lt"/>
-                <a:ea typeface="+mj-ea"/>
-                <a:cs typeface="+mj-cs"/>
-              </a:rPr>
-              <a:t>mae</a:t>
-            </a:r>
-            <a:r>
-              <a:rPr lang="en-US" sz="2000" kern="1200" dirty="0">
-                <a:solidFill>
-                  <a:schemeClr val="tx1"/>
-                </a:solidFill>
-                <a:latin typeface="+mj-lt"/>
-                <a:ea typeface="+mj-ea"/>
-                <a:cs typeface="+mj-cs"/>
-              </a:rPr>
-              <a:t>: 0.012 eV/Å</a:t>
-            </a:r>
-            <a:endParaRPr lang="en-US" sz="3600" kern="1200" dirty="0">
-              <a:solidFill>
-                <a:schemeClr val="tx1"/>
-              </a:solidFill>
-              <a:latin typeface="+mj-lt"/>
-              <a:ea typeface="+mj-ea"/>
-              <a:cs typeface="+mj-cs"/>
-            </a:endParaRPr>
+              <a:t>KS score of angle comparison</a:t>
+            </a:r>
           </a:p>
         </p:txBody>
       </p:sp>
       <p:pic>
         <p:nvPicPr>
-          <p:cNvPr id="5" name="Content Placeholder 4">
-            <a:extLst>
-              <a:ext uri="{FF2B5EF4-FFF2-40B4-BE49-F238E27FC236}">
-                <a16:creationId xmlns:a16="http://schemas.microsoft.com/office/drawing/2014/main" id="{E912A0D0-8053-1067-0152-A8AAED355EFC}"/>
+          <p:cNvPr id="7" name="Picture 6">
+            <a:extLst>
+              <a:ext uri="{FF2B5EF4-FFF2-40B4-BE49-F238E27FC236}">
+                <a16:creationId xmlns:a16="http://schemas.microsoft.com/office/drawing/2014/main" id="{39D5D6B1-D735-2BE6-A3B0-9CA73BF3E5C1}"/>
               </a:ext>
             </a:extLst>
           </p:cNvPr>
           <p:cNvPicPr>
-            <a:picLocks noGrp="1" noChangeAspect="1"/>
+            <a:picLocks noChangeAspect="1"/>
           </p:cNvPicPr>
-          <p:nvPr>
-            <p:ph idx="1"/>
-          </p:nvPr>
+          <p:nvPr/>
         </p:nvPicPr>
         <p:blipFill>
-          <a:blip r:embed="rId2">
-            <a:extLst>
-              <a:ext uri="{28A0092B-C50C-407E-A947-70E740481C1C}">
-                <a14:useLocalDpi xmlns:a14="http://schemas.microsoft.com/office/drawing/2010/main" val="0"/>
-              </a:ext>
-            </a:extLst>
-          </a:blip>
-          <a:srcRect/>
-          <a:stretch/>
+          <a:blip r:embed="rId2"/>
+          <a:stretch>
+            <a:fillRect/>
+          </a:stretch>
         </p:blipFill>
         <p:spPr>
           <a:xfrm>
-            <a:off x="4615543" y="838302"/>
-            <a:ext cx="6711317" cy="5201273"/>
+            <a:off x="3176241" y="1845426"/>
+            <a:ext cx="5836464" cy="4450303"/>
           </a:xfrm>
           <a:prstGeom prst="rect">
             <a:avLst/>
@@ -4304,7 +6626,7 @@
     </p:spTree>
     <p:extLst>
       <p:ext uri="{BB962C8B-B14F-4D97-AF65-F5344CB8AC3E}">
-        <p14:creationId xmlns:p14="http://schemas.microsoft.com/office/powerpoint/2010/main" val="294663894"/>
+        <p14:creationId xmlns:p14="http://schemas.microsoft.com/office/powerpoint/2010/main" val="3466119397"/>
       </p:ext>
     </p:extLst>
   </p:cSld>
@@ -4354,7 +6676,7 @@
           <a:p>
             <a:r>
               <a:rPr lang="da-DK" dirty="0"/>
-              <a:t>Dihedral</a:t>
+              <a:t>2D histogram</a:t>
             </a:r>
             <a:endParaRPr lang="en-GB" dirty="0"/>
           </a:p>
@@ -4456,8 +6778,8 @@
         </p:blipFill>
         <p:spPr>
           <a:xfrm>
-            <a:off x="3998635" y="2035922"/>
-            <a:ext cx="3967206" cy="3105246"/>
+            <a:off x="3998635" y="2066681"/>
+            <a:ext cx="3967206" cy="3043727"/>
           </a:xfrm>
           <a:prstGeom prst="rect">
             <a:avLst/>
@@ -4468,6 +6790,334 @@
     <p:extLst>
       <p:ext uri="{BB962C8B-B14F-4D97-AF65-F5344CB8AC3E}">
         <p14:creationId xmlns:p14="http://schemas.microsoft.com/office/powerpoint/2010/main" val="3321509687"/>
+      </p:ext>
+    </p:extLst>
+  </p:cSld>
+  <p:clrMapOvr>
+    <a:masterClrMapping/>
+  </p:clrMapOvr>
+</p:sld>
+</file>
+
+<file path=ppt/slides/slide7.xml><?xml version="1.0" encoding="utf-8"?>
+<p:sld xmlns:a="http://schemas.openxmlformats.org/drawingml/2006/main" xmlns:r="http://schemas.openxmlformats.org/officeDocument/2006/relationships" xmlns:p="http://schemas.openxmlformats.org/presentationml/2006/main">
+  <p:cSld>
+    <p:spTree>
+      <p:nvGrpSpPr>
+        <p:cNvPr id="1" name=""/>
+        <p:cNvGrpSpPr/>
+        <p:nvPr/>
+      </p:nvGrpSpPr>
+      <p:grpSpPr>
+        <a:xfrm>
+          <a:off x="0" y="0"/>
+          <a:ext cx="0" cy="0"/>
+          <a:chOff x="0" y="0"/>
+          <a:chExt cx="0" cy="0"/>
+        </a:xfrm>
+      </p:grpSpPr>
+      <p:pic>
+        <p:nvPicPr>
+          <p:cNvPr id="6" name="Picture 5">
+            <a:extLst>
+              <a:ext uri="{FF2B5EF4-FFF2-40B4-BE49-F238E27FC236}">
+                <a16:creationId xmlns:a16="http://schemas.microsoft.com/office/drawing/2014/main" id="{4065F462-8577-12C9-75CC-127F460E2FEA}"/>
+              </a:ext>
+            </a:extLst>
+          </p:cNvPr>
+          <p:cNvPicPr>
+            <a:picLocks noChangeAspect="1"/>
+          </p:cNvPicPr>
+          <p:nvPr/>
+        </p:nvPicPr>
+        <p:blipFill>
+          <a:blip r:embed="rId2">
+            <a:extLst>
+              <a:ext uri="{28A0092B-C50C-407E-A947-70E740481C1C}">
+                <a14:useLocalDpi xmlns:a14="http://schemas.microsoft.com/office/drawing/2010/main" val="0"/>
+              </a:ext>
+            </a:extLst>
+          </a:blip>
+          <a:srcRect/>
+          <a:stretch/>
+        </p:blipFill>
+        <p:spPr>
+          <a:xfrm>
+            <a:off x="3993502" y="164000"/>
+            <a:ext cx="7525311" cy="6580111"/>
+          </a:xfrm>
+          <a:prstGeom prst="rect">
+            <a:avLst/>
+          </a:prstGeom>
+        </p:spPr>
+      </p:pic>
+      <p:sp>
+        <p:nvSpPr>
+          <p:cNvPr id="9" name="TextBox 8">
+            <a:extLst>
+              <a:ext uri="{FF2B5EF4-FFF2-40B4-BE49-F238E27FC236}">
+                <a16:creationId xmlns:a16="http://schemas.microsoft.com/office/drawing/2014/main" id="{E5532A53-B0EB-09F3-039B-D326D5F1DA6A}"/>
+              </a:ext>
+            </a:extLst>
+          </p:cNvPr>
+          <p:cNvSpPr txBox="1"/>
+          <p:nvPr/>
+        </p:nvSpPr>
+        <p:spPr>
+          <a:xfrm>
+            <a:off x="597159" y="606491"/>
+            <a:ext cx="3107094" cy="1200329"/>
+          </a:xfrm>
+          <a:prstGeom prst="rect">
+            <a:avLst/>
+          </a:prstGeom>
+          <a:noFill/>
+        </p:spPr>
+        <p:txBody>
+          <a:bodyPr wrap="square" rtlCol="0">
+            <a:spAutoFit/>
+          </a:bodyPr>
+          <a:lstStyle/>
+          <a:p>
+            <a:r>
+              <a:rPr lang="da-DK" sz="3600" dirty="0"/>
+              <a:t>Distribution of Dihedral</a:t>
+            </a:r>
+            <a:endParaRPr lang="en-GB" sz="3600" dirty="0"/>
+          </a:p>
+        </p:txBody>
+      </p:sp>
+      <p:pic>
+        <p:nvPicPr>
+          <p:cNvPr id="3" name="Picture 2">
+            <a:extLst>
+              <a:ext uri="{FF2B5EF4-FFF2-40B4-BE49-F238E27FC236}">
+                <a16:creationId xmlns:a16="http://schemas.microsoft.com/office/drawing/2014/main" id="{513F9822-81D6-B15A-7020-FB10178A7E5B}"/>
+              </a:ext>
+            </a:extLst>
+          </p:cNvPr>
+          <p:cNvPicPr>
+            <a:picLocks noChangeAspect="1"/>
+          </p:cNvPicPr>
+          <p:nvPr/>
+        </p:nvPicPr>
+        <p:blipFill>
+          <a:blip r:embed="rId3"/>
+          <a:stretch>
+            <a:fillRect/>
+          </a:stretch>
+        </p:blipFill>
+        <p:spPr>
+          <a:xfrm>
+            <a:off x="621437" y="2737747"/>
+            <a:ext cx="2832848" cy="1956234"/>
+          </a:xfrm>
+          <a:prstGeom prst="rect">
+            <a:avLst/>
+          </a:prstGeom>
+        </p:spPr>
+      </p:pic>
+    </p:spTree>
+    <p:extLst>
+      <p:ext uri="{BB962C8B-B14F-4D97-AF65-F5344CB8AC3E}">
+        <p14:creationId xmlns:p14="http://schemas.microsoft.com/office/powerpoint/2010/main" val="1168580303"/>
+      </p:ext>
+    </p:extLst>
+  </p:cSld>
+  <p:clrMapOvr>
+    <a:masterClrMapping/>
+  </p:clrMapOvr>
+</p:sld>
+</file>
+
+<file path=ppt/slides/slide8.xml><?xml version="1.0" encoding="utf-8"?>
+<p:sld xmlns:a="http://schemas.openxmlformats.org/drawingml/2006/main" xmlns:r="http://schemas.openxmlformats.org/officeDocument/2006/relationships" xmlns:p="http://schemas.openxmlformats.org/presentationml/2006/main">
+  <p:cSld>
+    <p:spTree>
+      <p:nvGrpSpPr>
+        <p:cNvPr id="1" name=""/>
+        <p:cNvGrpSpPr/>
+        <p:nvPr/>
+      </p:nvGrpSpPr>
+      <p:grpSpPr>
+        <a:xfrm>
+          <a:off x="0" y="0"/>
+          <a:ext cx="0" cy="0"/>
+          <a:chOff x="0" y="0"/>
+          <a:chExt cx="0" cy="0"/>
+        </a:xfrm>
+      </p:grpSpPr>
+      <p:sp>
+        <p:nvSpPr>
+          <p:cNvPr id="2" name="Title 1">
+            <a:extLst>
+              <a:ext uri="{FF2B5EF4-FFF2-40B4-BE49-F238E27FC236}">
+                <a16:creationId xmlns:a16="http://schemas.microsoft.com/office/drawing/2014/main" id="{9505FA9E-8C96-FE9C-F9D1-8CF22868EE6A}"/>
+              </a:ext>
+            </a:extLst>
+          </p:cNvPr>
+          <p:cNvSpPr>
+            <a:spLocks noGrp="1"/>
+          </p:cNvSpPr>
+          <p:nvPr>
+            <p:ph type="title"/>
+          </p:nvPr>
+        </p:nvSpPr>
+        <p:spPr>
+          <a:xfrm>
+            <a:off x="838200" y="184805"/>
+            <a:ext cx="10515600" cy="1505883"/>
+          </a:xfrm>
+        </p:spPr>
+        <p:txBody>
+          <a:bodyPr vert="horz" lIns="91440" tIns="45720" rIns="91440" bIns="45720" rtlCol="0" anchor="ctr">
+            <a:normAutofit/>
+          </a:bodyPr>
+          <a:lstStyle/>
+          <a:p>
+            <a:pPr algn="ctr"/>
+            <a:r>
+              <a:rPr lang="en-US" sz="5200" kern="1200" dirty="0">
+                <a:solidFill>
+                  <a:schemeClr val="tx1"/>
+                </a:solidFill>
+                <a:latin typeface="+mj-lt"/>
+                <a:ea typeface="+mj-ea"/>
+                <a:cs typeface="+mj-cs"/>
+              </a:rPr>
+              <a:t>KS score of dihedral comparison</a:t>
+            </a:r>
+          </a:p>
+        </p:txBody>
+      </p:sp>
+      <p:pic>
+        <p:nvPicPr>
+          <p:cNvPr id="7" name="Picture 6">
+            <a:extLst>
+              <a:ext uri="{FF2B5EF4-FFF2-40B4-BE49-F238E27FC236}">
+                <a16:creationId xmlns:a16="http://schemas.microsoft.com/office/drawing/2014/main" id="{39D5D6B1-D735-2BE6-A3B0-9CA73BF3E5C1}"/>
+              </a:ext>
+            </a:extLst>
+          </p:cNvPr>
+          <p:cNvPicPr>
+            <a:picLocks noChangeAspect="1"/>
+          </p:cNvPicPr>
+          <p:nvPr/>
+        </p:nvPicPr>
+        <p:blipFill>
+          <a:blip r:embed="rId2">
+            <a:extLst>
+              <a:ext uri="{28A0092B-C50C-407E-A947-70E740481C1C}">
+                <a14:useLocalDpi xmlns:a14="http://schemas.microsoft.com/office/drawing/2010/main" val="0"/>
+              </a:ext>
+            </a:extLst>
+          </a:blip>
+          <a:srcRect/>
+          <a:stretch/>
+        </p:blipFill>
+        <p:spPr>
+          <a:xfrm>
+            <a:off x="3176241" y="1848232"/>
+            <a:ext cx="5836464" cy="4444691"/>
+          </a:xfrm>
+          <a:prstGeom prst="rect">
+            <a:avLst/>
+          </a:prstGeom>
+        </p:spPr>
+      </p:pic>
+    </p:spTree>
+    <p:extLst>
+      <p:ext uri="{BB962C8B-B14F-4D97-AF65-F5344CB8AC3E}">
+        <p14:creationId xmlns:p14="http://schemas.microsoft.com/office/powerpoint/2010/main" val="2422346034"/>
+      </p:ext>
+    </p:extLst>
+  </p:cSld>
+  <p:clrMapOvr>
+    <a:masterClrMapping/>
+  </p:clrMapOvr>
+</p:sld>
+</file>
+
+<file path=ppt/slides/slide9.xml><?xml version="1.0" encoding="utf-8"?>
+<p:sld xmlns:a="http://schemas.openxmlformats.org/drawingml/2006/main" xmlns:r="http://schemas.openxmlformats.org/officeDocument/2006/relationships" xmlns:p="http://schemas.openxmlformats.org/presentationml/2006/main">
+  <p:cSld>
+    <p:spTree>
+      <p:nvGrpSpPr>
+        <p:cNvPr id="1" name=""/>
+        <p:cNvGrpSpPr/>
+        <p:nvPr/>
+      </p:nvGrpSpPr>
+      <p:grpSpPr>
+        <a:xfrm>
+          <a:off x="0" y="0"/>
+          <a:ext cx="0" cy="0"/>
+          <a:chOff x="0" y="0"/>
+          <a:chExt cx="0" cy="0"/>
+        </a:xfrm>
+      </p:grpSpPr>
+      <p:sp>
+        <p:nvSpPr>
+          <p:cNvPr id="2" name="Title 1">
+            <a:extLst>
+              <a:ext uri="{FF2B5EF4-FFF2-40B4-BE49-F238E27FC236}">
+                <a16:creationId xmlns:a16="http://schemas.microsoft.com/office/drawing/2014/main" id="{DCEE1F20-7212-8A3F-2305-E51C92B784CE}"/>
+              </a:ext>
+            </a:extLst>
+          </p:cNvPr>
+          <p:cNvSpPr>
+            <a:spLocks noGrp="1"/>
+          </p:cNvSpPr>
+          <p:nvPr>
+            <p:ph type="title"/>
+          </p:nvPr>
+        </p:nvSpPr>
+        <p:spPr/>
+        <p:txBody>
+          <a:bodyPr/>
+          <a:lstStyle/>
+          <a:p>
+            <a:pPr algn="ctr"/>
+            <a:r>
+              <a:rPr lang="da-DK" dirty="0"/>
+              <a:t>Time spent pr step for each simulation</a:t>
+            </a:r>
+            <a:endParaRPr lang="en-GB" dirty="0"/>
+          </a:p>
+        </p:txBody>
+      </p:sp>
+      <p:pic>
+        <p:nvPicPr>
+          <p:cNvPr id="5" name="Content Placeholder 4">
+            <a:extLst>
+              <a:ext uri="{FF2B5EF4-FFF2-40B4-BE49-F238E27FC236}">
+                <a16:creationId xmlns:a16="http://schemas.microsoft.com/office/drawing/2014/main" id="{3F821E9B-E514-E3FB-97DA-323E5DEB20BE}"/>
+              </a:ext>
+            </a:extLst>
+          </p:cNvPr>
+          <p:cNvPicPr>
+            <a:picLocks noGrp="1" noChangeAspect="1"/>
+          </p:cNvPicPr>
+          <p:nvPr>
+            <p:ph idx="1"/>
+          </p:nvPr>
+        </p:nvPicPr>
+        <p:blipFill>
+          <a:blip r:embed="rId2"/>
+          <a:stretch>
+            <a:fillRect/>
+          </a:stretch>
+        </p:blipFill>
+        <p:spPr>
+          <a:xfrm>
+            <a:off x="3243726" y="1825625"/>
+            <a:ext cx="5704547" cy="4351338"/>
+          </a:xfrm>
+        </p:spPr>
+      </p:pic>
+    </p:spTree>
+    <p:extLst>
+      <p:ext uri="{BB962C8B-B14F-4D97-AF65-F5344CB8AC3E}">
+        <p14:creationId xmlns:p14="http://schemas.microsoft.com/office/powerpoint/2010/main" val="851579503"/>
       </p:ext>
     </p:extLst>
   </p:cSld>

</xml_diff>

<commit_message>
updating plots and ppt
</commit_message>
<xml_diff>
--- a/Master thesis/Meetings/06-03 Comparing model and simulation.pptx
+++ b/Master thesis/Meetings/06-03 Comparing model and simulation.pptx
@@ -7,17 +7,19 @@
   <p:sldIdLst>
     <p:sldId id="256" r:id="rId2"/>
     <p:sldId id="492" r:id="rId3"/>
-    <p:sldId id="493" r:id="rId4"/>
-    <p:sldId id="496" r:id="rId5"/>
-    <p:sldId id="498" r:id="rId6"/>
-    <p:sldId id="259" r:id="rId7"/>
-    <p:sldId id="500" r:id="rId8"/>
-    <p:sldId id="501" r:id="rId9"/>
-    <p:sldId id="503" r:id="rId10"/>
-    <p:sldId id="494" r:id="rId11"/>
-    <p:sldId id="495" r:id="rId12"/>
-    <p:sldId id="502" r:id="rId13"/>
-    <p:sldId id="497" r:id="rId14"/>
+    <p:sldId id="507" r:id="rId4"/>
+    <p:sldId id="493" r:id="rId5"/>
+    <p:sldId id="496" r:id="rId6"/>
+    <p:sldId id="498" r:id="rId7"/>
+    <p:sldId id="259" r:id="rId8"/>
+    <p:sldId id="500" r:id="rId9"/>
+    <p:sldId id="501" r:id="rId10"/>
+    <p:sldId id="503" r:id="rId11"/>
+    <p:sldId id="494" r:id="rId12"/>
+    <p:sldId id="495" r:id="rId13"/>
+    <p:sldId id="505" r:id="rId14"/>
+    <p:sldId id="502" r:id="rId15"/>
+    <p:sldId id="497" r:id="rId16"/>
   </p:sldIdLst>
   <p:sldSz cx="12192000" cy="6858000"/>
   <p:notesSz cx="6858000" cy="9144000"/>
@@ -124,12 +126,20 @@
 </p:presentation>
 </file>
 
+<file path=ppt/revisionInfo.xml><?xml version="1.0" encoding="utf-8"?>
+<p1510:revInfo xmlns:a="http://schemas.openxmlformats.org/drawingml/2006/main" xmlns:r="http://schemas.openxmlformats.org/officeDocument/2006/relationships" xmlns:p1510="http://schemas.microsoft.com/office/powerpoint/2015/10/main">
+  <p1510:revLst>
+    <p1510:client id="{C11D7ED5-FBE8-4797-A956-863497D4E4C9}" v="2" dt="2024-03-06T10:08:44.786"/>
+  </p1510:revLst>
+</p1510:revInfo>
+</file>
+
 <file path=ppt/changesInfos/changesInfo1.xml><?xml version="1.0" encoding="utf-8"?>
 <pc:chgInfo xmlns:a="http://schemas.openxmlformats.org/drawingml/2006/main" xmlns:r="http://schemas.openxmlformats.org/officeDocument/2006/relationships" xmlns:ac="http://schemas.microsoft.com/office/drawing/2013/main/command" xmlns:pc="http://schemas.microsoft.com/office/powerpoint/2013/main/command">
   <pc:docChgLst>
     <pc:chgData name="Birk Nøhr Dissing" userId="9f16f90f-bd2a-4063-a72f-deae502fc0f4" providerId="ADAL" clId="{C11D7ED5-FBE8-4797-A956-863497D4E4C9}"/>
-    <pc:docChg chg="undo custSel modSld">
-      <pc:chgData name="Birk Nøhr Dissing" userId="9f16f90f-bd2a-4063-a72f-deae502fc0f4" providerId="ADAL" clId="{C11D7ED5-FBE8-4797-A956-863497D4E4C9}" dt="2024-03-04T12:36:24.624" v="93" actId="1076"/>
+    <pc:docChg chg="undo custSel addSld delSld modSld">
+      <pc:chgData name="Birk Nøhr Dissing" userId="9f16f90f-bd2a-4063-a72f-deae502fc0f4" providerId="ADAL" clId="{C11D7ED5-FBE8-4797-A956-863497D4E4C9}" dt="2024-03-06T11:12:54.442" v="228" actId="47"/>
       <pc:docMkLst>
         <pc:docMk/>
       </pc:docMkLst>
@@ -171,6 +181,189 @@
           </ac:spMkLst>
         </pc:spChg>
       </pc:sldChg>
+      <pc:sldChg chg="modSp mod">
+        <pc:chgData name="Birk Nøhr Dissing" userId="9f16f90f-bd2a-4063-a72f-deae502fc0f4" providerId="ADAL" clId="{C11D7ED5-FBE8-4797-A956-863497D4E4C9}" dt="2024-03-06T09:58:06.485" v="211" actId="1076"/>
+        <pc:sldMkLst>
+          <pc:docMk/>
+          <pc:sldMk cId="1215100649" sldId="494"/>
+        </pc:sldMkLst>
+        <pc:picChg chg="mod">
+          <ac:chgData name="Birk Nøhr Dissing" userId="9f16f90f-bd2a-4063-a72f-deae502fc0f4" providerId="ADAL" clId="{C11D7ED5-FBE8-4797-A956-863497D4E4C9}" dt="2024-03-06T09:58:06.485" v="211" actId="1076"/>
+          <ac:picMkLst>
+            <pc:docMk/>
+            <pc:sldMk cId="1215100649" sldId="494"/>
+            <ac:picMk id="8" creationId="{BD32B867-C520-A579-3E18-A0CDFCA5F996}"/>
+          </ac:picMkLst>
+        </pc:picChg>
+      </pc:sldChg>
+      <pc:sldChg chg="modSp mod">
+        <pc:chgData name="Birk Nøhr Dissing" userId="9f16f90f-bd2a-4063-a72f-deae502fc0f4" providerId="ADAL" clId="{C11D7ED5-FBE8-4797-A956-863497D4E4C9}" dt="2024-03-06T09:57:48.691" v="209" actId="1076"/>
+        <pc:sldMkLst>
+          <pc:docMk/>
+          <pc:sldMk cId="3211767963" sldId="495"/>
+        </pc:sldMkLst>
+        <pc:spChg chg="mod">
+          <ac:chgData name="Birk Nøhr Dissing" userId="9f16f90f-bd2a-4063-a72f-deae502fc0f4" providerId="ADAL" clId="{C11D7ED5-FBE8-4797-A956-863497D4E4C9}" dt="2024-03-06T09:56:29.714" v="203" actId="122"/>
+          <ac:spMkLst>
+            <pc:docMk/>
+            <pc:sldMk cId="3211767963" sldId="495"/>
+            <ac:spMk id="3" creationId="{7A19C08E-21AE-9330-A6AA-10242825EF6A}"/>
+          </ac:spMkLst>
+        </pc:spChg>
+        <pc:picChg chg="mod">
+          <ac:chgData name="Birk Nøhr Dissing" userId="9f16f90f-bd2a-4063-a72f-deae502fc0f4" providerId="ADAL" clId="{C11D7ED5-FBE8-4797-A956-863497D4E4C9}" dt="2024-03-06T09:57:48.691" v="209" actId="1076"/>
+          <ac:picMkLst>
+            <pc:docMk/>
+            <pc:sldMk cId="3211767963" sldId="495"/>
+            <ac:picMk id="8" creationId="{BD32B867-C520-A579-3E18-A0CDFCA5F996}"/>
+          </ac:picMkLst>
+        </pc:picChg>
+      </pc:sldChg>
+      <pc:sldChg chg="modSp mod">
+        <pc:chgData name="Birk Nøhr Dissing" userId="9f16f90f-bd2a-4063-a72f-deae502fc0f4" providerId="ADAL" clId="{C11D7ED5-FBE8-4797-A956-863497D4E4C9}" dt="2024-03-06T09:58:37.857" v="219" actId="122"/>
+        <pc:sldMkLst>
+          <pc:docMk/>
+          <pc:sldMk cId="3466119397" sldId="498"/>
+        </pc:sldMkLst>
+        <pc:spChg chg="mod">
+          <ac:chgData name="Birk Nøhr Dissing" userId="9f16f90f-bd2a-4063-a72f-deae502fc0f4" providerId="ADAL" clId="{C11D7ED5-FBE8-4797-A956-863497D4E4C9}" dt="2024-03-06T09:58:37.857" v="219" actId="122"/>
+          <ac:spMkLst>
+            <pc:docMk/>
+            <pc:sldMk cId="3466119397" sldId="498"/>
+            <ac:spMk id="2" creationId="{9505FA9E-8C96-FE9C-F9D1-8CF22868EE6A}"/>
+          </ac:spMkLst>
+        </pc:spChg>
+        <pc:picChg chg="mod">
+          <ac:chgData name="Birk Nøhr Dissing" userId="9f16f90f-bd2a-4063-a72f-deae502fc0f4" providerId="ADAL" clId="{C11D7ED5-FBE8-4797-A956-863497D4E4C9}" dt="2024-03-06T09:58:34.858" v="218" actId="1076"/>
+          <ac:picMkLst>
+            <pc:docMk/>
+            <pc:sldMk cId="3466119397" sldId="498"/>
+            <ac:picMk id="7" creationId="{39D5D6B1-D735-2BE6-A3B0-9CA73BF3E5C1}"/>
+          </ac:picMkLst>
+        </pc:picChg>
+      </pc:sldChg>
+      <pc:sldChg chg="modSp mod">
+        <pc:chgData name="Birk Nøhr Dissing" userId="9f16f90f-bd2a-4063-a72f-deae502fc0f4" providerId="ADAL" clId="{C11D7ED5-FBE8-4797-A956-863497D4E4C9}" dt="2024-03-06T09:58:26.047" v="216" actId="1076"/>
+        <pc:sldMkLst>
+          <pc:docMk/>
+          <pc:sldMk cId="2422346034" sldId="501"/>
+        </pc:sldMkLst>
+        <pc:picChg chg="mod">
+          <ac:chgData name="Birk Nøhr Dissing" userId="9f16f90f-bd2a-4063-a72f-deae502fc0f4" providerId="ADAL" clId="{C11D7ED5-FBE8-4797-A956-863497D4E4C9}" dt="2024-03-06T09:58:26.047" v="216" actId="1076"/>
+          <ac:picMkLst>
+            <pc:docMk/>
+            <pc:sldMk cId="2422346034" sldId="501"/>
+            <ac:picMk id="7" creationId="{39D5D6B1-D735-2BE6-A3B0-9CA73BF3E5C1}"/>
+          </ac:picMkLst>
+        </pc:picChg>
+      </pc:sldChg>
+      <pc:sldChg chg="modSp mod">
+        <pc:chgData name="Birk Nøhr Dissing" userId="9f16f90f-bd2a-4063-a72f-deae502fc0f4" providerId="ADAL" clId="{C11D7ED5-FBE8-4797-A956-863497D4E4C9}" dt="2024-03-06T09:58:15.378" v="213" actId="1076"/>
+        <pc:sldMkLst>
+          <pc:docMk/>
+          <pc:sldMk cId="851579503" sldId="503"/>
+        </pc:sldMkLst>
+        <pc:picChg chg="mod">
+          <ac:chgData name="Birk Nøhr Dissing" userId="9f16f90f-bd2a-4063-a72f-deae502fc0f4" providerId="ADAL" clId="{C11D7ED5-FBE8-4797-A956-863497D4E4C9}" dt="2024-03-06T09:58:15.378" v="213" actId="1076"/>
+          <ac:picMkLst>
+            <pc:docMk/>
+            <pc:sldMk cId="851579503" sldId="503"/>
+            <ac:picMk id="5" creationId="{3F821E9B-E514-E3FB-97DA-323E5DEB20BE}"/>
+          </ac:picMkLst>
+        </pc:picChg>
+      </pc:sldChg>
+      <pc:sldChg chg="addSp delSp modSp new del mod">
+        <pc:chgData name="Birk Nøhr Dissing" userId="9f16f90f-bd2a-4063-a72f-deae502fc0f4" providerId="ADAL" clId="{C11D7ED5-FBE8-4797-A956-863497D4E4C9}" dt="2024-03-06T11:12:54.442" v="228" actId="47"/>
+        <pc:sldMkLst>
+          <pc:docMk/>
+          <pc:sldMk cId="112015173" sldId="504"/>
+        </pc:sldMkLst>
+        <pc:spChg chg="del">
+          <ac:chgData name="Birk Nøhr Dissing" userId="9f16f90f-bd2a-4063-a72f-deae502fc0f4" providerId="ADAL" clId="{C11D7ED5-FBE8-4797-A956-863497D4E4C9}" dt="2024-03-06T09:55:23.108" v="124" actId="478"/>
+          <ac:spMkLst>
+            <pc:docMk/>
+            <pc:sldMk cId="112015173" sldId="504"/>
+            <ac:spMk id="2" creationId="{3F7724CE-9FF2-7F5C-B2E9-9AE10D5ACF84}"/>
+          </ac:spMkLst>
+        </pc:spChg>
+        <pc:spChg chg="mod">
+          <ac:chgData name="Birk Nøhr Dissing" userId="9f16f90f-bd2a-4063-a72f-deae502fc0f4" providerId="ADAL" clId="{C11D7ED5-FBE8-4797-A956-863497D4E4C9}" dt="2024-03-06T09:55:13.783" v="122" actId="20577"/>
+          <ac:spMkLst>
+            <pc:docMk/>
+            <pc:sldMk cId="112015173" sldId="504"/>
+            <ac:spMk id="3" creationId="{474A9EE5-668D-2994-9BDC-4D98D1822E2F}"/>
+          </ac:spMkLst>
+        </pc:spChg>
+        <pc:spChg chg="del">
+          <ac:chgData name="Birk Nøhr Dissing" userId="9f16f90f-bd2a-4063-a72f-deae502fc0f4" providerId="ADAL" clId="{C11D7ED5-FBE8-4797-A956-863497D4E4C9}" dt="2024-03-06T09:55:20.413" v="123" actId="478"/>
+          <ac:spMkLst>
+            <pc:docMk/>
+            <pc:sldMk cId="112015173" sldId="504"/>
+            <ac:spMk id="4" creationId="{AB3FCD20-EB48-A5A4-D2EB-039541844727}"/>
+          </ac:spMkLst>
+        </pc:spChg>
+        <pc:picChg chg="add del">
+          <ac:chgData name="Birk Nøhr Dissing" userId="9f16f90f-bd2a-4063-a72f-deae502fc0f4" providerId="ADAL" clId="{C11D7ED5-FBE8-4797-A956-863497D4E4C9}" dt="2024-03-06T09:55:38.850" v="126" actId="478"/>
+          <ac:picMkLst>
+            <pc:docMk/>
+            <pc:sldMk cId="112015173" sldId="504"/>
+            <ac:picMk id="6" creationId="{443F21DC-B4E1-A95A-1B6D-50D8D817B8FA}"/>
+          </ac:picMkLst>
+        </pc:picChg>
+      </pc:sldChg>
+      <pc:sldChg chg="modSp add mod">
+        <pc:chgData name="Birk Nøhr Dissing" userId="9f16f90f-bd2a-4063-a72f-deae502fc0f4" providerId="ADAL" clId="{C11D7ED5-FBE8-4797-A956-863497D4E4C9}" dt="2024-03-06T09:57:42.053" v="207" actId="1076"/>
+        <pc:sldMkLst>
+          <pc:docMk/>
+          <pc:sldMk cId="970354515" sldId="505"/>
+        </pc:sldMkLst>
+        <pc:spChg chg="mod">
+          <ac:chgData name="Birk Nøhr Dissing" userId="9f16f90f-bd2a-4063-a72f-deae502fc0f4" providerId="ADAL" clId="{C11D7ED5-FBE8-4797-A956-863497D4E4C9}" dt="2024-03-06T09:56:35.851" v="205" actId="122"/>
+          <ac:spMkLst>
+            <pc:docMk/>
+            <pc:sldMk cId="970354515" sldId="505"/>
+            <ac:spMk id="3" creationId="{7A19C08E-21AE-9330-A6AA-10242825EF6A}"/>
+          </ac:spMkLst>
+        </pc:spChg>
+        <pc:picChg chg="mod">
+          <ac:chgData name="Birk Nøhr Dissing" userId="9f16f90f-bd2a-4063-a72f-deae502fc0f4" providerId="ADAL" clId="{C11D7ED5-FBE8-4797-A956-863497D4E4C9}" dt="2024-03-06T09:57:42.053" v="207" actId="1076"/>
+          <ac:picMkLst>
+            <pc:docMk/>
+            <pc:sldMk cId="970354515" sldId="505"/>
+            <ac:picMk id="8" creationId="{BD32B867-C520-A579-3E18-A0CDFCA5F996}"/>
+          </ac:picMkLst>
+        </pc:picChg>
+      </pc:sldChg>
+      <pc:sldChg chg="new del">
+        <pc:chgData name="Birk Nøhr Dissing" userId="9f16f90f-bd2a-4063-a72f-deae502fc0f4" providerId="ADAL" clId="{C11D7ED5-FBE8-4797-A956-863497D4E4C9}" dt="2024-03-06T10:08:46.708" v="222" actId="47"/>
+        <pc:sldMkLst>
+          <pc:docMk/>
+          <pc:sldMk cId="456851374" sldId="506"/>
+        </pc:sldMkLst>
+      </pc:sldChg>
+      <pc:sldChg chg="addSp delSp modSp add mod addAnim delAnim">
+        <pc:chgData name="Birk Nøhr Dissing" userId="9f16f90f-bd2a-4063-a72f-deae502fc0f4" providerId="ADAL" clId="{C11D7ED5-FBE8-4797-A956-863497D4E4C9}" dt="2024-03-06T10:09:01.282" v="227" actId="20577"/>
+        <pc:sldMkLst>
+          <pc:docMk/>
+          <pc:sldMk cId="157822472" sldId="507"/>
+        </pc:sldMkLst>
+        <pc:spChg chg="mod">
+          <ac:chgData name="Birk Nøhr Dissing" userId="9f16f90f-bd2a-4063-a72f-deae502fc0f4" providerId="ADAL" clId="{C11D7ED5-FBE8-4797-A956-863497D4E4C9}" dt="2024-03-06T10:09:01.282" v="227" actId="20577"/>
+          <ac:spMkLst>
+            <pc:docMk/>
+            <pc:sldMk cId="157822472" sldId="507"/>
+            <ac:spMk id="3" creationId="{581F3AEC-739E-A381-E3EF-950D69806FFE}"/>
+          </ac:spMkLst>
+        </pc:spChg>
+        <pc:picChg chg="add del">
+          <ac:chgData name="Birk Nøhr Dissing" userId="9f16f90f-bd2a-4063-a72f-deae502fc0f4" providerId="ADAL" clId="{C11D7ED5-FBE8-4797-A956-863497D4E4C9}" dt="2024-03-06T10:08:57.752" v="226" actId="478"/>
+          <ac:picMkLst>
+            <pc:docMk/>
+            <pc:sldMk cId="157822472" sldId="507"/>
+            <ac:picMk id="7" creationId="{7A0AC0D2-BCB4-45B6-FD34-C4A4BC982E6A}"/>
+          </ac:picMkLst>
+        </pc:picChg>
+      </pc:sldChg>
     </pc:docChg>
   </pc:docChgLst>
 </pc:chgInfo>
@@ -325,7 +518,7 @@
           <a:p>
             <a:fld id="{09E97F70-84DE-42B7-9F34-EEF1D7EF4F70}" type="datetimeFigureOut">
               <a:rPr lang="en-GB" smtClean="0"/>
-              <a:t>05/03/2024</a:t>
+              <a:t>06/03/2024</a:t>
             </a:fld>
             <a:endParaRPr lang="en-GB"/>
           </a:p>
@@ -379,7 +572,7 @@
           <a:p>
             <a:fld id="{D3A8DC05-A492-4925-AD9C-10E003E84CDB}" type="slidenum">
               <a:rPr lang="en-GB" smtClean="0"/>
-              <a:t>‹#›</a:t>
+              <a:t>‹nr.›</a:t>
             </a:fld>
             <a:endParaRPr lang="en-GB"/>
           </a:p>
@@ -525,7 +718,7 @@
           <a:p>
             <a:fld id="{09E97F70-84DE-42B7-9F34-EEF1D7EF4F70}" type="datetimeFigureOut">
               <a:rPr lang="en-GB" smtClean="0"/>
-              <a:t>05/03/2024</a:t>
+              <a:t>06/03/2024</a:t>
             </a:fld>
             <a:endParaRPr lang="en-GB"/>
           </a:p>
@@ -579,7 +772,7 @@
           <a:p>
             <a:fld id="{D3A8DC05-A492-4925-AD9C-10E003E84CDB}" type="slidenum">
               <a:rPr lang="en-GB" smtClean="0"/>
-              <a:t>‹#›</a:t>
+              <a:t>‹nr.›</a:t>
             </a:fld>
             <a:endParaRPr lang="en-GB"/>
           </a:p>
@@ -735,7 +928,7 @@
           <a:p>
             <a:fld id="{09E97F70-84DE-42B7-9F34-EEF1D7EF4F70}" type="datetimeFigureOut">
               <a:rPr lang="en-GB" smtClean="0"/>
-              <a:t>05/03/2024</a:t>
+              <a:t>06/03/2024</a:t>
             </a:fld>
             <a:endParaRPr lang="en-GB"/>
           </a:p>
@@ -789,7 +982,7 @@
           <a:p>
             <a:fld id="{D3A8DC05-A492-4925-AD9C-10E003E84CDB}" type="slidenum">
               <a:rPr lang="en-GB" smtClean="0"/>
-              <a:t>‹#›</a:t>
+              <a:t>‹nr.›</a:t>
             </a:fld>
             <a:endParaRPr lang="en-GB"/>
           </a:p>
@@ -994,7 +1187,7 @@
           <a:p>
             <a:fld id="{782CEA36-139A-4E3F-B6A0-7BD657AD45E8}" type="datetime1">
               <a:rPr lang="en-GB" smtClean="0"/>
-              <a:t>05/03/2024</a:t>
+              <a:t>06/03/2024</a:t>
             </a:fld>
             <a:endParaRPr lang="en-GB" dirty="0"/>
           </a:p>
@@ -1036,7 +1229,7 @@
           <a:p>
             <a:fld id="{091A926C-488A-4E3E-9C21-57CAA120E114}" type="slidenum">
               <a:rPr lang="en-GB" smtClean="0"/>
-              <a:t>‹#›</a:t>
+              <a:t>‹nr.›</a:t>
             </a:fld>
             <a:endParaRPr lang="en-GB" dirty="0"/>
           </a:p>
@@ -1182,7 +1375,7 @@
           <a:p>
             <a:fld id="{09E97F70-84DE-42B7-9F34-EEF1D7EF4F70}" type="datetimeFigureOut">
               <a:rPr lang="en-GB" smtClean="0"/>
-              <a:t>05/03/2024</a:t>
+              <a:t>06/03/2024</a:t>
             </a:fld>
             <a:endParaRPr lang="en-GB"/>
           </a:p>
@@ -1236,7 +1429,7 @@
           <a:p>
             <a:fld id="{D3A8DC05-A492-4925-AD9C-10E003E84CDB}" type="slidenum">
               <a:rPr lang="en-GB" smtClean="0"/>
-              <a:t>‹#›</a:t>
+              <a:t>‹nr.›</a:t>
             </a:fld>
             <a:endParaRPr lang="en-GB"/>
           </a:p>
@@ -1458,7 +1651,7 @@
           <a:p>
             <a:fld id="{09E97F70-84DE-42B7-9F34-EEF1D7EF4F70}" type="datetimeFigureOut">
               <a:rPr lang="en-GB" smtClean="0"/>
-              <a:t>05/03/2024</a:t>
+              <a:t>06/03/2024</a:t>
             </a:fld>
             <a:endParaRPr lang="en-GB"/>
           </a:p>
@@ -1512,7 +1705,7 @@
           <a:p>
             <a:fld id="{D3A8DC05-A492-4925-AD9C-10E003E84CDB}" type="slidenum">
               <a:rPr lang="en-GB" smtClean="0"/>
-              <a:t>‹#›</a:t>
+              <a:t>‹nr.›</a:t>
             </a:fld>
             <a:endParaRPr lang="en-GB"/>
           </a:p>
@@ -1726,7 +1919,7 @@
           <a:p>
             <a:fld id="{09E97F70-84DE-42B7-9F34-EEF1D7EF4F70}" type="datetimeFigureOut">
               <a:rPr lang="en-GB" smtClean="0"/>
-              <a:t>05/03/2024</a:t>
+              <a:t>06/03/2024</a:t>
             </a:fld>
             <a:endParaRPr lang="en-GB"/>
           </a:p>
@@ -1780,7 +1973,7 @@
           <a:p>
             <a:fld id="{D3A8DC05-A492-4925-AD9C-10E003E84CDB}" type="slidenum">
               <a:rPr lang="en-GB" smtClean="0"/>
-              <a:t>‹#›</a:t>
+              <a:t>‹nr.›</a:t>
             </a:fld>
             <a:endParaRPr lang="en-GB"/>
           </a:p>
@@ -2141,7 +2334,7 @@
           <a:p>
             <a:fld id="{09E97F70-84DE-42B7-9F34-EEF1D7EF4F70}" type="datetimeFigureOut">
               <a:rPr lang="en-GB" smtClean="0"/>
-              <a:t>05/03/2024</a:t>
+              <a:t>06/03/2024</a:t>
             </a:fld>
             <a:endParaRPr lang="en-GB"/>
           </a:p>
@@ -2195,7 +2388,7 @@
           <a:p>
             <a:fld id="{D3A8DC05-A492-4925-AD9C-10E003E84CDB}" type="slidenum">
               <a:rPr lang="en-GB" smtClean="0"/>
-              <a:t>‹#›</a:t>
+              <a:t>‹nr.›</a:t>
             </a:fld>
             <a:endParaRPr lang="en-GB"/>
           </a:p>
@@ -2283,7 +2476,7 @@
           <a:p>
             <a:fld id="{09E97F70-84DE-42B7-9F34-EEF1D7EF4F70}" type="datetimeFigureOut">
               <a:rPr lang="en-GB" smtClean="0"/>
-              <a:t>05/03/2024</a:t>
+              <a:t>06/03/2024</a:t>
             </a:fld>
             <a:endParaRPr lang="en-GB"/>
           </a:p>
@@ -2337,7 +2530,7 @@
           <a:p>
             <a:fld id="{D3A8DC05-A492-4925-AD9C-10E003E84CDB}" type="slidenum">
               <a:rPr lang="en-GB" smtClean="0"/>
-              <a:t>‹#›</a:t>
+              <a:t>‹nr.›</a:t>
             </a:fld>
             <a:endParaRPr lang="en-GB"/>
           </a:p>
@@ -2396,7 +2589,7 @@
           <a:p>
             <a:fld id="{09E97F70-84DE-42B7-9F34-EEF1D7EF4F70}" type="datetimeFigureOut">
               <a:rPr lang="en-GB" smtClean="0"/>
-              <a:t>05/03/2024</a:t>
+              <a:t>06/03/2024</a:t>
             </a:fld>
             <a:endParaRPr lang="en-GB"/>
           </a:p>
@@ -2450,7 +2643,7 @@
           <a:p>
             <a:fld id="{D3A8DC05-A492-4925-AD9C-10E003E84CDB}" type="slidenum">
               <a:rPr lang="en-GB" smtClean="0"/>
-              <a:t>‹#›</a:t>
+              <a:t>‹nr.›</a:t>
             </a:fld>
             <a:endParaRPr lang="en-GB"/>
           </a:p>
@@ -2709,7 +2902,7 @@
           <a:p>
             <a:fld id="{09E97F70-84DE-42B7-9F34-EEF1D7EF4F70}" type="datetimeFigureOut">
               <a:rPr lang="en-GB" smtClean="0"/>
-              <a:t>05/03/2024</a:t>
+              <a:t>06/03/2024</a:t>
             </a:fld>
             <a:endParaRPr lang="en-GB"/>
           </a:p>
@@ -2763,7 +2956,7 @@
           <a:p>
             <a:fld id="{D3A8DC05-A492-4925-AD9C-10E003E84CDB}" type="slidenum">
               <a:rPr lang="en-GB" smtClean="0"/>
-              <a:t>‹#›</a:t>
+              <a:t>‹nr.›</a:t>
             </a:fld>
             <a:endParaRPr lang="en-GB"/>
           </a:p>
@@ -2998,7 +3191,7 @@
           <a:p>
             <a:fld id="{09E97F70-84DE-42B7-9F34-EEF1D7EF4F70}" type="datetimeFigureOut">
               <a:rPr lang="en-GB" smtClean="0"/>
-              <a:t>05/03/2024</a:t>
+              <a:t>06/03/2024</a:t>
             </a:fld>
             <a:endParaRPr lang="en-GB"/>
           </a:p>
@@ -3052,7 +3245,7 @@
           <a:p>
             <a:fld id="{D3A8DC05-A492-4925-AD9C-10E003E84CDB}" type="slidenum">
               <a:rPr lang="en-GB" smtClean="0"/>
-              <a:t>‹#›</a:t>
+              <a:t>‹nr.›</a:t>
             </a:fld>
             <a:endParaRPr lang="en-GB"/>
           </a:p>
@@ -3241,7 +3434,7 @@
           <a:p>
             <a:fld id="{09E97F70-84DE-42B7-9F34-EEF1D7EF4F70}" type="datetimeFigureOut">
               <a:rPr lang="en-GB" smtClean="0"/>
-              <a:t>05/03/2024</a:t>
+              <a:t>06/03/2024</a:t>
             </a:fld>
             <a:endParaRPr lang="en-GB"/>
           </a:p>
@@ -3331,7 +3524,7 @@
           <a:p>
             <a:fld id="{D3A8DC05-A492-4925-AD9C-10E003E84CDB}" type="slidenum">
               <a:rPr lang="en-GB" smtClean="0"/>
-              <a:t>‹#›</a:t>
+              <a:t>‹nr.›</a:t>
             </a:fld>
             <a:endParaRPr lang="en-GB"/>
           </a:p>
@@ -3745,10 +3938,10 @@
       </p:grpSpPr>
       <p:sp>
         <p:nvSpPr>
-          <p:cNvPr id="3" name="Title 2">
-            <a:extLst>
-              <a:ext uri="{FF2B5EF4-FFF2-40B4-BE49-F238E27FC236}">
-                <a16:creationId xmlns:a16="http://schemas.microsoft.com/office/drawing/2014/main" id="{7A19C08E-21AE-9330-A6AA-10242825EF6A}"/>
+          <p:cNvPr id="2" name="Title 1">
+            <a:extLst>
+              <a:ext uri="{FF2B5EF4-FFF2-40B4-BE49-F238E27FC236}">
+                <a16:creationId xmlns:a16="http://schemas.microsoft.com/office/drawing/2014/main" id="{DCEE1F20-7212-8A3F-2305-E51C92B784CE}"/>
               </a:ext>
             </a:extLst>
           </p:cNvPr>
@@ -3759,46 +3952,35 @@
             <p:ph type="title"/>
           </p:nvPr>
         </p:nvSpPr>
-        <p:spPr>
-          <a:xfrm>
-            <a:off x="838200" y="184805"/>
-            <a:ext cx="10515600" cy="1505883"/>
-          </a:xfrm>
-        </p:spPr>
-        <p:txBody>
-          <a:bodyPr vert="horz" lIns="91440" tIns="45720" rIns="91440" bIns="45720" rtlCol="0" anchor="ctr">
-            <a:normAutofit/>
-          </a:bodyPr>
+        <p:spPr/>
+        <p:txBody>
+          <a:bodyPr/>
           <a:lstStyle/>
           <a:p>
             <a:pPr algn="ctr"/>
             <a:r>
-              <a:rPr lang="en-US" sz="5200" kern="1200" dirty="0">
-                <a:solidFill>
-                  <a:schemeClr val="tx1"/>
-                </a:solidFill>
-                <a:latin typeface="+mj-lt"/>
-                <a:ea typeface="+mj-ea"/>
-                <a:cs typeface="+mj-cs"/>
-              </a:rPr>
-              <a:t>MAE of positions at predicted steps</a:t>
-            </a:r>
+              <a:rPr lang="da-DK" dirty="0"/>
+              <a:t>Time spent pr step for each simulation</a:t>
+            </a:r>
+            <a:endParaRPr lang="en-GB" dirty="0"/>
           </a:p>
         </p:txBody>
       </p:sp>
       <p:pic>
         <p:nvPicPr>
-          <p:cNvPr id="8" name="Picture 7">
-            <a:extLst>
-              <a:ext uri="{FF2B5EF4-FFF2-40B4-BE49-F238E27FC236}">
-                <a16:creationId xmlns:a16="http://schemas.microsoft.com/office/drawing/2014/main" id="{BD32B867-C520-A579-3E18-A0CDFCA5F996}"/>
+          <p:cNvPr id="5" name="Content Placeholder 4">
+            <a:extLst>
+              <a:ext uri="{FF2B5EF4-FFF2-40B4-BE49-F238E27FC236}">
+                <a16:creationId xmlns:a16="http://schemas.microsoft.com/office/drawing/2014/main" id="{3F821E9B-E514-E3FB-97DA-323E5DEB20BE}"/>
               </a:ext>
             </a:extLst>
           </p:cNvPr>
           <p:cNvPicPr>
-            <a:picLocks noChangeAspect="1"/>
+            <a:picLocks noGrp="1" noChangeAspect="1"/>
           </p:cNvPicPr>
-          <p:nvPr/>
+          <p:nvPr>
+            <p:ph idx="1"/>
+          </p:nvPr>
         </p:nvPicPr>
         <p:blipFill>
           <a:blip r:embed="rId2"/>
@@ -3808,18 +3990,15 @@
         </p:blipFill>
         <p:spPr>
           <a:xfrm>
-            <a:off x="3107693" y="1845426"/>
-            <a:ext cx="5973561" cy="4450303"/>
-          </a:xfrm>
-          <a:prstGeom prst="rect">
-            <a:avLst/>
-          </a:prstGeom>
+            <a:off x="2804927" y="1690688"/>
+            <a:ext cx="6582145" cy="5020756"/>
+          </a:xfrm>
         </p:spPr>
       </p:pic>
     </p:spTree>
     <p:extLst>
       <p:ext uri="{BB962C8B-B14F-4D97-AF65-F5344CB8AC3E}">
-        <p14:creationId xmlns:p14="http://schemas.microsoft.com/office/powerpoint/2010/main" val="1215100649"/>
+        <p14:creationId xmlns:p14="http://schemas.microsoft.com/office/powerpoint/2010/main" val="851579503"/>
       </p:ext>
     </p:extLst>
   </p:cSld>
@@ -3874,8 +4053,9 @@
           </a:bodyPr>
           <a:lstStyle/>
           <a:p>
-            <a:r>
-              <a:rPr lang="en-US" sz="5200" kern="1200">
+            <a:pPr algn="ctr"/>
+            <a:r>
+              <a:rPr lang="en-US" sz="5200" kern="1200" dirty="0">
                 <a:solidFill>
                   <a:schemeClr val="tx1"/>
                 </a:solidFill>
@@ -3903,6 +4083,109 @@
           <p:nvPr/>
         </p:nvPicPr>
         <p:blipFill>
+          <a:blip r:embed="rId2"/>
+          <a:stretch>
+            <a:fillRect/>
+          </a:stretch>
+        </p:blipFill>
+        <p:spPr>
+          <a:xfrm>
+            <a:off x="2747863" y="1542676"/>
+            <a:ext cx="6696273" cy="4988723"/>
+          </a:xfrm>
+          <a:prstGeom prst="rect">
+            <a:avLst/>
+          </a:prstGeom>
+        </p:spPr>
+      </p:pic>
+    </p:spTree>
+    <p:extLst>
+      <p:ext uri="{BB962C8B-B14F-4D97-AF65-F5344CB8AC3E}">
+        <p14:creationId xmlns:p14="http://schemas.microsoft.com/office/powerpoint/2010/main" val="1215100649"/>
+      </p:ext>
+    </p:extLst>
+  </p:cSld>
+  <p:clrMapOvr>
+    <a:masterClrMapping/>
+  </p:clrMapOvr>
+</p:sld>
+</file>
+
+<file path=ppt/slides/slide12.xml><?xml version="1.0" encoding="utf-8"?>
+<p:sld xmlns:a="http://schemas.openxmlformats.org/drawingml/2006/main" xmlns:r="http://schemas.openxmlformats.org/officeDocument/2006/relationships" xmlns:p="http://schemas.openxmlformats.org/presentationml/2006/main">
+  <p:cSld>
+    <p:spTree>
+      <p:nvGrpSpPr>
+        <p:cNvPr id="1" name=""/>
+        <p:cNvGrpSpPr/>
+        <p:nvPr/>
+      </p:nvGrpSpPr>
+      <p:grpSpPr>
+        <a:xfrm>
+          <a:off x="0" y="0"/>
+          <a:ext cx="0" cy="0"/>
+          <a:chOff x="0" y="0"/>
+          <a:chExt cx="0" cy="0"/>
+        </a:xfrm>
+      </p:grpSpPr>
+      <p:sp>
+        <p:nvSpPr>
+          <p:cNvPr id="3" name="Title 2">
+            <a:extLst>
+              <a:ext uri="{FF2B5EF4-FFF2-40B4-BE49-F238E27FC236}">
+                <a16:creationId xmlns:a16="http://schemas.microsoft.com/office/drawing/2014/main" id="{7A19C08E-21AE-9330-A6AA-10242825EF6A}"/>
+              </a:ext>
+            </a:extLst>
+          </p:cNvPr>
+          <p:cNvSpPr>
+            <a:spLocks noGrp="1"/>
+          </p:cNvSpPr>
+          <p:nvPr>
+            <p:ph type="title"/>
+          </p:nvPr>
+        </p:nvSpPr>
+        <p:spPr>
+          <a:xfrm>
+            <a:off x="838200" y="184805"/>
+            <a:ext cx="10515600" cy="1505883"/>
+          </a:xfrm>
+        </p:spPr>
+        <p:txBody>
+          <a:bodyPr vert="horz" lIns="91440" tIns="45720" rIns="91440" bIns="45720" rtlCol="0" anchor="ctr">
+            <a:normAutofit fontScale="90000"/>
+          </a:bodyPr>
+          <a:lstStyle/>
+          <a:p>
+            <a:pPr algn="ctr"/>
+            <a:r>
+              <a:rPr lang="en-US" sz="5200" kern="1200" dirty="0">
+                <a:solidFill>
+                  <a:schemeClr val="tx1"/>
+                </a:solidFill>
+                <a:latin typeface="+mj-lt"/>
+                <a:ea typeface="+mj-ea"/>
+                <a:cs typeface="+mj-cs"/>
+              </a:rPr>
+              <a:t>MAE of positions for models with different number of predictions</a:t>
+            </a:r>
+          </a:p>
+        </p:txBody>
+      </p:sp>
+      <p:pic>
+        <p:nvPicPr>
+          <p:cNvPr id="8" name="Picture 7">
+            <a:extLst>
+              <a:ext uri="{FF2B5EF4-FFF2-40B4-BE49-F238E27FC236}">
+                <a16:creationId xmlns:a16="http://schemas.microsoft.com/office/drawing/2014/main" id="{BD32B867-C520-A579-3E18-A0CDFCA5F996}"/>
+              </a:ext>
+            </a:extLst>
+          </p:cNvPr>
+          <p:cNvPicPr>
+            <a:picLocks noChangeAspect="1"/>
+          </p:cNvPicPr>
+          <p:nvPr/>
+        </p:nvPicPr>
+        <p:blipFill>
           <a:blip r:embed="rId2">
             <a:extLst>
               <a:ext uri="{28A0092B-C50C-407E-A947-70E740481C1C}">
@@ -3915,8 +4198,8 @@
         </p:blipFill>
         <p:spPr>
           <a:xfrm>
-            <a:off x="3107693" y="1888792"/>
-            <a:ext cx="5973561" cy="4363571"/>
+            <a:off x="2776144" y="1823014"/>
+            <a:ext cx="6639712" cy="4850181"/>
           </a:xfrm>
           <a:prstGeom prst="rect">
             <a:avLst/>
@@ -3936,7 +4219,115 @@
 </p:sld>
 </file>
 
-<file path=ppt/slides/slide12.xml><?xml version="1.0" encoding="utf-8"?>
+<file path=ppt/slides/slide13.xml><?xml version="1.0" encoding="utf-8"?>
+<p:sld xmlns:a="http://schemas.openxmlformats.org/drawingml/2006/main" xmlns:r="http://schemas.openxmlformats.org/officeDocument/2006/relationships" xmlns:p="http://schemas.openxmlformats.org/presentationml/2006/main">
+  <p:cSld>
+    <p:spTree>
+      <p:nvGrpSpPr>
+        <p:cNvPr id="1" name=""/>
+        <p:cNvGrpSpPr/>
+        <p:nvPr/>
+      </p:nvGrpSpPr>
+      <p:grpSpPr>
+        <a:xfrm>
+          <a:off x="0" y="0"/>
+          <a:ext cx="0" cy="0"/>
+          <a:chOff x="0" y="0"/>
+          <a:chExt cx="0" cy="0"/>
+        </a:xfrm>
+      </p:grpSpPr>
+      <p:sp>
+        <p:nvSpPr>
+          <p:cNvPr id="3" name="Title 2">
+            <a:extLst>
+              <a:ext uri="{FF2B5EF4-FFF2-40B4-BE49-F238E27FC236}">
+                <a16:creationId xmlns:a16="http://schemas.microsoft.com/office/drawing/2014/main" id="{7A19C08E-21AE-9330-A6AA-10242825EF6A}"/>
+              </a:ext>
+            </a:extLst>
+          </p:cNvPr>
+          <p:cNvSpPr>
+            <a:spLocks noGrp="1"/>
+          </p:cNvSpPr>
+          <p:nvPr>
+            <p:ph type="title"/>
+          </p:nvPr>
+        </p:nvSpPr>
+        <p:spPr>
+          <a:xfrm>
+            <a:off x="838200" y="184805"/>
+            <a:ext cx="10515600" cy="1505883"/>
+          </a:xfrm>
+        </p:spPr>
+        <p:txBody>
+          <a:bodyPr vert="horz" lIns="91440" tIns="45720" rIns="91440" bIns="45720" rtlCol="0" anchor="ctr">
+            <a:normAutofit fontScale="90000"/>
+          </a:bodyPr>
+          <a:lstStyle/>
+          <a:p>
+            <a:pPr algn="ctr"/>
+            <a:r>
+              <a:rPr lang="en-US" sz="5200" kern="1200" dirty="0">
+                <a:solidFill>
+                  <a:schemeClr val="tx1"/>
+                </a:solidFill>
+                <a:latin typeface="+mj-lt"/>
+                <a:ea typeface="+mj-ea"/>
+                <a:cs typeface="+mj-cs"/>
+              </a:rPr>
+              <a:t>Relative error of positions at predicted steps</a:t>
+            </a:r>
+          </a:p>
+        </p:txBody>
+      </p:sp>
+      <p:pic>
+        <p:nvPicPr>
+          <p:cNvPr id="8" name="Picture 7">
+            <a:extLst>
+              <a:ext uri="{FF2B5EF4-FFF2-40B4-BE49-F238E27FC236}">
+                <a16:creationId xmlns:a16="http://schemas.microsoft.com/office/drawing/2014/main" id="{BD32B867-C520-A579-3E18-A0CDFCA5F996}"/>
+              </a:ext>
+            </a:extLst>
+          </p:cNvPr>
+          <p:cNvPicPr>
+            <a:picLocks noChangeAspect="1"/>
+          </p:cNvPicPr>
+          <p:nvPr/>
+        </p:nvPicPr>
+        <p:blipFill>
+          <a:blip r:embed="rId2">
+            <a:extLst>
+              <a:ext uri="{28A0092B-C50C-407E-A947-70E740481C1C}">
+                <a14:useLocalDpi xmlns:a14="http://schemas.microsoft.com/office/drawing/2010/main" val="0"/>
+              </a:ext>
+            </a:extLst>
+          </a:blip>
+          <a:srcRect/>
+          <a:stretch/>
+        </p:blipFill>
+        <p:spPr>
+          <a:xfrm>
+            <a:off x="2899263" y="1690688"/>
+            <a:ext cx="6393474" cy="4953622"/>
+          </a:xfrm>
+          <a:prstGeom prst="rect">
+            <a:avLst/>
+          </a:prstGeom>
+        </p:spPr>
+      </p:pic>
+    </p:spTree>
+    <p:extLst>
+      <p:ext uri="{BB962C8B-B14F-4D97-AF65-F5344CB8AC3E}">
+        <p14:creationId xmlns:p14="http://schemas.microsoft.com/office/powerpoint/2010/main" val="970354515"/>
+      </p:ext>
+    </p:extLst>
+  </p:cSld>
+  <p:clrMapOvr>
+    <a:masterClrMapping/>
+  </p:clrMapOvr>
+</p:sld>
+</file>
+
+<file path=ppt/slides/slide14.xml><?xml version="1.0" encoding="utf-8"?>
 <p:sld xmlns:a="http://schemas.openxmlformats.org/drawingml/2006/main" xmlns:r="http://schemas.openxmlformats.org/officeDocument/2006/relationships" xmlns:p="http://schemas.openxmlformats.org/presentationml/2006/main">
   <p:cSld>
     <p:bg>
@@ -4004,7 +4395,7 @@
 </p:sld>
 </file>
 
-<file path=ppt/slides/slide13.xml><?xml version="1.0" encoding="utf-8"?>
+<file path=ppt/slides/slide15.xml><?xml version="1.0" encoding="utf-8"?>
 <p:sld xmlns:a="http://schemas.openxmlformats.org/drawingml/2006/main" xmlns:r="http://schemas.openxmlformats.org/officeDocument/2006/relationships" xmlns:p="http://schemas.openxmlformats.org/presentationml/2006/main">
   <p:cSld>
     <p:bg>
@@ -4220,8 +4611,8 @@
           </a:p>
         </p:txBody>
       </p:sp>
-      <mc:AlternateContent xmlns:mc="http://schemas.openxmlformats.org/markup-compatibility/2006">
-        <mc:Choice xmlns:a14="http://schemas.microsoft.com/office/drawing/2010/main" Requires="a14">
+      <mc:AlternateContent xmlns:mc="http://schemas.openxmlformats.org/markup-compatibility/2006" xmlns:a14="http://schemas.microsoft.com/office/drawing/2010/main">
+        <mc:Choice Requires="a14">
           <p:sp>
             <p:nvSpPr>
               <p:cNvPr id="4" name="Content Placeholder 3">
@@ -4560,7 +4951,7 @@
             </p:txBody>
           </p:sp>
         </mc:Choice>
-        <mc:Fallback>
+        <mc:Fallback xmlns="">
           <p:sp>
             <p:nvSpPr>
               <p:cNvPr id="4" name="Content Placeholder 3">
@@ -4628,7 +5019,7 @@
           <a:p>
             <a:fld id="{DD0E0F33-965B-4006-BF25-D26E1C84904D}" type="datetime1">
               <a:rPr lang="en-GB" smtClean="0"/>
-              <a:t>05/03/2024</a:t>
+              <a:t>06/03/2024</a:t>
             </a:fld>
             <a:endParaRPr lang="en-GB" dirty="0"/>
           </a:p>
@@ -6184,10 +6575,10 @@
       </p:grpSpPr>
       <p:sp>
         <p:nvSpPr>
-          <p:cNvPr id="3" name="Title 2">
-            <a:extLst>
-              <a:ext uri="{FF2B5EF4-FFF2-40B4-BE49-F238E27FC236}">
-                <a16:creationId xmlns:a16="http://schemas.microsoft.com/office/drawing/2014/main" id="{8B9C47DF-AB3F-2B17-D913-F2BA643651F2}"/>
+          <p:cNvPr id="2" name="Title 1">
+            <a:extLst>
+              <a:ext uri="{FF2B5EF4-FFF2-40B4-BE49-F238E27FC236}">
+                <a16:creationId xmlns:a16="http://schemas.microsoft.com/office/drawing/2014/main" id="{79AEE460-9BCC-7338-5449-1A91C333ADF1}"/>
               </a:ext>
             </a:extLst>
           </p:cNvPr>
@@ -6205,7 +6596,7 @@
           <a:p>
             <a:r>
               <a:rPr lang="da-DK" dirty="0"/>
-              <a:t>OLS VAR regularization</a:t>
+              <a:t>What have I done</a:t>
             </a:r>
             <a:endParaRPr lang="en-GB" dirty="0"/>
           </a:p>
@@ -6213,78 +6604,85 @@
       </p:sp>
       <p:sp>
         <p:nvSpPr>
-          <p:cNvPr id="5" name="Date Placeholder 1">
-            <a:extLst>
-              <a:ext uri="{FF2B5EF4-FFF2-40B4-BE49-F238E27FC236}">
-                <a16:creationId xmlns:a16="http://schemas.microsoft.com/office/drawing/2014/main" id="{183492D8-302C-5DDF-5D43-898AE0D5168B}"/>
-              </a:ext>
-            </a:extLst>
-          </p:cNvPr>
-          <p:cNvSpPr>
-            <a:spLocks noGrp="1"/>
-          </p:cNvSpPr>
-          <p:nvPr>
-            <p:ph type="dt" sz="half" idx="10"/>
+          <p:cNvPr id="3" name="Content Placeholder 2">
+            <a:extLst>
+              <a:ext uri="{FF2B5EF4-FFF2-40B4-BE49-F238E27FC236}">
+                <a16:creationId xmlns:a16="http://schemas.microsoft.com/office/drawing/2014/main" id="{581F3AEC-739E-A381-E3EF-950D69806FFE}"/>
+              </a:ext>
+            </a:extLst>
+          </p:cNvPr>
+          <p:cNvSpPr>
+            <a:spLocks noGrp="1"/>
+          </p:cNvSpPr>
+          <p:nvPr>
+            <p:ph idx="1"/>
           </p:nvPr>
         </p:nvSpPr>
         <p:spPr>
           <a:xfrm>
-            <a:off x="838200" y="6356350"/>
-            <a:ext cx="2743200" cy="365125"/>
+            <a:off x="838200" y="1825625"/>
+            <a:ext cx="5257800" cy="4351338"/>
           </a:xfrm>
         </p:spPr>
         <p:txBody>
           <a:bodyPr/>
           <a:lstStyle/>
           <a:p>
-            <a:fld id="{DD0E0F33-965B-4006-BF25-D26E1C84904D}" type="datetime1">
-              <a:rPr lang="en-GB" smtClean="0"/>
-              <a:t>05/03/2024</a:t>
-            </a:fld>
-            <a:endParaRPr lang="en-GB" dirty="0"/>
-          </a:p>
-        </p:txBody>
-      </p:sp>
-      <p:sp>
-        <p:nvSpPr>
-          <p:cNvPr id="6" name="Slide Number Placeholder 2">
-            <a:extLst>
-              <a:ext uri="{FF2B5EF4-FFF2-40B4-BE49-F238E27FC236}">
-                <a16:creationId xmlns:a16="http://schemas.microsoft.com/office/drawing/2014/main" id="{C6AAA842-123F-F3C0-1189-7D7729A261DE}"/>
-              </a:ext>
-            </a:extLst>
-          </p:cNvPr>
-          <p:cNvSpPr>
-            <a:spLocks noGrp="1"/>
-          </p:cNvSpPr>
-          <p:nvPr>
-            <p:ph type="sldNum" sz="quarter" idx="12"/>
-          </p:nvPr>
-        </p:nvSpPr>
-        <p:spPr>
-          <a:xfrm>
-            <a:off x="8610600" y="6356350"/>
-            <a:ext cx="2743200" cy="365125"/>
-          </a:xfrm>
-        </p:spPr>
-        <p:txBody>
-          <a:bodyPr/>
-          <a:lstStyle/>
-          <a:p>
-            <a:fld id="{091A926C-488A-4E3E-9C21-57CAA120E114}" type="slidenum">
-              <a:rPr lang="en-GB" smtClean="0"/>
-              <a:t>3</a:t>
-            </a:fld>
-            <a:endParaRPr lang="en-GB" dirty="0"/>
+            <a:r>
+              <a:rPr lang="da-DK" dirty="0"/>
+              <a:t>Molecular simulation of ethanol</a:t>
+            </a:r>
+          </a:p>
+          <a:p>
+            <a:pPr lvl="1"/>
+            <a:r>
+              <a:rPr lang="da-DK" dirty="0"/>
+              <a:t>Velocity Verlet dynamics</a:t>
+            </a:r>
+          </a:p>
+          <a:p>
+            <a:pPr lvl="1"/>
+            <a:r>
+              <a:rPr lang="da-DK" dirty="0"/>
+              <a:t>Mode: LCAO</a:t>
+            </a:r>
+          </a:p>
+          <a:p>
+            <a:pPr lvl="1"/>
+            <a:r>
+              <a:rPr lang="da-DK" dirty="0"/>
+              <a:t>xc: PBE</a:t>
+            </a:r>
+          </a:p>
+          <a:p>
+            <a:pPr lvl="1"/>
+            <a:r>
+              <a:rPr lang="da-DK" dirty="0"/>
+              <a:t>Basis set: szp</a:t>
+            </a:r>
+          </a:p>
+          <a:p>
+            <a:pPr lvl="1"/>
+            <a:r>
+              <a:rPr lang="da-DK" dirty="0"/>
+              <a:t>dt: 0.5 fs</a:t>
+            </a:r>
+          </a:p>
+          <a:p>
+            <a:pPr lvl="1"/>
+            <a:r>
+              <a:rPr lang="da-DK" dirty="0"/>
+              <a:t>n_steps: 300</a:t>
+            </a:r>
           </a:p>
         </p:txBody>
       </p:sp>
       <p:pic>
         <p:nvPicPr>
-          <p:cNvPr id="8" name="Picture 7">
-            <a:extLst>
-              <a:ext uri="{FF2B5EF4-FFF2-40B4-BE49-F238E27FC236}">
-                <a16:creationId xmlns:a16="http://schemas.microsoft.com/office/drawing/2014/main" id="{351F94F4-E3B7-EB5C-7C10-38B4952AAFC1}"/>
+          <p:cNvPr id="5" name="Picture 4" descr="A black and white image of a roof&#10;&#10;Description automatically generated">
+            <a:extLst>
+              <a:ext uri="{FF2B5EF4-FFF2-40B4-BE49-F238E27FC236}">
+                <a16:creationId xmlns:a16="http://schemas.microsoft.com/office/drawing/2014/main" id="{E37A77A4-BF0C-CF13-D774-135802FC3D23}"/>
               </a:ext>
             </a:extLst>
           </p:cNvPr>
@@ -6301,43 +6699,304 @@
               </a:ext>
             </a:extLst>
           </a:blip>
+          <a:stretch>
+            <a:fillRect/>
+          </a:stretch>
+        </p:blipFill>
+        <p:spPr>
+          <a:xfrm>
+            <a:off x="7889620" y="974423"/>
+            <a:ext cx="2847619" cy="1000000"/>
+          </a:xfrm>
+          <a:prstGeom prst="rect">
+            <a:avLst/>
+          </a:prstGeom>
+        </p:spPr>
+      </p:pic>
+      <p:pic>
+        <p:nvPicPr>
+          <p:cNvPr id="7" name="Picture 6" descr="A graph of a wave&#10;&#10;Description automatically generated">
+            <a:extLst>
+              <a:ext uri="{FF2B5EF4-FFF2-40B4-BE49-F238E27FC236}">
+                <a16:creationId xmlns:a16="http://schemas.microsoft.com/office/drawing/2014/main" id="{7A0AC0D2-BCB4-45B6-FD34-C4A4BC982E6A}"/>
+              </a:ext>
+            </a:extLst>
+          </p:cNvPr>
+          <p:cNvPicPr>
+            <a:picLocks noChangeAspect="1"/>
+          </p:cNvPicPr>
+          <p:nvPr/>
+        </p:nvPicPr>
+        <p:blipFill>
+          <a:blip r:embed="rId3">
+            <a:extLst>
+              <a:ext uri="{28A0092B-C50C-407E-A947-70E740481C1C}">
+                <a14:useLocalDpi xmlns:a14="http://schemas.microsoft.com/office/drawing/2010/main" val="0"/>
+              </a:ext>
+            </a:extLst>
+          </a:blip>
+          <a:stretch>
+            <a:fillRect/>
+          </a:stretch>
+        </p:blipFill>
+        <p:spPr>
+          <a:xfrm>
+            <a:off x="6465855" y="2258157"/>
+            <a:ext cx="5093218" cy="3502159"/>
+          </a:xfrm>
+          <a:prstGeom prst="rect">
+            <a:avLst/>
+          </a:prstGeom>
+        </p:spPr>
+      </p:pic>
+      <p:pic>
+        <p:nvPicPr>
+          <p:cNvPr id="8" name="Picture 7">
+            <a:extLst>
+              <a:ext uri="{FF2B5EF4-FFF2-40B4-BE49-F238E27FC236}">
+                <a16:creationId xmlns:a16="http://schemas.microsoft.com/office/drawing/2014/main" id="{38F26C9B-C07E-94F4-2EB4-C538274A4525}"/>
+              </a:ext>
+            </a:extLst>
+          </p:cNvPr>
+          <p:cNvPicPr>
+            <a:picLocks noChangeAspect="1"/>
+          </p:cNvPicPr>
+          <p:nvPr/>
+        </p:nvPicPr>
+        <p:blipFill>
+          <a:blip r:embed="rId4">
+            <a:extLst>
+              <a:ext uri="{28A0092B-C50C-407E-A947-70E740481C1C}">
+                <a14:useLocalDpi xmlns:a14="http://schemas.microsoft.com/office/drawing/2010/main" val="0"/>
+              </a:ext>
+            </a:extLst>
+          </a:blip>
           <a:srcRect/>
           <a:stretch/>
         </p:blipFill>
         <p:spPr>
           <a:xfrm>
-            <a:off x="335280" y="2226209"/>
-            <a:ext cx="11521440" cy="3552559"/>
+            <a:off x="7889619" y="974422"/>
+            <a:ext cx="2847619" cy="1000000"/>
           </a:xfrm>
           <a:prstGeom prst="rect">
             <a:avLst/>
           </a:prstGeom>
         </p:spPr>
       </p:pic>
+      <p:sp>
+        <p:nvSpPr>
+          <p:cNvPr id="11" name="Date Placeholder 1">
+            <a:extLst>
+              <a:ext uri="{FF2B5EF4-FFF2-40B4-BE49-F238E27FC236}">
+                <a16:creationId xmlns:a16="http://schemas.microsoft.com/office/drawing/2014/main" id="{DF2DECE4-4B29-DF33-78BE-CB522EC3AC5F}"/>
+              </a:ext>
+            </a:extLst>
+          </p:cNvPr>
+          <p:cNvSpPr>
+            <a:spLocks noGrp="1"/>
+          </p:cNvSpPr>
+          <p:nvPr>
+            <p:ph type="dt" sz="half" idx="10"/>
+          </p:nvPr>
+        </p:nvSpPr>
+        <p:spPr>
+          <a:xfrm>
+            <a:off x="838200" y="6356350"/>
+            <a:ext cx="2743200" cy="365125"/>
+          </a:xfrm>
+        </p:spPr>
+        <p:txBody>
+          <a:bodyPr/>
+          <a:lstStyle/>
+          <a:p>
+            <a:fld id="{DD0E0F33-965B-4006-BF25-D26E1C84904D}" type="datetime1">
+              <a:rPr lang="en-GB" smtClean="0"/>
+              <a:t>06/03/2024</a:t>
+            </a:fld>
+            <a:endParaRPr lang="en-GB" dirty="0"/>
+          </a:p>
+        </p:txBody>
+      </p:sp>
+      <p:sp>
+        <p:nvSpPr>
+          <p:cNvPr id="12" name="Slide Number Placeholder 2">
+            <a:extLst>
+              <a:ext uri="{FF2B5EF4-FFF2-40B4-BE49-F238E27FC236}">
+                <a16:creationId xmlns:a16="http://schemas.microsoft.com/office/drawing/2014/main" id="{1A37DBEE-712A-80AB-A291-6C9372062C41}"/>
+              </a:ext>
+            </a:extLst>
+          </p:cNvPr>
+          <p:cNvSpPr>
+            <a:spLocks noGrp="1"/>
+          </p:cNvSpPr>
+          <p:nvPr>
+            <p:ph type="sldNum" sz="quarter" idx="12"/>
+          </p:nvPr>
+        </p:nvSpPr>
+        <p:spPr>
+          <a:xfrm>
+            <a:off x="8610600" y="6356350"/>
+            <a:ext cx="2743200" cy="365125"/>
+          </a:xfrm>
+        </p:spPr>
+        <p:txBody>
+          <a:bodyPr/>
+          <a:lstStyle/>
+          <a:p>
+            <a:fld id="{091A926C-488A-4E3E-9C21-57CAA120E114}" type="slidenum">
+              <a:rPr lang="en-GB" smtClean="0"/>
+              <a:t>3</a:t>
+            </a:fld>
+            <a:endParaRPr lang="en-GB" dirty="0"/>
+          </a:p>
+        </p:txBody>
+      </p:sp>
     </p:spTree>
     <p:extLst>
       <p:ext uri="{BB962C8B-B14F-4D97-AF65-F5344CB8AC3E}">
-        <p14:creationId xmlns:p14="http://schemas.microsoft.com/office/powerpoint/2010/main" val="1709163067"/>
+        <p14:creationId xmlns:p14="http://schemas.microsoft.com/office/powerpoint/2010/main" val="157822472"/>
       </p:ext>
     </p:extLst>
   </p:cSld>
   <p:clrMapOvr>
     <a:masterClrMapping/>
   </p:clrMapOvr>
+  <p:timing>
+    <p:tnLst>
+      <p:par>
+        <p:cTn id="1" dur="indefinite" restart="never" nodeType="tmRoot">
+          <p:childTnLst>
+            <p:seq concurrent="1" nextAc="seek">
+              <p:cTn id="2" dur="indefinite" nodeType="mainSeq">
+                <p:childTnLst>
+                  <p:par>
+                    <p:cTn id="3" fill="hold">
+                      <p:stCondLst>
+                        <p:cond delay="indefinite"/>
+                      </p:stCondLst>
+                      <p:childTnLst>
+                        <p:par>
+                          <p:cTn id="4" fill="hold">
+                            <p:stCondLst>
+                              <p:cond delay="0"/>
+                            </p:stCondLst>
+                            <p:childTnLst>
+                              <p:par>
+                                <p:cTn id="5" presetID="1" presetClass="entr" presetSubtype="0" fill="hold" nodeType="clickEffect">
+                                  <p:stCondLst>
+                                    <p:cond delay="0"/>
+                                  </p:stCondLst>
+                                  <p:childTnLst>
+                                    <p:set>
+                                      <p:cBhvr>
+                                        <p:cTn id="6" dur="1" fill="hold">
+                                          <p:stCondLst>
+                                            <p:cond delay="0"/>
+                                          </p:stCondLst>
+                                        </p:cTn>
+                                        <p:tgtEl>
+                                          <p:spTgt spid="7"/>
+                                        </p:tgtEl>
+                                        <p:attrNameLst>
+                                          <p:attrName>style.visibility</p:attrName>
+                                        </p:attrNameLst>
+                                      </p:cBhvr>
+                                      <p:to>
+                                        <p:strVal val="visible"/>
+                                      </p:to>
+                                    </p:set>
+                                  </p:childTnLst>
+                                </p:cTn>
+                              </p:par>
+                              <p:par>
+                                <p:cTn id="7" presetID="1" presetClass="entr" presetSubtype="0" fill="hold" nodeType="withEffect">
+                                  <p:stCondLst>
+                                    <p:cond delay="0"/>
+                                  </p:stCondLst>
+                                  <p:childTnLst>
+                                    <p:set>
+                                      <p:cBhvr>
+                                        <p:cTn id="8" dur="1" fill="hold">
+                                          <p:stCondLst>
+                                            <p:cond delay="0"/>
+                                          </p:stCondLst>
+                                        </p:cTn>
+                                        <p:tgtEl>
+                                          <p:spTgt spid="8"/>
+                                        </p:tgtEl>
+                                        <p:attrNameLst>
+                                          <p:attrName>style.visibility</p:attrName>
+                                        </p:attrNameLst>
+                                      </p:cBhvr>
+                                      <p:to>
+                                        <p:strVal val="visible"/>
+                                      </p:to>
+                                    </p:set>
+                                  </p:childTnLst>
+                                </p:cTn>
+                              </p:par>
+                              <p:par>
+                                <p:cTn id="9" presetID="1" presetClass="exit" presetSubtype="0" fill="hold" nodeType="withEffect">
+                                  <p:stCondLst>
+                                    <p:cond delay="0"/>
+                                  </p:stCondLst>
+                                  <p:childTnLst>
+                                    <p:set>
+                                      <p:cBhvr>
+                                        <p:cTn id="10" dur="1" fill="hold">
+                                          <p:stCondLst>
+                                            <p:cond delay="0"/>
+                                          </p:stCondLst>
+                                        </p:cTn>
+                                        <p:tgtEl>
+                                          <p:spTgt spid="5"/>
+                                        </p:tgtEl>
+                                        <p:attrNameLst>
+                                          <p:attrName>style.visibility</p:attrName>
+                                        </p:attrNameLst>
+                                      </p:cBhvr>
+                                      <p:to>
+                                        <p:strVal val="hidden"/>
+                                      </p:to>
+                                    </p:set>
+                                  </p:childTnLst>
+                                </p:cTn>
+                              </p:par>
+                            </p:childTnLst>
+                          </p:cTn>
+                        </p:par>
+                      </p:childTnLst>
+                    </p:cTn>
+                  </p:par>
+                </p:childTnLst>
+              </p:cTn>
+              <p:prevCondLst>
+                <p:cond evt="onPrev" delay="0">
+                  <p:tgtEl>
+                    <p:sldTgt/>
+                  </p:tgtEl>
+                </p:cond>
+              </p:prevCondLst>
+              <p:nextCondLst>
+                <p:cond evt="onNext" delay="0">
+                  <p:tgtEl>
+                    <p:sldTgt/>
+                  </p:tgtEl>
+                </p:cond>
+              </p:nextCondLst>
+            </p:seq>
+          </p:childTnLst>
+        </p:cTn>
+      </p:par>
+    </p:tnLst>
+  </p:timing>
 </p:sld>
 </file>
 
 <file path=ppt/slides/slide4.xml><?xml version="1.0" encoding="utf-8"?>
 <p:sld xmlns:a="http://schemas.openxmlformats.org/drawingml/2006/main" xmlns:r="http://schemas.openxmlformats.org/officeDocument/2006/relationships" xmlns:p="http://schemas.openxmlformats.org/presentationml/2006/main">
   <p:cSld>
-    <p:bg>
-      <p:bgPr>
-        <a:solidFill>
-          <a:schemeClr val="bg1"/>
-        </a:solidFill>
-        <a:effectLst/>
-      </p:bgPr>
-    </p:bg>
     <p:spTree>
       <p:nvGrpSpPr>
         <p:cNvPr id="1" name=""/>
@@ -6352,12 +7011,109 @@
           <a:chExt cx="0" cy="0"/>
         </a:xfrm>
       </p:grpSpPr>
+      <p:sp>
+        <p:nvSpPr>
+          <p:cNvPr id="3" name="Title 2">
+            <a:extLst>
+              <a:ext uri="{FF2B5EF4-FFF2-40B4-BE49-F238E27FC236}">
+                <a16:creationId xmlns:a16="http://schemas.microsoft.com/office/drawing/2014/main" id="{8B9C47DF-AB3F-2B17-D913-F2BA643651F2}"/>
+              </a:ext>
+            </a:extLst>
+          </p:cNvPr>
+          <p:cNvSpPr>
+            <a:spLocks noGrp="1"/>
+          </p:cNvSpPr>
+          <p:nvPr>
+            <p:ph type="title"/>
+          </p:nvPr>
+        </p:nvSpPr>
+        <p:spPr/>
+        <p:txBody>
+          <a:bodyPr/>
+          <a:lstStyle/>
+          <a:p>
+            <a:r>
+              <a:rPr lang="da-DK" dirty="0"/>
+              <a:t>OLS VAR regularization</a:t>
+            </a:r>
+            <a:endParaRPr lang="en-GB" dirty="0"/>
+          </a:p>
+        </p:txBody>
+      </p:sp>
+      <p:sp>
+        <p:nvSpPr>
+          <p:cNvPr id="5" name="Date Placeholder 1">
+            <a:extLst>
+              <a:ext uri="{FF2B5EF4-FFF2-40B4-BE49-F238E27FC236}">
+                <a16:creationId xmlns:a16="http://schemas.microsoft.com/office/drawing/2014/main" id="{183492D8-302C-5DDF-5D43-898AE0D5168B}"/>
+              </a:ext>
+            </a:extLst>
+          </p:cNvPr>
+          <p:cNvSpPr>
+            <a:spLocks noGrp="1"/>
+          </p:cNvSpPr>
+          <p:nvPr>
+            <p:ph type="dt" sz="half" idx="10"/>
+          </p:nvPr>
+        </p:nvSpPr>
+        <p:spPr>
+          <a:xfrm>
+            <a:off x="838200" y="6356350"/>
+            <a:ext cx="2743200" cy="365125"/>
+          </a:xfrm>
+        </p:spPr>
+        <p:txBody>
+          <a:bodyPr/>
+          <a:lstStyle/>
+          <a:p>
+            <a:fld id="{DD0E0F33-965B-4006-BF25-D26E1C84904D}" type="datetime1">
+              <a:rPr lang="en-GB" smtClean="0"/>
+              <a:t>06/03/2024</a:t>
+            </a:fld>
+            <a:endParaRPr lang="en-GB" dirty="0"/>
+          </a:p>
+        </p:txBody>
+      </p:sp>
+      <p:sp>
+        <p:nvSpPr>
+          <p:cNvPr id="6" name="Slide Number Placeholder 2">
+            <a:extLst>
+              <a:ext uri="{FF2B5EF4-FFF2-40B4-BE49-F238E27FC236}">
+                <a16:creationId xmlns:a16="http://schemas.microsoft.com/office/drawing/2014/main" id="{C6AAA842-123F-F3C0-1189-7D7729A261DE}"/>
+              </a:ext>
+            </a:extLst>
+          </p:cNvPr>
+          <p:cNvSpPr>
+            <a:spLocks noGrp="1"/>
+          </p:cNvSpPr>
+          <p:nvPr>
+            <p:ph type="sldNum" sz="quarter" idx="12"/>
+          </p:nvPr>
+        </p:nvSpPr>
+        <p:spPr>
+          <a:xfrm>
+            <a:off x="8610600" y="6356350"/>
+            <a:ext cx="2743200" cy="365125"/>
+          </a:xfrm>
+        </p:spPr>
+        <p:txBody>
+          <a:bodyPr/>
+          <a:lstStyle/>
+          <a:p>
+            <a:fld id="{091A926C-488A-4E3E-9C21-57CAA120E114}" type="slidenum">
+              <a:rPr lang="en-GB" smtClean="0"/>
+              <a:t>4</a:t>
+            </a:fld>
+            <a:endParaRPr lang="en-GB" dirty="0"/>
+          </a:p>
+        </p:txBody>
+      </p:sp>
       <p:pic>
         <p:nvPicPr>
-          <p:cNvPr id="6" name="Picture 5">
-            <a:extLst>
-              <a:ext uri="{FF2B5EF4-FFF2-40B4-BE49-F238E27FC236}">
-                <a16:creationId xmlns:a16="http://schemas.microsoft.com/office/drawing/2014/main" id="{4065F462-8577-12C9-75CC-127F460E2FEA}"/>
+          <p:cNvPr id="8" name="Picture 7">
+            <a:extLst>
+              <a:ext uri="{FF2B5EF4-FFF2-40B4-BE49-F238E27FC236}">
+                <a16:creationId xmlns:a16="http://schemas.microsoft.com/office/drawing/2014/main" id="{351F94F4-E3B7-EB5C-7C10-38B4952AAFC1}"/>
               </a:ext>
             </a:extLst>
           </p:cNvPr>
@@ -6379,74 +7135,8 @@
         </p:blipFill>
         <p:spPr>
           <a:xfrm>
-            <a:off x="3993502" y="164000"/>
-            <a:ext cx="7525312" cy="6580111"/>
-          </a:xfrm>
-          <a:prstGeom prst="rect">
-            <a:avLst/>
-          </a:prstGeom>
-        </p:spPr>
-      </p:pic>
-      <p:sp>
-        <p:nvSpPr>
-          <p:cNvPr id="9" name="TextBox 8">
-            <a:extLst>
-              <a:ext uri="{FF2B5EF4-FFF2-40B4-BE49-F238E27FC236}">
-                <a16:creationId xmlns:a16="http://schemas.microsoft.com/office/drawing/2014/main" id="{E5532A53-B0EB-09F3-039B-D326D5F1DA6A}"/>
-              </a:ext>
-            </a:extLst>
-          </p:cNvPr>
-          <p:cNvSpPr txBox="1"/>
-          <p:nvPr/>
-        </p:nvSpPr>
-        <p:spPr>
-          <a:xfrm>
-            <a:off x="597159" y="606491"/>
-            <a:ext cx="3107094" cy="1200329"/>
-          </a:xfrm>
-          <a:prstGeom prst="rect">
-            <a:avLst/>
-          </a:prstGeom>
-          <a:noFill/>
-        </p:spPr>
-        <p:txBody>
-          <a:bodyPr wrap="square" rtlCol="0">
-            <a:spAutoFit/>
-          </a:bodyPr>
-          <a:lstStyle/>
-          <a:p>
-            <a:r>
-              <a:rPr lang="da-DK" sz="3600" dirty="0"/>
-              <a:t>Distribution of angle</a:t>
-            </a:r>
-            <a:endParaRPr lang="en-GB" sz="3600" dirty="0"/>
-          </a:p>
-        </p:txBody>
-      </p:sp>
-      <p:pic>
-        <p:nvPicPr>
-          <p:cNvPr id="10" name="Billede 2">
-            <a:extLst>
-              <a:ext uri="{FF2B5EF4-FFF2-40B4-BE49-F238E27FC236}">
-                <a16:creationId xmlns:a16="http://schemas.microsoft.com/office/drawing/2014/main" id="{48BD58CF-CFC9-C762-A8BD-0894409D5746}"/>
-              </a:ext>
-            </a:extLst>
-          </p:cNvPr>
-          <p:cNvPicPr>
-            <a:picLocks noChangeAspect="1"/>
-          </p:cNvPicPr>
-          <p:nvPr/>
-        </p:nvPicPr>
-        <p:blipFill>
-          <a:blip r:embed="rId3"/>
-          <a:stretch>
-            <a:fillRect/>
-          </a:stretch>
-        </p:blipFill>
-        <p:spPr>
-          <a:xfrm>
-            <a:off x="408142" y="2682332"/>
-            <a:ext cx="2877221" cy="2162922"/>
+            <a:off x="335280" y="2226209"/>
+            <a:ext cx="11521440" cy="3552559"/>
           </a:xfrm>
           <a:prstGeom prst="rect">
             <a:avLst/>
@@ -6456,7 +7146,7 @@
     </p:spTree>
     <p:extLst>
       <p:ext uri="{BB962C8B-B14F-4D97-AF65-F5344CB8AC3E}">
-        <p14:creationId xmlns:p14="http://schemas.microsoft.com/office/powerpoint/2010/main" val="1153429895"/>
+        <p14:creationId xmlns:p14="http://schemas.microsoft.com/office/powerpoint/2010/main" val="1709163067"/>
       </p:ext>
     </p:extLst>
   </p:cSld>
@@ -6491,6 +7181,145 @@
           <a:chExt cx="0" cy="0"/>
         </a:xfrm>
       </p:grpSpPr>
+      <p:pic>
+        <p:nvPicPr>
+          <p:cNvPr id="6" name="Picture 5">
+            <a:extLst>
+              <a:ext uri="{FF2B5EF4-FFF2-40B4-BE49-F238E27FC236}">
+                <a16:creationId xmlns:a16="http://schemas.microsoft.com/office/drawing/2014/main" id="{4065F462-8577-12C9-75CC-127F460E2FEA}"/>
+              </a:ext>
+            </a:extLst>
+          </p:cNvPr>
+          <p:cNvPicPr>
+            <a:picLocks noChangeAspect="1"/>
+          </p:cNvPicPr>
+          <p:nvPr/>
+        </p:nvPicPr>
+        <p:blipFill>
+          <a:blip r:embed="rId2">
+            <a:extLst>
+              <a:ext uri="{28A0092B-C50C-407E-A947-70E740481C1C}">
+                <a14:useLocalDpi xmlns:a14="http://schemas.microsoft.com/office/drawing/2010/main" val="0"/>
+              </a:ext>
+            </a:extLst>
+          </a:blip>
+          <a:srcRect/>
+          <a:stretch/>
+        </p:blipFill>
+        <p:spPr>
+          <a:xfrm>
+            <a:off x="3993502" y="164000"/>
+            <a:ext cx="7525312" cy="6580111"/>
+          </a:xfrm>
+          <a:prstGeom prst="rect">
+            <a:avLst/>
+          </a:prstGeom>
+        </p:spPr>
+      </p:pic>
+      <p:sp>
+        <p:nvSpPr>
+          <p:cNvPr id="9" name="TextBox 8">
+            <a:extLst>
+              <a:ext uri="{FF2B5EF4-FFF2-40B4-BE49-F238E27FC236}">
+                <a16:creationId xmlns:a16="http://schemas.microsoft.com/office/drawing/2014/main" id="{E5532A53-B0EB-09F3-039B-D326D5F1DA6A}"/>
+              </a:ext>
+            </a:extLst>
+          </p:cNvPr>
+          <p:cNvSpPr txBox="1"/>
+          <p:nvPr/>
+        </p:nvSpPr>
+        <p:spPr>
+          <a:xfrm>
+            <a:off x="597159" y="606491"/>
+            <a:ext cx="3107094" cy="1200329"/>
+          </a:xfrm>
+          <a:prstGeom prst="rect">
+            <a:avLst/>
+          </a:prstGeom>
+          <a:noFill/>
+        </p:spPr>
+        <p:txBody>
+          <a:bodyPr wrap="square" rtlCol="0">
+            <a:spAutoFit/>
+          </a:bodyPr>
+          <a:lstStyle/>
+          <a:p>
+            <a:r>
+              <a:rPr lang="da-DK" sz="3600" dirty="0"/>
+              <a:t>Distribution of angle</a:t>
+            </a:r>
+            <a:endParaRPr lang="en-GB" sz="3600" dirty="0"/>
+          </a:p>
+        </p:txBody>
+      </p:sp>
+      <p:pic>
+        <p:nvPicPr>
+          <p:cNvPr id="10" name="Billede 2">
+            <a:extLst>
+              <a:ext uri="{FF2B5EF4-FFF2-40B4-BE49-F238E27FC236}">
+                <a16:creationId xmlns:a16="http://schemas.microsoft.com/office/drawing/2014/main" id="{48BD58CF-CFC9-C762-A8BD-0894409D5746}"/>
+              </a:ext>
+            </a:extLst>
+          </p:cNvPr>
+          <p:cNvPicPr>
+            <a:picLocks noChangeAspect="1"/>
+          </p:cNvPicPr>
+          <p:nvPr/>
+        </p:nvPicPr>
+        <p:blipFill>
+          <a:blip r:embed="rId3"/>
+          <a:stretch>
+            <a:fillRect/>
+          </a:stretch>
+        </p:blipFill>
+        <p:spPr>
+          <a:xfrm>
+            <a:off x="408142" y="2682332"/>
+            <a:ext cx="2877221" cy="2162922"/>
+          </a:xfrm>
+          <a:prstGeom prst="rect">
+            <a:avLst/>
+          </a:prstGeom>
+        </p:spPr>
+      </p:pic>
+    </p:spTree>
+    <p:extLst>
+      <p:ext uri="{BB962C8B-B14F-4D97-AF65-F5344CB8AC3E}">
+        <p14:creationId xmlns:p14="http://schemas.microsoft.com/office/powerpoint/2010/main" val="1153429895"/>
+      </p:ext>
+    </p:extLst>
+  </p:cSld>
+  <p:clrMapOvr>
+    <a:masterClrMapping/>
+  </p:clrMapOvr>
+</p:sld>
+</file>
+
+<file path=ppt/slides/slide6.xml><?xml version="1.0" encoding="utf-8"?>
+<p:sld xmlns:a="http://schemas.openxmlformats.org/drawingml/2006/main" xmlns:r="http://schemas.openxmlformats.org/officeDocument/2006/relationships" xmlns:p="http://schemas.openxmlformats.org/presentationml/2006/main">
+  <p:cSld>
+    <p:bg>
+      <p:bgPr>
+        <a:solidFill>
+          <a:schemeClr val="bg1"/>
+        </a:solidFill>
+        <a:effectLst/>
+      </p:bgPr>
+    </p:bg>
+    <p:spTree>
+      <p:nvGrpSpPr>
+        <p:cNvPr id="1" name=""/>
+        <p:cNvGrpSpPr/>
+        <p:nvPr/>
+      </p:nvGrpSpPr>
+      <p:grpSpPr>
+        <a:xfrm>
+          <a:off x="0" y="0"/>
+          <a:ext cx="0" cy="0"/>
+          <a:chOff x="0" y="0"/>
+          <a:chExt cx="0" cy="0"/>
+        </a:xfrm>
+      </p:grpSpPr>
       <p:sp useBgFill="1">
         <p:nvSpPr>
           <p:cNvPr id="12" name="Rectangle 11">
@@ -6579,8 +7408,9 @@
           </a:bodyPr>
           <a:lstStyle/>
           <a:p>
-            <a:r>
-              <a:rPr lang="en-US" sz="5200" kern="1200">
+            <a:pPr algn="ctr"/>
+            <a:r>
+              <a:rPr lang="en-US" sz="5200" kern="1200" dirty="0">
                 <a:solidFill>
                   <a:schemeClr val="tx1"/>
                 </a:solidFill>
@@ -6615,8 +7445,8 @@
         </p:blipFill>
         <p:spPr>
           <a:xfrm>
-            <a:off x="3176241" y="1845426"/>
-            <a:ext cx="5836464" cy="4450303"/>
+            <a:off x="2786851" y="1400106"/>
+            <a:ext cx="6618297" cy="5046451"/>
           </a:xfrm>
           <a:prstGeom prst="rect">
             <a:avLst/>
@@ -6627,169 +7457,6 @@
     <p:extLst>
       <p:ext uri="{BB962C8B-B14F-4D97-AF65-F5344CB8AC3E}">
         <p14:creationId xmlns:p14="http://schemas.microsoft.com/office/powerpoint/2010/main" val="3466119397"/>
-      </p:ext>
-    </p:extLst>
-  </p:cSld>
-  <p:clrMapOvr>
-    <a:masterClrMapping/>
-  </p:clrMapOvr>
-</p:sld>
-</file>
-
-<file path=ppt/slides/slide6.xml><?xml version="1.0" encoding="utf-8"?>
-<p:sld xmlns:a="http://schemas.openxmlformats.org/drawingml/2006/main" xmlns:r="http://schemas.openxmlformats.org/officeDocument/2006/relationships" xmlns:p="http://schemas.openxmlformats.org/presentationml/2006/main">
-  <p:cSld>
-    <p:spTree>
-      <p:nvGrpSpPr>
-        <p:cNvPr id="1" name=""/>
-        <p:cNvGrpSpPr/>
-        <p:nvPr/>
-      </p:nvGrpSpPr>
-      <p:grpSpPr>
-        <a:xfrm>
-          <a:off x="0" y="0"/>
-          <a:ext cx="0" cy="0"/>
-          <a:chOff x="0" y="0"/>
-          <a:chExt cx="0" cy="0"/>
-        </a:xfrm>
-      </p:grpSpPr>
-      <p:sp>
-        <p:nvSpPr>
-          <p:cNvPr id="2" name="Title 1">
-            <a:extLst>
-              <a:ext uri="{FF2B5EF4-FFF2-40B4-BE49-F238E27FC236}">
-                <a16:creationId xmlns:a16="http://schemas.microsoft.com/office/drawing/2014/main" id="{42F0E056-90D5-B430-A12B-D8978776F7C4}"/>
-              </a:ext>
-            </a:extLst>
-          </p:cNvPr>
-          <p:cNvSpPr>
-            <a:spLocks noGrp="1"/>
-          </p:cNvSpPr>
-          <p:nvPr>
-            <p:ph type="title"/>
-          </p:nvPr>
-        </p:nvSpPr>
-        <p:spPr/>
-        <p:txBody>
-          <a:bodyPr/>
-          <a:lstStyle/>
-          <a:p>
-            <a:r>
-              <a:rPr lang="da-DK" dirty="0"/>
-              <a:t>2D histogram</a:t>
-            </a:r>
-            <a:endParaRPr lang="en-GB" dirty="0"/>
-          </a:p>
-        </p:txBody>
-      </p:sp>
-      <p:pic>
-        <p:nvPicPr>
-          <p:cNvPr id="5" name="Content Placeholder 4">
-            <a:extLst>
-              <a:ext uri="{FF2B5EF4-FFF2-40B4-BE49-F238E27FC236}">
-                <a16:creationId xmlns:a16="http://schemas.microsoft.com/office/drawing/2014/main" id="{C0BDEF41-0A78-CD91-C0E2-9C0C122A0807}"/>
-              </a:ext>
-            </a:extLst>
-          </p:cNvPr>
-          <p:cNvPicPr>
-            <a:picLocks noGrp="1" noChangeAspect="1"/>
-          </p:cNvPicPr>
-          <p:nvPr>
-            <p:ph idx="1"/>
-          </p:nvPr>
-        </p:nvPicPr>
-        <p:blipFill>
-          <a:blip r:embed="rId2">
-            <a:extLst>
-              <a:ext uri="{28A0092B-C50C-407E-A947-70E740481C1C}">
-                <a14:useLocalDpi xmlns:a14="http://schemas.microsoft.com/office/drawing/2010/main" val="0"/>
-              </a:ext>
-            </a:extLst>
-          </a:blip>
-          <a:srcRect/>
-          <a:stretch/>
-        </p:blipFill>
-        <p:spPr>
-          <a:xfrm>
-            <a:off x="7980420" y="2035922"/>
-            <a:ext cx="4049211" cy="3105246"/>
-          </a:xfrm>
-        </p:spPr>
-      </p:pic>
-      <p:pic>
-        <p:nvPicPr>
-          <p:cNvPr id="7" name="Picture 6">
-            <a:extLst>
-              <a:ext uri="{FF2B5EF4-FFF2-40B4-BE49-F238E27FC236}">
-                <a16:creationId xmlns:a16="http://schemas.microsoft.com/office/drawing/2014/main" id="{0D7DE868-161A-770E-4DFE-B949F0C4535F}"/>
-              </a:ext>
-            </a:extLst>
-          </p:cNvPr>
-          <p:cNvPicPr>
-            <a:picLocks noChangeAspect="1"/>
-          </p:cNvPicPr>
-          <p:nvPr/>
-        </p:nvPicPr>
-        <p:blipFill>
-          <a:blip r:embed="rId3">
-            <a:extLst>
-              <a:ext uri="{28A0092B-C50C-407E-A947-70E740481C1C}">
-                <a14:useLocalDpi xmlns:a14="http://schemas.microsoft.com/office/drawing/2010/main" val="0"/>
-              </a:ext>
-            </a:extLst>
-          </a:blip>
-          <a:srcRect/>
-          <a:stretch/>
-        </p:blipFill>
-        <p:spPr>
-          <a:xfrm>
-            <a:off x="93306" y="2048046"/>
-            <a:ext cx="3936227" cy="3080997"/>
-          </a:xfrm>
-          <a:prstGeom prst="rect">
-            <a:avLst/>
-          </a:prstGeom>
-        </p:spPr>
-      </p:pic>
-      <p:pic>
-        <p:nvPicPr>
-          <p:cNvPr id="9" name="Picture 8">
-            <a:extLst>
-              <a:ext uri="{FF2B5EF4-FFF2-40B4-BE49-F238E27FC236}">
-                <a16:creationId xmlns:a16="http://schemas.microsoft.com/office/drawing/2014/main" id="{DEE57891-6E5D-62F1-B999-21F57EBE97A5}"/>
-              </a:ext>
-            </a:extLst>
-          </p:cNvPr>
-          <p:cNvPicPr>
-            <a:picLocks noChangeAspect="1"/>
-          </p:cNvPicPr>
-          <p:nvPr/>
-        </p:nvPicPr>
-        <p:blipFill>
-          <a:blip r:embed="rId4">
-            <a:extLst>
-              <a:ext uri="{28A0092B-C50C-407E-A947-70E740481C1C}">
-                <a14:useLocalDpi xmlns:a14="http://schemas.microsoft.com/office/drawing/2010/main" val="0"/>
-              </a:ext>
-            </a:extLst>
-          </a:blip>
-          <a:srcRect/>
-          <a:stretch/>
-        </p:blipFill>
-        <p:spPr>
-          <a:xfrm>
-            <a:off x="3998635" y="2066681"/>
-            <a:ext cx="3967206" cy="3043727"/>
-          </a:xfrm>
-          <a:prstGeom prst="rect">
-            <a:avLst/>
-          </a:prstGeom>
-        </p:spPr>
-      </p:pic>
-    </p:spTree>
-    <p:extLst>
-      <p:ext uri="{BB962C8B-B14F-4D97-AF65-F5344CB8AC3E}">
-        <p14:creationId xmlns:p14="http://schemas.microsoft.com/office/powerpoint/2010/main" val="3321509687"/>
       </p:ext>
     </p:extLst>
   </p:cSld>
@@ -6816,12 +7483,75 @@
           <a:chExt cx="0" cy="0"/>
         </a:xfrm>
       </p:grpSpPr>
+      <p:sp>
+        <p:nvSpPr>
+          <p:cNvPr id="2" name="Title 1">
+            <a:extLst>
+              <a:ext uri="{FF2B5EF4-FFF2-40B4-BE49-F238E27FC236}">
+                <a16:creationId xmlns:a16="http://schemas.microsoft.com/office/drawing/2014/main" id="{42F0E056-90D5-B430-A12B-D8978776F7C4}"/>
+              </a:ext>
+            </a:extLst>
+          </p:cNvPr>
+          <p:cNvSpPr>
+            <a:spLocks noGrp="1"/>
+          </p:cNvSpPr>
+          <p:nvPr>
+            <p:ph type="title"/>
+          </p:nvPr>
+        </p:nvSpPr>
+        <p:spPr/>
+        <p:txBody>
+          <a:bodyPr/>
+          <a:lstStyle/>
+          <a:p>
+            <a:r>
+              <a:rPr lang="da-DK" dirty="0"/>
+              <a:t>2D histogram</a:t>
+            </a:r>
+            <a:endParaRPr lang="en-GB" dirty="0"/>
+          </a:p>
+        </p:txBody>
+      </p:sp>
       <p:pic>
         <p:nvPicPr>
-          <p:cNvPr id="6" name="Picture 5">
-            <a:extLst>
-              <a:ext uri="{FF2B5EF4-FFF2-40B4-BE49-F238E27FC236}">
-                <a16:creationId xmlns:a16="http://schemas.microsoft.com/office/drawing/2014/main" id="{4065F462-8577-12C9-75CC-127F460E2FEA}"/>
+          <p:cNvPr id="5" name="Content Placeholder 4">
+            <a:extLst>
+              <a:ext uri="{FF2B5EF4-FFF2-40B4-BE49-F238E27FC236}">
+                <a16:creationId xmlns:a16="http://schemas.microsoft.com/office/drawing/2014/main" id="{C0BDEF41-0A78-CD91-C0E2-9C0C122A0807}"/>
+              </a:ext>
+            </a:extLst>
+          </p:cNvPr>
+          <p:cNvPicPr>
+            <a:picLocks noGrp="1" noChangeAspect="1"/>
+          </p:cNvPicPr>
+          <p:nvPr>
+            <p:ph idx="1"/>
+          </p:nvPr>
+        </p:nvPicPr>
+        <p:blipFill>
+          <a:blip r:embed="rId2">
+            <a:extLst>
+              <a:ext uri="{28A0092B-C50C-407E-A947-70E740481C1C}">
+                <a14:useLocalDpi xmlns:a14="http://schemas.microsoft.com/office/drawing/2010/main" val="0"/>
+              </a:ext>
+            </a:extLst>
+          </a:blip>
+          <a:srcRect/>
+          <a:stretch/>
+        </p:blipFill>
+        <p:spPr>
+          <a:xfrm>
+            <a:off x="7980420" y="2035922"/>
+            <a:ext cx="4049211" cy="3105246"/>
+          </a:xfrm>
+        </p:spPr>
+      </p:pic>
+      <p:pic>
+        <p:nvPicPr>
+          <p:cNvPr id="7" name="Picture 6">
+            <a:extLst>
+              <a:ext uri="{FF2B5EF4-FFF2-40B4-BE49-F238E27FC236}">
+                <a16:creationId xmlns:a16="http://schemas.microsoft.com/office/drawing/2014/main" id="{0D7DE868-161A-770E-4DFE-B949F0C4535F}"/>
               </a:ext>
             </a:extLst>
           </p:cNvPr>
@@ -6831,7 +7561,7 @@
           <p:nvPr/>
         </p:nvPicPr>
         <p:blipFill>
-          <a:blip r:embed="rId2">
+          <a:blip r:embed="rId3">
             <a:extLst>
               <a:ext uri="{28A0092B-C50C-407E-A947-70E740481C1C}">
                 <a14:useLocalDpi xmlns:a14="http://schemas.microsoft.com/office/drawing/2010/main" val="0"/>
@@ -6843,56 +7573,20 @@
         </p:blipFill>
         <p:spPr>
           <a:xfrm>
-            <a:off x="3993502" y="164000"/>
-            <a:ext cx="7525311" cy="6580111"/>
+            <a:off x="93306" y="2048046"/>
+            <a:ext cx="3936227" cy="3080997"/>
           </a:xfrm>
           <a:prstGeom prst="rect">
             <a:avLst/>
           </a:prstGeom>
         </p:spPr>
       </p:pic>
-      <p:sp>
-        <p:nvSpPr>
-          <p:cNvPr id="9" name="TextBox 8">
-            <a:extLst>
-              <a:ext uri="{FF2B5EF4-FFF2-40B4-BE49-F238E27FC236}">
-                <a16:creationId xmlns:a16="http://schemas.microsoft.com/office/drawing/2014/main" id="{E5532A53-B0EB-09F3-039B-D326D5F1DA6A}"/>
-              </a:ext>
-            </a:extLst>
-          </p:cNvPr>
-          <p:cNvSpPr txBox="1"/>
-          <p:nvPr/>
-        </p:nvSpPr>
-        <p:spPr>
-          <a:xfrm>
-            <a:off x="597159" y="606491"/>
-            <a:ext cx="3107094" cy="1200329"/>
-          </a:xfrm>
-          <a:prstGeom prst="rect">
-            <a:avLst/>
-          </a:prstGeom>
-          <a:noFill/>
-        </p:spPr>
-        <p:txBody>
-          <a:bodyPr wrap="square" rtlCol="0">
-            <a:spAutoFit/>
-          </a:bodyPr>
-          <a:lstStyle/>
-          <a:p>
-            <a:r>
-              <a:rPr lang="da-DK" sz="3600" dirty="0"/>
-              <a:t>Distribution of Dihedral</a:t>
-            </a:r>
-            <a:endParaRPr lang="en-GB" sz="3600" dirty="0"/>
-          </a:p>
-        </p:txBody>
-      </p:sp>
       <p:pic>
         <p:nvPicPr>
-          <p:cNvPr id="3" name="Picture 2">
-            <a:extLst>
-              <a:ext uri="{FF2B5EF4-FFF2-40B4-BE49-F238E27FC236}">
-                <a16:creationId xmlns:a16="http://schemas.microsoft.com/office/drawing/2014/main" id="{513F9822-81D6-B15A-7020-FB10178A7E5B}"/>
+          <p:cNvPr id="9" name="Picture 8">
+            <a:extLst>
+              <a:ext uri="{FF2B5EF4-FFF2-40B4-BE49-F238E27FC236}">
+                <a16:creationId xmlns:a16="http://schemas.microsoft.com/office/drawing/2014/main" id="{DEE57891-6E5D-62F1-B999-21F57EBE97A5}"/>
               </a:ext>
             </a:extLst>
           </p:cNvPr>
@@ -6902,15 +7596,20 @@
           <p:nvPr/>
         </p:nvPicPr>
         <p:blipFill>
-          <a:blip r:embed="rId3"/>
-          <a:stretch>
-            <a:fillRect/>
-          </a:stretch>
+          <a:blip r:embed="rId4">
+            <a:extLst>
+              <a:ext uri="{28A0092B-C50C-407E-A947-70E740481C1C}">
+                <a14:useLocalDpi xmlns:a14="http://schemas.microsoft.com/office/drawing/2010/main" val="0"/>
+              </a:ext>
+            </a:extLst>
+          </a:blip>
+          <a:srcRect/>
+          <a:stretch/>
         </p:blipFill>
         <p:spPr>
           <a:xfrm>
-            <a:off x="621437" y="2737747"/>
-            <a:ext cx="2832848" cy="1956234"/>
+            <a:off x="3998635" y="2066681"/>
+            <a:ext cx="3967206" cy="3043727"/>
           </a:xfrm>
           <a:prstGeom prst="rect">
             <a:avLst/>
@@ -6920,7 +7619,7 @@
     </p:spTree>
     <p:extLst>
       <p:ext uri="{BB962C8B-B14F-4D97-AF65-F5344CB8AC3E}">
-        <p14:creationId xmlns:p14="http://schemas.microsoft.com/office/powerpoint/2010/main" val="1168580303"/>
+        <p14:creationId xmlns:p14="http://schemas.microsoft.com/office/powerpoint/2010/main" val="3321509687"/>
       </p:ext>
     </p:extLst>
   </p:cSld>
@@ -6947,55 +7646,12 @@
           <a:chExt cx="0" cy="0"/>
         </a:xfrm>
       </p:grpSpPr>
-      <p:sp>
-        <p:nvSpPr>
-          <p:cNvPr id="2" name="Title 1">
-            <a:extLst>
-              <a:ext uri="{FF2B5EF4-FFF2-40B4-BE49-F238E27FC236}">
-                <a16:creationId xmlns:a16="http://schemas.microsoft.com/office/drawing/2014/main" id="{9505FA9E-8C96-FE9C-F9D1-8CF22868EE6A}"/>
-              </a:ext>
-            </a:extLst>
-          </p:cNvPr>
-          <p:cNvSpPr>
-            <a:spLocks noGrp="1"/>
-          </p:cNvSpPr>
-          <p:nvPr>
-            <p:ph type="title"/>
-          </p:nvPr>
-        </p:nvSpPr>
-        <p:spPr>
-          <a:xfrm>
-            <a:off x="838200" y="184805"/>
-            <a:ext cx="10515600" cy="1505883"/>
-          </a:xfrm>
-        </p:spPr>
-        <p:txBody>
-          <a:bodyPr vert="horz" lIns="91440" tIns="45720" rIns="91440" bIns="45720" rtlCol="0" anchor="ctr">
-            <a:normAutofit/>
-          </a:bodyPr>
-          <a:lstStyle/>
-          <a:p>
-            <a:pPr algn="ctr"/>
-            <a:r>
-              <a:rPr lang="en-US" sz="5200" kern="1200" dirty="0">
-                <a:solidFill>
-                  <a:schemeClr val="tx1"/>
-                </a:solidFill>
-                <a:latin typeface="+mj-lt"/>
-                <a:ea typeface="+mj-ea"/>
-                <a:cs typeface="+mj-cs"/>
-              </a:rPr>
-              <a:t>KS score of dihedral comparison</a:t>
-            </a:r>
-          </a:p>
-        </p:txBody>
-      </p:sp>
       <p:pic>
         <p:nvPicPr>
-          <p:cNvPr id="7" name="Picture 6">
-            <a:extLst>
-              <a:ext uri="{FF2B5EF4-FFF2-40B4-BE49-F238E27FC236}">
-                <a16:creationId xmlns:a16="http://schemas.microsoft.com/office/drawing/2014/main" id="{39D5D6B1-D735-2BE6-A3B0-9CA73BF3E5C1}"/>
+          <p:cNvPr id="6" name="Picture 5">
+            <a:extLst>
+              <a:ext uri="{FF2B5EF4-FFF2-40B4-BE49-F238E27FC236}">
+                <a16:creationId xmlns:a16="http://schemas.microsoft.com/office/drawing/2014/main" id="{4065F462-8577-12C9-75CC-127F460E2FEA}"/>
               </a:ext>
             </a:extLst>
           </p:cNvPr>
@@ -7017,8 +7673,74 @@
         </p:blipFill>
         <p:spPr>
           <a:xfrm>
-            <a:off x="3176241" y="1848232"/>
-            <a:ext cx="5836464" cy="4444691"/>
+            <a:off x="3993502" y="164000"/>
+            <a:ext cx="7525311" cy="6580111"/>
+          </a:xfrm>
+          <a:prstGeom prst="rect">
+            <a:avLst/>
+          </a:prstGeom>
+        </p:spPr>
+      </p:pic>
+      <p:sp>
+        <p:nvSpPr>
+          <p:cNvPr id="9" name="TextBox 8">
+            <a:extLst>
+              <a:ext uri="{FF2B5EF4-FFF2-40B4-BE49-F238E27FC236}">
+                <a16:creationId xmlns:a16="http://schemas.microsoft.com/office/drawing/2014/main" id="{E5532A53-B0EB-09F3-039B-D326D5F1DA6A}"/>
+              </a:ext>
+            </a:extLst>
+          </p:cNvPr>
+          <p:cNvSpPr txBox="1"/>
+          <p:nvPr/>
+        </p:nvSpPr>
+        <p:spPr>
+          <a:xfrm>
+            <a:off x="597159" y="606491"/>
+            <a:ext cx="3107094" cy="1200329"/>
+          </a:xfrm>
+          <a:prstGeom prst="rect">
+            <a:avLst/>
+          </a:prstGeom>
+          <a:noFill/>
+        </p:spPr>
+        <p:txBody>
+          <a:bodyPr wrap="square" rtlCol="0">
+            <a:spAutoFit/>
+          </a:bodyPr>
+          <a:lstStyle/>
+          <a:p>
+            <a:r>
+              <a:rPr lang="da-DK" sz="3600" dirty="0"/>
+              <a:t>Distribution of Dihedral</a:t>
+            </a:r>
+            <a:endParaRPr lang="en-GB" sz="3600" dirty="0"/>
+          </a:p>
+        </p:txBody>
+      </p:sp>
+      <p:pic>
+        <p:nvPicPr>
+          <p:cNvPr id="3" name="Picture 2">
+            <a:extLst>
+              <a:ext uri="{FF2B5EF4-FFF2-40B4-BE49-F238E27FC236}">
+                <a16:creationId xmlns:a16="http://schemas.microsoft.com/office/drawing/2014/main" id="{513F9822-81D6-B15A-7020-FB10178A7E5B}"/>
+              </a:ext>
+            </a:extLst>
+          </p:cNvPr>
+          <p:cNvPicPr>
+            <a:picLocks noChangeAspect="1"/>
+          </p:cNvPicPr>
+          <p:nvPr/>
+        </p:nvPicPr>
+        <p:blipFill>
+          <a:blip r:embed="rId3"/>
+          <a:stretch>
+            <a:fillRect/>
+          </a:stretch>
+        </p:blipFill>
+        <p:spPr>
+          <a:xfrm>
+            <a:off x="621437" y="2737747"/>
+            <a:ext cx="2832848" cy="1956234"/>
           </a:xfrm>
           <a:prstGeom prst="rect">
             <a:avLst/>
@@ -7028,7 +7750,7 @@
     </p:spTree>
     <p:extLst>
       <p:ext uri="{BB962C8B-B14F-4D97-AF65-F5344CB8AC3E}">
-        <p14:creationId xmlns:p14="http://schemas.microsoft.com/office/powerpoint/2010/main" val="2422346034"/>
+        <p14:creationId xmlns:p14="http://schemas.microsoft.com/office/powerpoint/2010/main" val="1168580303"/>
       </p:ext>
     </p:extLst>
   </p:cSld>
@@ -7060,7 +7782,7 @@
           <p:cNvPr id="2" name="Title 1">
             <a:extLst>
               <a:ext uri="{FF2B5EF4-FFF2-40B4-BE49-F238E27FC236}">
-                <a16:creationId xmlns:a16="http://schemas.microsoft.com/office/drawing/2014/main" id="{DCEE1F20-7212-8A3F-2305-E51C92B784CE}"/>
+                <a16:creationId xmlns:a16="http://schemas.microsoft.com/office/drawing/2014/main" id="{9505FA9E-8C96-FE9C-F9D1-8CF22868EE6A}"/>
               </a:ext>
             </a:extLst>
           </p:cNvPr>
@@ -7071,53 +7793,72 @@
             <p:ph type="title"/>
           </p:nvPr>
         </p:nvSpPr>
-        <p:spPr/>
-        <p:txBody>
-          <a:bodyPr/>
+        <p:spPr>
+          <a:xfrm>
+            <a:off x="838200" y="184805"/>
+            <a:ext cx="10515600" cy="1505883"/>
+          </a:xfrm>
+        </p:spPr>
+        <p:txBody>
+          <a:bodyPr vert="horz" lIns="91440" tIns="45720" rIns="91440" bIns="45720" rtlCol="0" anchor="ctr">
+            <a:normAutofit/>
+          </a:bodyPr>
           <a:lstStyle/>
           <a:p>
             <a:pPr algn="ctr"/>
             <a:r>
-              <a:rPr lang="da-DK" dirty="0"/>
-              <a:t>Time spent pr step for each simulation</a:t>
-            </a:r>
-            <a:endParaRPr lang="en-GB" dirty="0"/>
+              <a:rPr lang="en-US" sz="5200" kern="1200" dirty="0">
+                <a:solidFill>
+                  <a:schemeClr val="tx1"/>
+                </a:solidFill>
+                <a:latin typeface="+mj-lt"/>
+                <a:ea typeface="+mj-ea"/>
+                <a:cs typeface="+mj-cs"/>
+              </a:rPr>
+              <a:t>KS score of dihedral comparison</a:t>
+            </a:r>
           </a:p>
         </p:txBody>
       </p:sp>
       <p:pic>
         <p:nvPicPr>
-          <p:cNvPr id="5" name="Content Placeholder 4">
-            <a:extLst>
-              <a:ext uri="{FF2B5EF4-FFF2-40B4-BE49-F238E27FC236}">
-                <a16:creationId xmlns:a16="http://schemas.microsoft.com/office/drawing/2014/main" id="{3F821E9B-E514-E3FB-97DA-323E5DEB20BE}"/>
+          <p:cNvPr id="7" name="Picture 6">
+            <a:extLst>
+              <a:ext uri="{FF2B5EF4-FFF2-40B4-BE49-F238E27FC236}">
+                <a16:creationId xmlns:a16="http://schemas.microsoft.com/office/drawing/2014/main" id="{39D5D6B1-D735-2BE6-A3B0-9CA73BF3E5C1}"/>
               </a:ext>
             </a:extLst>
           </p:cNvPr>
           <p:cNvPicPr>
-            <a:picLocks noGrp="1" noChangeAspect="1"/>
+            <a:picLocks noChangeAspect="1"/>
           </p:cNvPicPr>
-          <p:nvPr>
-            <p:ph idx="1"/>
-          </p:nvPr>
+          <p:nvPr/>
         </p:nvPicPr>
         <p:blipFill>
-          <a:blip r:embed="rId2"/>
-          <a:stretch>
-            <a:fillRect/>
-          </a:stretch>
+          <a:blip r:embed="rId2">
+            <a:extLst>
+              <a:ext uri="{28A0092B-C50C-407E-A947-70E740481C1C}">
+                <a14:useLocalDpi xmlns:a14="http://schemas.microsoft.com/office/drawing/2010/main" val="0"/>
+              </a:ext>
+            </a:extLst>
+          </a:blip>
+          <a:srcRect/>
+          <a:stretch/>
         </p:blipFill>
         <p:spPr>
           <a:xfrm>
-            <a:off x="3243726" y="1825625"/>
-            <a:ext cx="5704547" cy="4351338"/>
-          </a:xfrm>
+            <a:off x="2744431" y="1568499"/>
+            <a:ext cx="6703138" cy="5104696"/>
+          </a:xfrm>
+          <a:prstGeom prst="rect">
+            <a:avLst/>
+          </a:prstGeom>
         </p:spPr>
       </p:pic>
     </p:spTree>
     <p:extLst>
       <p:ext uri="{BB962C8B-B14F-4D97-AF65-F5344CB8AC3E}">
-        <p14:creationId xmlns:p14="http://schemas.microsoft.com/office/powerpoint/2010/main" val="851579503"/>
+        <p14:creationId xmlns:p14="http://schemas.microsoft.com/office/powerpoint/2010/main" val="2422346034"/>
       </p:ext>
     </p:extLst>
   </p:cSld>

</xml_diff>

<commit_message>
Working on evaluating models and compare models
</commit_message>
<xml_diff>
--- a/Master thesis/Meetings/06-03 Comparing model and simulation.pptx
+++ b/Master thesis/Meetings/06-03 Comparing model and simulation.pptx
@@ -20,6 +20,7 @@
     <p:sldId id="505" r:id="rId14"/>
     <p:sldId id="502" r:id="rId15"/>
     <p:sldId id="497" r:id="rId16"/>
+    <p:sldId id="509" r:id="rId17"/>
   </p:sldIdLst>
   <p:sldSz cx="12192000" cy="6858000"/>
   <p:notesSz cx="6858000" cy="9144000"/>
@@ -129,7 +130,7 @@
 <file path=ppt/revisionInfo.xml><?xml version="1.0" encoding="utf-8"?>
 <p1510:revInfo xmlns:a="http://schemas.openxmlformats.org/drawingml/2006/main" xmlns:r="http://schemas.openxmlformats.org/officeDocument/2006/relationships" xmlns:p1510="http://schemas.microsoft.com/office/powerpoint/2015/10/main">
   <p1510:revLst>
-    <p1510:client id="{C11D7ED5-FBE8-4797-A956-863497D4E4C9}" v="2" dt="2024-03-06T10:08:44.786"/>
+    <p1510:client id="{C11D7ED5-FBE8-4797-A956-863497D4E4C9}" v="3" dt="2024-03-12T08:53:06.757"/>
   </p1510:revLst>
 </p1510:revInfo>
 </file>
@@ -139,7 +140,7 @@
   <pc:docChgLst>
     <pc:chgData name="Birk Nøhr Dissing" userId="9f16f90f-bd2a-4063-a72f-deae502fc0f4" providerId="ADAL" clId="{C11D7ED5-FBE8-4797-A956-863497D4E4C9}"/>
     <pc:docChg chg="undo custSel addSld delSld modSld">
-      <pc:chgData name="Birk Nøhr Dissing" userId="9f16f90f-bd2a-4063-a72f-deae502fc0f4" providerId="ADAL" clId="{C11D7ED5-FBE8-4797-A956-863497D4E4C9}" dt="2024-03-06T11:12:54.442" v="228" actId="47"/>
+      <pc:chgData name="Birk Nøhr Dissing" userId="9f16f90f-bd2a-4063-a72f-deae502fc0f4" providerId="ADAL" clId="{C11D7ED5-FBE8-4797-A956-863497D4E4C9}" dt="2024-03-12T08:53:22.485" v="232" actId="14826"/>
       <pc:docMkLst>
         <pc:docMk/>
       </pc:docMkLst>
@@ -364,6 +365,28 @@
           </ac:picMkLst>
         </pc:picChg>
       </pc:sldChg>
+      <pc:sldChg chg="new del">
+        <pc:chgData name="Birk Nøhr Dissing" userId="9f16f90f-bd2a-4063-a72f-deae502fc0f4" providerId="ADAL" clId="{C11D7ED5-FBE8-4797-A956-863497D4E4C9}" dt="2024-03-12T08:53:08.571" v="231" actId="47"/>
+        <pc:sldMkLst>
+          <pc:docMk/>
+          <pc:sldMk cId="4160951850" sldId="508"/>
+        </pc:sldMkLst>
+      </pc:sldChg>
+      <pc:sldChg chg="modSp add mod setBg">
+        <pc:chgData name="Birk Nøhr Dissing" userId="9f16f90f-bd2a-4063-a72f-deae502fc0f4" providerId="ADAL" clId="{C11D7ED5-FBE8-4797-A956-863497D4E4C9}" dt="2024-03-12T08:53:22.485" v="232" actId="14826"/>
+        <pc:sldMkLst>
+          <pc:docMk/>
+          <pc:sldMk cId="1342509157" sldId="509"/>
+        </pc:sldMkLst>
+        <pc:picChg chg="mod">
+          <ac:chgData name="Birk Nøhr Dissing" userId="9f16f90f-bd2a-4063-a72f-deae502fc0f4" providerId="ADAL" clId="{C11D7ED5-FBE8-4797-A956-863497D4E4C9}" dt="2024-03-12T08:53:22.485" v="232" actId="14826"/>
+          <ac:picMkLst>
+            <pc:docMk/>
+            <pc:sldMk cId="1342509157" sldId="509"/>
+            <ac:picMk id="6" creationId="{4065F462-8577-12C9-75CC-127F460E2FEA}"/>
+          </ac:picMkLst>
+        </pc:picChg>
+      </pc:sldChg>
     </pc:docChg>
   </pc:docChgLst>
 </pc:chgInfo>
@@ -518,7 +541,7 @@
           <a:p>
             <a:fld id="{09E97F70-84DE-42B7-9F34-EEF1D7EF4F70}" type="datetimeFigureOut">
               <a:rPr lang="en-GB" smtClean="0"/>
-              <a:t>06/03/2024</a:t>
+              <a:t>12/03/2024</a:t>
             </a:fld>
             <a:endParaRPr lang="en-GB"/>
           </a:p>
@@ -718,7 +741,7 @@
           <a:p>
             <a:fld id="{09E97F70-84DE-42B7-9F34-EEF1D7EF4F70}" type="datetimeFigureOut">
               <a:rPr lang="en-GB" smtClean="0"/>
-              <a:t>06/03/2024</a:t>
+              <a:t>12/03/2024</a:t>
             </a:fld>
             <a:endParaRPr lang="en-GB"/>
           </a:p>
@@ -928,7 +951,7 @@
           <a:p>
             <a:fld id="{09E97F70-84DE-42B7-9F34-EEF1D7EF4F70}" type="datetimeFigureOut">
               <a:rPr lang="en-GB" smtClean="0"/>
-              <a:t>06/03/2024</a:t>
+              <a:t>12/03/2024</a:t>
             </a:fld>
             <a:endParaRPr lang="en-GB"/>
           </a:p>
@@ -1187,7 +1210,7 @@
           <a:p>
             <a:fld id="{782CEA36-139A-4E3F-B6A0-7BD657AD45E8}" type="datetime1">
               <a:rPr lang="en-GB" smtClean="0"/>
-              <a:t>06/03/2024</a:t>
+              <a:t>12/03/2024</a:t>
             </a:fld>
             <a:endParaRPr lang="en-GB" dirty="0"/>
           </a:p>
@@ -1375,7 +1398,7 @@
           <a:p>
             <a:fld id="{09E97F70-84DE-42B7-9F34-EEF1D7EF4F70}" type="datetimeFigureOut">
               <a:rPr lang="en-GB" smtClean="0"/>
-              <a:t>06/03/2024</a:t>
+              <a:t>12/03/2024</a:t>
             </a:fld>
             <a:endParaRPr lang="en-GB"/>
           </a:p>
@@ -1651,7 +1674,7 @@
           <a:p>
             <a:fld id="{09E97F70-84DE-42B7-9F34-EEF1D7EF4F70}" type="datetimeFigureOut">
               <a:rPr lang="en-GB" smtClean="0"/>
-              <a:t>06/03/2024</a:t>
+              <a:t>12/03/2024</a:t>
             </a:fld>
             <a:endParaRPr lang="en-GB"/>
           </a:p>
@@ -1919,7 +1942,7 @@
           <a:p>
             <a:fld id="{09E97F70-84DE-42B7-9F34-EEF1D7EF4F70}" type="datetimeFigureOut">
               <a:rPr lang="en-GB" smtClean="0"/>
-              <a:t>06/03/2024</a:t>
+              <a:t>12/03/2024</a:t>
             </a:fld>
             <a:endParaRPr lang="en-GB"/>
           </a:p>
@@ -2334,7 +2357,7 @@
           <a:p>
             <a:fld id="{09E97F70-84DE-42B7-9F34-EEF1D7EF4F70}" type="datetimeFigureOut">
               <a:rPr lang="en-GB" smtClean="0"/>
-              <a:t>06/03/2024</a:t>
+              <a:t>12/03/2024</a:t>
             </a:fld>
             <a:endParaRPr lang="en-GB"/>
           </a:p>
@@ -2476,7 +2499,7 @@
           <a:p>
             <a:fld id="{09E97F70-84DE-42B7-9F34-EEF1D7EF4F70}" type="datetimeFigureOut">
               <a:rPr lang="en-GB" smtClean="0"/>
-              <a:t>06/03/2024</a:t>
+              <a:t>12/03/2024</a:t>
             </a:fld>
             <a:endParaRPr lang="en-GB"/>
           </a:p>
@@ -2589,7 +2612,7 @@
           <a:p>
             <a:fld id="{09E97F70-84DE-42B7-9F34-EEF1D7EF4F70}" type="datetimeFigureOut">
               <a:rPr lang="en-GB" smtClean="0"/>
-              <a:t>06/03/2024</a:t>
+              <a:t>12/03/2024</a:t>
             </a:fld>
             <a:endParaRPr lang="en-GB"/>
           </a:p>
@@ -2902,7 +2925,7 @@
           <a:p>
             <a:fld id="{09E97F70-84DE-42B7-9F34-EEF1D7EF4F70}" type="datetimeFigureOut">
               <a:rPr lang="en-GB" smtClean="0"/>
-              <a:t>06/03/2024</a:t>
+              <a:t>12/03/2024</a:t>
             </a:fld>
             <a:endParaRPr lang="en-GB"/>
           </a:p>
@@ -3191,7 +3214,7 @@
           <a:p>
             <a:fld id="{09E97F70-84DE-42B7-9F34-EEF1D7EF4F70}" type="datetimeFigureOut">
               <a:rPr lang="en-GB" smtClean="0"/>
-              <a:t>06/03/2024</a:t>
+              <a:t>12/03/2024</a:t>
             </a:fld>
             <a:endParaRPr lang="en-GB"/>
           </a:p>
@@ -3434,7 +3457,7 @@
           <a:p>
             <a:fld id="{09E97F70-84DE-42B7-9F34-EEF1D7EF4F70}" type="datetimeFigureOut">
               <a:rPr lang="en-GB" smtClean="0"/>
-              <a:t>06/03/2024</a:t>
+              <a:t>12/03/2024</a:t>
             </a:fld>
             <a:endParaRPr lang="en-GB"/>
           </a:p>
@@ -4556,6 +4579,137 @@
     <p:extLst>
       <p:ext uri="{BB962C8B-B14F-4D97-AF65-F5344CB8AC3E}">
         <p14:creationId xmlns:p14="http://schemas.microsoft.com/office/powerpoint/2010/main" val="1613750500"/>
+      </p:ext>
+    </p:extLst>
+  </p:cSld>
+  <p:clrMapOvr>
+    <a:masterClrMapping/>
+  </p:clrMapOvr>
+</p:sld>
+</file>
+
+<file path=ppt/slides/slide16.xml><?xml version="1.0" encoding="utf-8"?>
+<p:sld xmlns:a="http://schemas.openxmlformats.org/drawingml/2006/main" xmlns:r="http://schemas.openxmlformats.org/officeDocument/2006/relationships" xmlns:p="http://schemas.openxmlformats.org/presentationml/2006/main">
+  <p:cSld>
+    <p:spTree>
+      <p:nvGrpSpPr>
+        <p:cNvPr id="1" name=""/>
+        <p:cNvGrpSpPr/>
+        <p:nvPr/>
+      </p:nvGrpSpPr>
+      <p:grpSpPr>
+        <a:xfrm>
+          <a:off x="0" y="0"/>
+          <a:ext cx="0" cy="0"/>
+          <a:chOff x="0" y="0"/>
+          <a:chExt cx="0" cy="0"/>
+        </a:xfrm>
+      </p:grpSpPr>
+      <p:pic>
+        <p:nvPicPr>
+          <p:cNvPr id="6" name="Picture 5">
+            <a:extLst>
+              <a:ext uri="{FF2B5EF4-FFF2-40B4-BE49-F238E27FC236}">
+                <a16:creationId xmlns:a16="http://schemas.microsoft.com/office/drawing/2014/main" id="{4065F462-8577-12C9-75CC-127F460E2FEA}"/>
+              </a:ext>
+            </a:extLst>
+          </p:cNvPr>
+          <p:cNvPicPr>
+            <a:picLocks noChangeAspect="1"/>
+          </p:cNvPicPr>
+          <p:nvPr/>
+        </p:nvPicPr>
+        <p:blipFill>
+          <a:blip r:embed="rId2">
+            <a:extLst>
+              <a:ext uri="{28A0092B-C50C-407E-A947-70E740481C1C}">
+                <a14:useLocalDpi xmlns:a14="http://schemas.microsoft.com/office/drawing/2010/main" val="0"/>
+              </a:ext>
+            </a:extLst>
+          </a:blip>
+          <a:srcRect/>
+          <a:stretch/>
+        </p:blipFill>
+        <p:spPr>
+          <a:xfrm>
+            <a:off x="3993502" y="164690"/>
+            <a:ext cx="7525312" cy="6578731"/>
+          </a:xfrm>
+          <a:prstGeom prst="rect">
+            <a:avLst/>
+          </a:prstGeom>
+        </p:spPr>
+      </p:pic>
+      <p:sp>
+        <p:nvSpPr>
+          <p:cNvPr id="9" name="TextBox 8">
+            <a:extLst>
+              <a:ext uri="{FF2B5EF4-FFF2-40B4-BE49-F238E27FC236}">
+                <a16:creationId xmlns:a16="http://schemas.microsoft.com/office/drawing/2014/main" id="{E5532A53-B0EB-09F3-039B-D326D5F1DA6A}"/>
+              </a:ext>
+            </a:extLst>
+          </p:cNvPr>
+          <p:cNvSpPr txBox="1"/>
+          <p:nvPr/>
+        </p:nvSpPr>
+        <p:spPr>
+          <a:xfrm>
+            <a:off x="597159" y="606491"/>
+            <a:ext cx="3107094" cy="1200329"/>
+          </a:xfrm>
+          <a:prstGeom prst="rect">
+            <a:avLst/>
+          </a:prstGeom>
+          <a:noFill/>
+        </p:spPr>
+        <p:txBody>
+          <a:bodyPr wrap="square" rtlCol="0">
+            <a:spAutoFit/>
+          </a:bodyPr>
+          <a:lstStyle/>
+          <a:p>
+            <a:r>
+              <a:rPr lang="da-DK" sz="3600" dirty="0"/>
+              <a:t>Distribution of angle</a:t>
+            </a:r>
+            <a:endParaRPr lang="en-GB" sz="3600" dirty="0"/>
+          </a:p>
+        </p:txBody>
+      </p:sp>
+      <p:pic>
+        <p:nvPicPr>
+          <p:cNvPr id="10" name="Billede 2">
+            <a:extLst>
+              <a:ext uri="{FF2B5EF4-FFF2-40B4-BE49-F238E27FC236}">
+                <a16:creationId xmlns:a16="http://schemas.microsoft.com/office/drawing/2014/main" id="{48BD58CF-CFC9-C762-A8BD-0894409D5746}"/>
+              </a:ext>
+            </a:extLst>
+          </p:cNvPr>
+          <p:cNvPicPr>
+            <a:picLocks noChangeAspect="1"/>
+          </p:cNvPicPr>
+          <p:nvPr/>
+        </p:nvPicPr>
+        <p:blipFill>
+          <a:blip r:embed="rId3"/>
+          <a:stretch>
+            <a:fillRect/>
+          </a:stretch>
+        </p:blipFill>
+        <p:spPr>
+          <a:xfrm>
+            <a:off x="408142" y="2682332"/>
+            <a:ext cx="2877221" cy="2162922"/>
+          </a:xfrm>
+          <a:prstGeom prst="rect">
+            <a:avLst/>
+          </a:prstGeom>
+        </p:spPr>
+      </p:pic>
+    </p:spTree>
+    <p:extLst>
+      <p:ext uri="{BB962C8B-B14F-4D97-AF65-F5344CB8AC3E}">
+        <p14:creationId xmlns:p14="http://schemas.microsoft.com/office/powerpoint/2010/main" val="1342509157"/>
       </p:ext>
     </p:extLst>
   </p:cSld>
@@ -5019,7 +5173,7 @@
           <a:p>
             <a:fld id="{DD0E0F33-965B-4006-BF25-D26E1C84904D}" type="datetime1">
               <a:rPr lang="en-GB" smtClean="0"/>
-              <a:t>06/03/2024</a:t>
+              <a:t>12/03/2024</a:t>
             </a:fld>
             <a:endParaRPr lang="en-GB" dirty="0"/>
           </a:p>
@@ -6812,7 +6966,7 @@
           <a:p>
             <a:fld id="{DD0E0F33-965B-4006-BF25-D26E1C84904D}" type="datetime1">
               <a:rPr lang="en-GB" smtClean="0"/>
-              <a:t>06/03/2024</a:t>
+              <a:t>12/03/2024</a:t>
             </a:fld>
             <a:endParaRPr lang="en-GB" dirty="0"/>
           </a:p>
@@ -7068,7 +7222,7 @@
           <a:p>
             <a:fld id="{DD0E0F33-965B-4006-BF25-D26E1C84904D}" type="datetime1">
               <a:rPr lang="en-GB" smtClean="0"/>
-              <a:t>06/03/2024</a:t>
+              <a:t>12/03/2024</a:t>
             </a:fld>
             <a:endParaRPr lang="en-GB" dirty="0"/>
           </a:p>

</xml_diff>